<commit_message>
User interaction diagram for adding item to project budget
</commit_message>
<xml_diff>
--- a/documentation/AppDesign.pptx
+++ b/documentation/AppDesign.pptx
@@ -4,8 +4,12 @@
   <p:sldMasterIdLst>
     <p:sldMasterId id="2147483648" r:id="rId1"/>
   </p:sldMasterIdLst>
+  <p:notesMasterIdLst>
+    <p:notesMasterId r:id="rId4"/>
+  </p:notesMasterIdLst>
   <p:sldIdLst>
     <p:sldId id="256" r:id="rId2"/>
+    <p:sldId id="257" r:id="rId3"/>
   </p:sldIdLst>
   <p:sldSz cx="12192000" cy="6858000"/>
   <p:notesSz cx="6858000" cy="9144000"/>
@@ -220,6 +224,436 @@
 </inkml:ink>
 </file>
 
+<file path=ppt/notesMasters/notesMaster1.xml><?xml version="1.0" encoding="utf-8"?>
+<p:notesMaster xmlns:a="http://schemas.openxmlformats.org/drawingml/2006/main" xmlns:r="http://schemas.openxmlformats.org/officeDocument/2006/relationships" xmlns:p="http://schemas.openxmlformats.org/presentationml/2006/main">
+  <p:cSld>
+    <p:bg>
+      <p:bgRef idx="1001">
+        <a:schemeClr val="bg1"/>
+      </p:bgRef>
+    </p:bg>
+    <p:spTree>
+      <p:nvGrpSpPr>
+        <p:cNvPr id="1" name=""/>
+        <p:cNvGrpSpPr/>
+        <p:nvPr/>
+      </p:nvGrpSpPr>
+      <p:grpSpPr>
+        <a:xfrm>
+          <a:off x="0" y="0"/>
+          <a:ext cx="0" cy="0"/>
+          <a:chOff x="0" y="0"/>
+          <a:chExt cx="0" cy="0"/>
+        </a:xfrm>
+      </p:grpSpPr>
+      <p:sp>
+        <p:nvSpPr>
+          <p:cNvPr id="2" name="Header Placeholder 1"/>
+          <p:cNvSpPr>
+            <a:spLocks noGrp="1"/>
+          </p:cNvSpPr>
+          <p:nvPr>
+            <p:ph type="hdr" sz="quarter"/>
+          </p:nvPr>
+        </p:nvSpPr>
+        <p:spPr>
+          <a:xfrm>
+            <a:off x="0" y="0"/>
+            <a:ext cx="2971800" cy="458788"/>
+          </a:xfrm>
+          <a:prstGeom prst="rect">
+            <a:avLst/>
+          </a:prstGeom>
+        </p:spPr>
+        <p:txBody>
+          <a:bodyPr vert="horz" lIns="91440" tIns="45720" rIns="91440" bIns="45720" rtlCol="0"/>
+          <a:lstStyle>
+            <a:lvl1pPr algn="l">
+              <a:defRPr sz="1200"/>
+            </a:lvl1pPr>
+          </a:lstStyle>
+          <a:p>
+            <a:endParaRPr lang="en-US"/>
+          </a:p>
+        </p:txBody>
+      </p:sp>
+      <p:sp>
+        <p:nvSpPr>
+          <p:cNvPr id="3" name="Date Placeholder 2"/>
+          <p:cNvSpPr>
+            <a:spLocks noGrp="1"/>
+          </p:cNvSpPr>
+          <p:nvPr>
+            <p:ph type="dt" idx="1"/>
+          </p:nvPr>
+        </p:nvSpPr>
+        <p:spPr>
+          <a:xfrm>
+            <a:off x="3884613" y="0"/>
+            <a:ext cx="2971800" cy="458788"/>
+          </a:xfrm>
+          <a:prstGeom prst="rect">
+            <a:avLst/>
+          </a:prstGeom>
+        </p:spPr>
+        <p:txBody>
+          <a:bodyPr vert="horz" lIns="91440" tIns="45720" rIns="91440" bIns="45720" rtlCol="0"/>
+          <a:lstStyle>
+            <a:lvl1pPr algn="r">
+              <a:defRPr sz="1200"/>
+            </a:lvl1pPr>
+          </a:lstStyle>
+          <a:p>
+            <a:fld id="{7258A54E-126E-9F44-BB91-7E6D295A013E}" type="datetimeFigureOut">
+              <a:t>11/9/23</a:t>
+            </a:fld>
+            <a:endParaRPr lang="en-US"/>
+          </a:p>
+        </p:txBody>
+      </p:sp>
+      <p:sp>
+        <p:nvSpPr>
+          <p:cNvPr id="4" name="Slide Image Placeholder 3"/>
+          <p:cNvSpPr>
+            <a:spLocks noGrp="1" noRot="1" noChangeAspect="1"/>
+          </p:cNvSpPr>
+          <p:nvPr>
+            <p:ph type="sldImg" idx="2"/>
+          </p:nvPr>
+        </p:nvSpPr>
+        <p:spPr>
+          <a:xfrm>
+            <a:off x="685800" y="1143000"/>
+            <a:ext cx="5486400" cy="3086100"/>
+          </a:xfrm>
+          <a:prstGeom prst="rect">
+            <a:avLst/>
+          </a:prstGeom>
+          <a:noFill/>
+          <a:ln w="12700">
+            <a:solidFill>
+              <a:prstClr val="black"/>
+            </a:solidFill>
+          </a:ln>
+        </p:spPr>
+        <p:txBody>
+          <a:bodyPr vert="horz" lIns="91440" tIns="45720" rIns="91440" bIns="45720" rtlCol="0" anchor="ctr"/>
+          <a:lstStyle/>
+          <a:p>
+            <a:endParaRPr lang="en-US"/>
+          </a:p>
+        </p:txBody>
+      </p:sp>
+      <p:sp>
+        <p:nvSpPr>
+          <p:cNvPr id="5" name="Notes Placeholder 4"/>
+          <p:cNvSpPr>
+            <a:spLocks noGrp="1"/>
+          </p:cNvSpPr>
+          <p:nvPr>
+            <p:ph type="body" sz="quarter" idx="3"/>
+          </p:nvPr>
+        </p:nvSpPr>
+        <p:spPr>
+          <a:xfrm>
+            <a:off x="685800" y="4400550"/>
+            <a:ext cx="5486400" cy="3600450"/>
+          </a:xfrm>
+          <a:prstGeom prst="rect">
+            <a:avLst/>
+          </a:prstGeom>
+        </p:spPr>
+        <p:txBody>
+          <a:bodyPr vert="horz" lIns="91440" tIns="45720" rIns="91440" bIns="45720" rtlCol="0"/>
+          <a:lstStyle/>
+          <a:p>
+            <a:pPr lvl="0"/>
+            <a:r>
+              <a:rPr lang="en-US"/>
+              <a:t>Click to edit Master text styles</a:t>
+            </a:r>
+          </a:p>
+          <a:p>
+            <a:pPr lvl="1"/>
+            <a:r>
+              <a:rPr lang="en-US"/>
+              <a:t>Second level</a:t>
+            </a:r>
+          </a:p>
+          <a:p>
+            <a:pPr lvl="2"/>
+            <a:r>
+              <a:rPr lang="en-US"/>
+              <a:t>Third level</a:t>
+            </a:r>
+          </a:p>
+          <a:p>
+            <a:pPr lvl="3"/>
+            <a:r>
+              <a:rPr lang="en-US"/>
+              <a:t>Fourth level</a:t>
+            </a:r>
+          </a:p>
+          <a:p>
+            <a:pPr lvl="4"/>
+            <a:r>
+              <a:rPr lang="en-US"/>
+              <a:t>Fifth level</a:t>
+            </a:r>
+          </a:p>
+        </p:txBody>
+      </p:sp>
+      <p:sp>
+        <p:nvSpPr>
+          <p:cNvPr id="6" name="Footer Placeholder 5"/>
+          <p:cNvSpPr>
+            <a:spLocks noGrp="1"/>
+          </p:cNvSpPr>
+          <p:nvPr>
+            <p:ph type="ftr" sz="quarter" idx="4"/>
+          </p:nvPr>
+        </p:nvSpPr>
+        <p:spPr>
+          <a:xfrm>
+            <a:off x="0" y="8685213"/>
+            <a:ext cx="2971800" cy="458787"/>
+          </a:xfrm>
+          <a:prstGeom prst="rect">
+            <a:avLst/>
+          </a:prstGeom>
+        </p:spPr>
+        <p:txBody>
+          <a:bodyPr vert="horz" lIns="91440" tIns="45720" rIns="91440" bIns="45720" rtlCol="0" anchor="b"/>
+          <a:lstStyle>
+            <a:lvl1pPr algn="l">
+              <a:defRPr sz="1200"/>
+            </a:lvl1pPr>
+          </a:lstStyle>
+          <a:p>
+            <a:endParaRPr lang="en-US"/>
+          </a:p>
+        </p:txBody>
+      </p:sp>
+      <p:sp>
+        <p:nvSpPr>
+          <p:cNvPr id="7" name="Slide Number Placeholder 6"/>
+          <p:cNvSpPr>
+            <a:spLocks noGrp="1"/>
+          </p:cNvSpPr>
+          <p:nvPr>
+            <p:ph type="sldNum" sz="quarter" idx="5"/>
+          </p:nvPr>
+        </p:nvSpPr>
+        <p:spPr>
+          <a:xfrm>
+            <a:off x="3884613" y="8685213"/>
+            <a:ext cx="2971800" cy="458787"/>
+          </a:xfrm>
+          <a:prstGeom prst="rect">
+            <a:avLst/>
+          </a:prstGeom>
+        </p:spPr>
+        <p:txBody>
+          <a:bodyPr vert="horz" lIns="91440" tIns="45720" rIns="91440" bIns="45720" rtlCol="0" anchor="b"/>
+          <a:lstStyle>
+            <a:lvl1pPr algn="r">
+              <a:defRPr sz="1200"/>
+            </a:lvl1pPr>
+          </a:lstStyle>
+          <a:p>
+            <a:fld id="{01B7AB9F-F68F-EB40-AB1E-7E27BB726B65}" type="slidenum">
+              <a:t>‹#›</a:t>
+            </a:fld>
+            <a:endParaRPr lang="en-US"/>
+          </a:p>
+        </p:txBody>
+      </p:sp>
+    </p:spTree>
+    <p:extLst>
+      <p:ext uri="{BB962C8B-B14F-4D97-AF65-F5344CB8AC3E}">
+        <p14:creationId xmlns:p14="http://schemas.microsoft.com/office/powerpoint/2010/main" val="2031649062"/>
+      </p:ext>
+    </p:extLst>
+  </p:cSld>
+  <p:clrMap bg1="lt1" tx1="dk1" bg2="lt2" tx2="dk2" accent1="accent1" accent2="accent2" accent3="accent3" accent4="accent4" accent5="accent5" accent6="accent6" hlink="hlink" folHlink="folHlink"/>
+  <p:notesStyle>
+    <a:lvl1pPr marL="0" algn="l" defTabSz="914400" rtl="0" eaLnBrk="1" latinLnBrk="0" hangingPunct="1">
+      <a:defRPr sz="1200" kern="1200">
+        <a:solidFill>
+          <a:schemeClr val="tx1"/>
+        </a:solidFill>
+        <a:latin typeface="+mn-lt"/>
+        <a:ea typeface="+mn-ea"/>
+        <a:cs typeface="+mn-cs"/>
+      </a:defRPr>
+    </a:lvl1pPr>
+    <a:lvl2pPr marL="457200" algn="l" defTabSz="914400" rtl="0" eaLnBrk="1" latinLnBrk="0" hangingPunct="1">
+      <a:defRPr sz="1200" kern="1200">
+        <a:solidFill>
+          <a:schemeClr val="tx1"/>
+        </a:solidFill>
+        <a:latin typeface="+mn-lt"/>
+        <a:ea typeface="+mn-ea"/>
+        <a:cs typeface="+mn-cs"/>
+      </a:defRPr>
+    </a:lvl2pPr>
+    <a:lvl3pPr marL="914400" algn="l" defTabSz="914400" rtl="0" eaLnBrk="1" latinLnBrk="0" hangingPunct="1">
+      <a:defRPr sz="1200" kern="1200">
+        <a:solidFill>
+          <a:schemeClr val="tx1"/>
+        </a:solidFill>
+        <a:latin typeface="+mn-lt"/>
+        <a:ea typeface="+mn-ea"/>
+        <a:cs typeface="+mn-cs"/>
+      </a:defRPr>
+    </a:lvl3pPr>
+    <a:lvl4pPr marL="1371600" algn="l" defTabSz="914400" rtl="0" eaLnBrk="1" latinLnBrk="0" hangingPunct="1">
+      <a:defRPr sz="1200" kern="1200">
+        <a:solidFill>
+          <a:schemeClr val="tx1"/>
+        </a:solidFill>
+        <a:latin typeface="+mn-lt"/>
+        <a:ea typeface="+mn-ea"/>
+        <a:cs typeface="+mn-cs"/>
+      </a:defRPr>
+    </a:lvl4pPr>
+    <a:lvl5pPr marL="1828800" algn="l" defTabSz="914400" rtl="0" eaLnBrk="1" latinLnBrk="0" hangingPunct="1">
+      <a:defRPr sz="1200" kern="1200">
+        <a:solidFill>
+          <a:schemeClr val="tx1"/>
+        </a:solidFill>
+        <a:latin typeface="+mn-lt"/>
+        <a:ea typeface="+mn-ea"/>
+        <a:cs typeface="+mn-cs"/>
+      </a:defRPr>
+    </a:lvl5pPr>
+    <a:lvl6pPr marL="2286000" algn="l" defTabSz="914400" rtl="0" eaLnBrk="1" latinLnBrk="0" hangingPunct="1">
+      <a:defRPr sz="1200" kern="1200">
+        <a:solidFill>
+          <a:schemeClr val="tx1"/>
+        </a:solidFill>
+        <a:latin typeface="+mn-lt"/>
+        <a:ea typeface="+mn-ea"/>
+        <a:cs typeface="+mn-cs"/>
+      </a:defRPr>
+    </a:lvl6pPr>
+    <a:lvl7pPr marL="2743200" algn="l" defTabSz="914400" rtl="0" eaLnBrk="1" latinLnBrk="0" hangingPunct="1">
+      <a:defRPr sz="1200" kern="1200">
+        <a:solidFill>
+          <a:schemeClr val="tx1"/>
+        </a:solidFill>
+        <a:latin typeface="+mn-lt"/>
+        <a:ea typeface="+mn-ea"/>
+        <a:cs typeface="+mn-cs"/>
+      </a:defRPr>
+    </a:lvl7pPr>
+    <a:lvl8pPr marL="3200400" algn="l" defTabSz="914400" rtl="0" eaLnBrk="1" latinLnBrk="0" hangingPunct="1">
+      <a:defRPr sz="1200" kern="1200">
+        <a:solidFill>
+          <a:schemeClr val="tx1"/>
+        </a:solidFill>
+        <a:latin typeface="+mn-lt"/>
+        <a:ea typeface="+mn-ea"/>
+        <a:cs typeface="+mn-cs"/>
+      </a:defRPr>
+    </a:lvl8pPr>
+    <a:lvl9pPr marL="3657600" algn="l" defTabSz="914400" rtl="0" eaLnBrk="1" latinLnBrk="0" hangingPunct="1">
+      <a:defRPr sz="1200" kern="1200">
+        <a:solidFill>
+          <a:schemeClr val="tx1"/>
+        </a:solidFill>
+        <a:latin typeface="+mn-lt"/>
+        <a:ea typeface="+mn-ea"/>
+        <a:cs typeface="+mn-cs"/>
+      </a:defRPr>
+    </a:lvl9pPr>
+  </p:notesStyle>
+</p:notesMaster>
+</file>
+
+<file path=ppt/notesSlides/notesSlide1.xml><?xml version="1.0" encoding="utf-8"?>
+<p:notes xmlns:a="http://schemas.openxmlformats.org/drawingml/2006/main" xmlns:r="http://schemas.openxmlformats.org/officeDocument/2006/relationships" xmlns:p="http://schemas.openxmlformats.org/presentationml/2006/main">
+  <p:cSld>
+    <p:spTree>
+      <p:nvGrpSpPr>
+        <p:cNvPr id="1" name=""/>
+        <p:cNvGrpSpPr/>
+        <p:nvPr/>
+      </p:nvGrpSpPr>
+      <p:grpSpPr>
+        <a:xfrm>
+          <a:off x="0" y="0"/>
+          <a:ext cx="0" cy="0"/>
+          <a:chOff x="0" y="0"/>
+          <a:chExt cx="0" cy="0"/>
+        </a:xfrm>
+      </p:grpSpPr>
+      <p:sp>
+        <p:nvSpPr>
+          <p:cNvPr id="2" name="Slide Image Placeholder 1"/>
+          <p:cNvSpPr>
+            <a:spLocks noGrp="1" noRot="1" noChangeAspect="1"/>
+          </p:cNvSpPr>
+          <p:nvPr>
+            <p:ph type="sldImg"/>
+          </p:nvPr>
+        </p:nvSpPr>
+        <p:spPr/>
+      </p:sp>
+      <p:sp>
+        <p:nvSpPr>
+          <p:cNvPr id="3" name="Notes Placeholder 2"/>
+          <p:cNvSpPr>
+            <a:spLocks noGrp="1"/>
+          </p:cNvSpPr>
+          <p:nvPr>
+            <p:ph type="body" idx="1"/>
+          </p:nvPr>
+        </p:nvSpPr>
+        <p:spPr/>
+        <p:txBody>
+          <a:bodyPr/>
+          <a:lstStyle/>
+          <a:p>
+            <a:endParaRPr lang="en-US"/>
+          </a:p>
+        </p:txBody>
+      </p:sp>
+      <p:sp>
+        <p:nvSpPr>
+          <p:cNvPr id="4" name="Slide Number Placeholder 3"/>
+          <p:cNvSpPr>
+            <a:spLocks noGrp="1"/>
+          </p:cNvSpPr>
+          <p:nvPr>
+            <p:ph type="sldNum" sz="quarter" idx="5"/>
+          </p:nvPr>
+        </p:nvSpPr>
+        <p:spPr/>
+        <p:txBody>
+          <a:bodyPr/>
+          <a:lstStyle/>
+          <a:p>
+            <a:fld id="{01B7AB9F-F68F-EB40-AB1E-7E27BB726B65}" type="slidenum">
+              <a:t>2</a:t>
+            </a:fld>
+            <a:endParaRPr lang="en-US"/>
+          </a:p>
+        </p:txBody>
+      </p:sp>
+    </p:spTree>
+    <p:extLst>
+      <p:ext uri="{BB962C8B-B14F-4D97-AF65-F5344CB8AC3E}">
+        <p14:creationId xmlns:p14="http://schemas.microsoft.com/office/powerpoint/2010/main" val="2478432978"/>
+      </p:ext>
+    </p:extLst>
+  </p:cSld>
+  <p:clrMapOvr>
+    <a:masterClrMapping/>
+  </p:clrMapOvr>
+</p:notes>
+</file>
+
 <file path=ppt/slideLayouts/slideLayout1.xml><?xml version="1.0" encoding="utf-8"?>
 <p:sldLayout xmlns:a="http://schemas.openxmlformats.org/drawingml/2006/main" xmlns:r="http://schemas.openxmlformats.org/officeDocument/2006/relationships" xmlns:p="http://schemas.openxmlformats.org/presentationml/2006/main" type="title" preserve="1">
   <p:cSld name="Title Slide">
@@ -366,7 +800,7 @@
           <a:lstStyle/>
           <a:p>
             <a:fld id="{814779F6-DF54-A74A-B093-E4E0AB693425}" type="datetimeFigureOut">
-              <a:t>11/6/23</a:t>
+              <a:t>11/9/23</a:t>
             </a:fld>
             <a:endParaRPr lang="en-US"/>
           </a:p>
@@ -562,7 +996,7 @@
           <a:lstStyle/>
           <a:p>
             <a:fld id="{814779F6-DF54-A74A-B093-E4E0AB693425}" type="datetimeFigureOut">
-              <a:t>11/6/23</a:t>
+              <a:t>11/9/23</a:t>
             </a:fld>
             <a:endParaRPr lang="en-US"/>
           </a:p>
@@ -768,7 +1202,7 @@
           <a:lstStyle/>
           <a:p>
             <a:fld id="{814779F6-DF54-A74A-B093-E4E0AB693425}" type="datetimeFigureOut">
-              <a:t>11/6/23</a:t>
+              <a:t>11/9/23</a:t>
             </a:fld>
             <a:endParaRPr lang="en-US"/>
           </a:p>
@@ -964,7 +1398,7 @@
           <a:lstStyle/>
           <a:p>
             <a:fld id="{814779F6-DF54-A74A-B093-E4E0AB693425}" type="datetimeFigureOut">
-              <a:t>11/6/23</a:t>
+              <a:t>11/9/23</a:t>
             </a:fld>
             <a:endParaRPr lang="en-US"/>
           </a:p>
@@ -1237,7 +1671,7 @@
           <a:lstStyle/>
           <a:p>
             <a:fld id="{814779F6-DF54-A74A-B093-E4E0AB693425}" type="datetimeFigureOut">
-              <a:t>11/6/23</a:t>
+              <a:t>11/9/23</a:t>
             </a:fld>
             <a:endParaRPr lang="en-US"/>
           </a:p>
@@ -1500,7 +1934,7 @@
           <a:lstStyle/>
           <a:p>
             <a:fld id="{814779F6-DF54-A74A-B093-E4E0AB693425}" type="datetimeFigureOut">
-              <a:t>11/6/23</a:t>
+              <a:t>11/9/23</a:t>
             </a:fld>
             <a:endParaRPr lang="en-US"/>
           </a:p>
@@ -1910,7 +2344,7 @@
           <a:lstStyle/>
           <a:p>
             <a:fld id="{814779F6-DF54-A74A-B093-E4E0AB693425}" type="datetimeFigureOut">
-              <a:t>11/6/23</a:t>
+              <a:t>11/9/23</a:t>
             </a:fld>
             <a:endParaRPr lang="en-US"/>
           </a:p>
@@ -2049,7 +2483,7 @@
           <a:lstStyle/>
           <a:p>
             <a:fld id="{814779F6-DF54-A74A-B093-E4E0AB693425}" type="datetimeFigureOut">
-              <a:t>11/6/23</a:t>
+              <a:t>11/9/23</a:t>
             </a:fld>
             <a:endParaRPr lang="en-US"/>
           </a:p>
@@ -2160,7 +2594,7 @@
           <a:lstStyle/>
           <a:p>
             <a:fld id="{814779F6-DF54-A74A-B093-E4E0AB693425}" type="datetimeFigureOut">
-              <a:t>11/6/23</a:t>
+              <a:t>11/9/23</a:t>
             </a:fld>
             <a:endParaRPr lang="en-US"/>
           </a:p>
@@ -2469,7 +2903,7 @@
           <a:lstStyle/>
           <a:p>
             <a:fld id="{814779F6-DF54-A74A-B093-E4E0AB693425}" type="datetimeFigureOut">
-              <a:t>11/6/23</a:t>
+              <a:t>11/9/23</a:t>
             </a:fld>
             <a:endParaRPr lang="en-US"/>
           </a:p>
@@ -2755,7 +3189,7 @@
           <a:lstStyle/>
           <a:p>
             <a:fld id="{814779F6-DF54-A74A-B093-E4E0AB693425}" type="datetimeFigureOut">
-              <a:t>11/6/23</a:t>
+              <a:t>11/9/23</a:t>
             </a:fld>
             <a:endParaRPr lang="en-US"/>
           </a:p>
@@ -2994,7 +3428,7 @@
           </a:lstStyle>
           <a:p>
             <a:fld id="{814779F6-DF54-A74A-B093-E4E0AB693425}" type="datetimeFigureOut">
-              <a:t>11/6/23</a:t>
+              <a:t>11/9/23</a:t>
             </a:fld>
             <a:endParaRPr lang="en-US"/>
           </a:p>
@@ -3754,8 +4188,8 @@
           </a:p>
         </p:txBody>
       </p:sp>
-      <mc:AlternateContent xmlns:mc="http://schemas.openxmlformats.org/markup-compatibility/2006">
-        <mc:Choice xmlns:p14="http://schemas.microsoft.com/office/powerpoint/2010/main" Requires="p14">
+      <mc:AlternateContent xmlns:mc="http://schemas.openxmlformats.org/markup-compatibility/2006" xmlns:p14="http://schemas.microsoft.com/office/powerpoint/2010/main">
+        <mc:Choice Requires="p14">
           <p:contentPart p14:bwMode="auto" r:id="rId2">
             <p14:nvContentPartPr>
               <p14:cNvPr id="15" name="Ink 14">
@@ -3774,7 +4208,7 @@
             </p14:xfrm>
           </p:contentPart>
         </mc:Choice>
-        <mc:Fallback>
+        <mc:Fallback xmlns="">
           <p:pic>
             <p:nvPicPr>
               <p:cNvPr id="15" name="Ink 14">
@@ -4002,8 +4436,8 @@
             <a:chExt cx="578520" cy="1850040"/>
           </a:xfrm>
         </p:grpSpPr>
-        <mc:AlternateContent xmlns:mc="http://schemas.openxmlformats.org/markup-compatibility/2006">
-          <mc:Choice xmlns:p14="http://schemas.microsoft.com/office/powerpoint/2010/main" Requires="p14">
+        <mc:AlternateContent xmlns:mc="http://schemas.openxmlformats.org/markup-compatibility/2006" xmlns:p14="http://schemas.microsoft.com/office/powerpoint/2010/main">
+          <mc:Choice Requires="p14">
             <p:contentPart p14:bwMode="auto" r:id="rId4">
               <p14:nvContentPartPr>
                 <p14:cNvPr id="19" name="Ink 18">
@@ -4022,7 +4456,7 @@
               </p14:xfrm>
             </p:contentPart>
           </mc:Choice>
-          <mc:Fallback>
+          <mc:Fallback xmlns="">
             <p:pic>
               <p:nvPicPr>
                 <p:cNvPr id="19" name="Ink 18">
@@ -4053,8 +4487,8 @@
             </p:pic>
           </mc:Fallback>
         </mc:AlternateContent>
-        <mc:AlternateContent xmlns:mc="http://schemas.openxmlformats.org/markup-compatibility/2006">
-          <mc:Choice xmlns:p14="http://schemas.microsoft.com/office/powerpoint/2010/main" Requires="p14">
+        <mc:AlternateContent xmlns:mc="http://schemas.openxmlformats.org/markup-compatibility/2006" xmlns:p14="http://schemas.microsoft.com/office/powerpoint/2010/main">
+          <mc:Choice Requires="p14">
             <p:contentPart p14:bwMode="auto" r:id="rId6">
               <p14:nvContentPartPr>
                 <p14:cNvPr id="20" name="Ink 19">
@@ -4073,7 +4507,7 @@
               </p14:xfrm>
             </p:contentPart>
           </mc:Choice>
-          <mc:Fallback>
+          <mc:Fallback xmlns="">
             <p:pic>
               <p:nvPicPr>
                 <p:cNvPr id="20" name="Ink 19">
@@ -4105,8 +4539,8 @@
           </mc:Fallback>
         </mc:AlternateContent>
       </p:grpSp>
-      <mc:AlternateContent xmlns:mc="http://schemas.openxmlformats.org/markup-compatibility/2006">
-        <mc:Choice xmlns:p14="http://schemas.microsoft.com/office/powerpoint/2010/main" Requires="p14">
+      <mc:AlternateContent xmlns:mc="http://schemas.openxmlformats.org/markup-compatibility/2006" xmlns:p14="http://schemas.microsoft.com/office/powerpoint/2010/main">
+        <mc:Choice Requires="p14">
           <p:contentPart p14:bwMode="auto" r:id="rId8">
             <p14:nvContentPartPr>
               <p14:cNvPr id="22" name="Ink 21">
@@ -4125,7 +4559,7 @@
             </p14:xfrm>
           </p:contentPart>
         </mc:Choice>
-        <mc:Fallback>
+        <mc:Fallback xmlns="">
           <p:pic>
             <p:nvPicPr>
               <p:cNvPr id="22" name="Ink 21">
@@ -4160,6 +4594,1879 @@
     <p:extLst>
       <p:ext uri="{BB962C8B-B14F-4D97-AF65-F5344CB8AC3E}">
         <p14:creationId xmlns:p14="http://schemas.microsoft.com/office/powerpoint/2010/main" val="3561617039"/>
+      </p:ext>
+    </p:extLst>
+  </p:cSld>
+  <p:clrMapOvr>
+    <a:masterClrMapping/>
+  </p:clrMapOvr>
+</p:sld>
+</file>
+
+<file path=ppt/slides/slide2.xml><?xml version="1.0" encoding="utf-8"?>
+<p:sld xmlns:a="http://schemas.openxmlformats.org/drawingml/2006/main" xmlns:r="http://schemas.openxmlformats.org/officeDocument/2006/relationships" xmlns:p="http://schemas.openxmlformats.org/presentationml/2006/main">
+  <p:cSld>
+    <p:spTree>
+      <p:nvGrpSpPr>
+        <p:cNvPr id="1" name=""/>
+        <p:cNvGrpSpPr/>
+        <p:nvPr/>
+      </p:nvGrpSpPr>
+      <p:grpSpPr>
+        <a:xfrm>
+          <a:off x="0" y="0"/>
+          <a:ext cx="0" cy="0"/>
+          <a:chOff x="0" y="0"/>
+          <a:chExt cx="0" cy="0"/>
+        </a:xfrm>
+      </p:grpSpPr>
+      <p:sp>
+        <p:nvSpPr>
+          <p:cNvPr id="2" name="TextBox 1">
+            <a:extLst>
+              <a:ext uri="{FF2B5EF4-FFF2-40B4-BE49-F238E27FC236}">
+                <a16:creationId xmlns:a16="http://schemas.microsoft.com/office/drawing/2014/main" id="{EBEA3E00-2C1E-1FD4-6D92-AF6C1F07D949}"/>
+              </a:ext>
+            </a:extLst>
+          </p:cNvPr>
+          <p:cNvSpPr txBox="1"/>
+          <p:nvPr/>
+        </p:nvSpPr>
+        <p:spPr>
+          <a:xfrm>
+            <a:off x="2094411" y="0"/>
+            <a:ext cx="8003177" cy="523220"/>
+          </a:xfrm>
+          <a:prstGeom prst="rect">
+            <a:avLst/>
+          </a:prstGeom>
+          <a:noFill/>
+        </p:spPr>
+        <p:txBody>
+          <a:bodyPr wrap="square" rtlCol="0">
+            <a:spAutoFit/>
+          </a:bodyPr>
+          <a:lstStyle/>
+          <a:p>
+            <a:pPr algn="ctr"/>
+            <a:r>
+              <a:rPr lang="en-US" sz="1400"/>
+              <a:t>USX01: As someone who loves to do projects myself, I want a way to organize the costs so that I can make a guided decision regarding expenses.</a:t>
+            </a:r>
+          </a:p>
+        </p:txBody>
+      </p:sp>
+      <p:sp>
+        <p:nvSpPr>
+          <p:cNvPr id="3" name="Rectangle 2">
+            <a:extLst>
+              <a:ext uri="{FF2B5EF4-FFF2-40B4-BE49-F238E27FC236}">
+                <a16:creationId xmlns:a16="http://schemas.microsoft.com/office/drawing/2014/main" id="{B2E1DC27-AB21-8B54-E892-1AA96ECFDE35}"/>
+              </a:ext>
+            </a:extLst>
+          </p:cNvPr>
+          <p:cNvSpPr/>
+          <p:nvPr/>
+        </p:nvSpPr>
+        <p:spPr>
+          <a:xfrm>
+            <a:off x="0" y="523220"/>
+            <a:ext cx="1325971" cy="494492"/>
+          </a:xfrm>
+          <a:prstGeom prst="rect">
+            <a:avLst/>
+          </a:prstGeom>
+          <a:noFill/>
+          <a:ln w="38100">
+            <a:solidFill>
+              <a:schemeClr val="accent1"/>
+            </a:solidFill>
+          </a:ln>
+        </p:spPr>
+        <p:style>
+          <a:lnRef idx="2">
+            <a:schemeClr val="accent1">
+              <a:shade val="15000"/>
+            </a:schemeClr>
+          </a:lnRef>
+          <a:fillRef idx="1">
+            <a:schemeClr val="accent1"/>
+          </a:fillRef>
+          <a:effectRef idx="0">
+            <a:schemeClr val="accent1"/>
+          </a:effectRef>
+          <a:fontRef idx="minor">
+            <a:schemeClr val="lt1"/>
+          </a:fontRef>
+        </p:style>
+        <p:txBody>
+          <a:bodyPr rtlCol="0" anchor="ctr"/>
+          <a:lstStyle/>
+          <a:p>
+            <a:pPr algn="ctr"/>
+            <a:r>
+              <a:rPr lang="en-US" sz="1200">
+                <a:solidFill>
+                  <a:schemeClr val="tx1"/>
+                </a:solidFill>
+              </a:rPr>
+              <a:t>ApplicationView</a:t>
+            </a:r>
+          </a:p>
+        </p:txBody>
+      </p:sp>
+      <p:sp>
+        <p:nvSpPr>
+          <p:cNvPr id="4" name="Rectangle 3">
+            <a:extLst>
+              <a:ext uri="{FF2B5EF4-FFF2-40B4-BE49-F238E27FC236}">
+                <a16:creationId xmlns:a16="http://schemas.microsoft.com/office/drawing/2014/main" id="{0816C600-1A57-6126-2494-67817D31F143}"/>
+              </a:ext>
+            </a:extLst>
+          </p:cNvPr>
+          <p:cNvSpPr/>
+          <p:nvPr/>
+        </p:nvSpPr>
+        <p:spPr>
+          <a:xfrm>
+            <a:off x="1545772" y="523220"/>
+            <a:ext cx="1325971" cy="494492"/>
+          </a:xfrm>
+          <a:prstGeom prst="rect">
+            <a:avLst/>
+          </a:prstGeom>
+          <a:noFill/>
+          <a:ln w="38100">
+            <a:solidFill>
+              <a:schemeClr val="accent1"/>
+            </a:solidFill>
+          </a:ln>
+        </p:spPr>
+        <p:style>
+          <a:lnRef idx="2">
+            <a:schemeClr val="accent1">
+              <a:shade val="15000"/>
+            </a:schemeClr>
+          </a:lnRef>
+          <a:fillRef idx="1">
+            <a:schemeClr val="accent1"/>
+          </a:fillRef>
+          <a:effectRef idx="0">
+            <a:schemeClr val="accent1"/>
+          </a:effectRef>
+          <a:fontRef idx="minor">
+            <a:schemeClr val="lt1"/>
+          </a:fontRef>
+        </p:style>
+        <p:txBody>
+          <a:bodyPr rtlCol="0" anchor="ctr"/>
+          <a:lstStyle/>
+          <a:p>
+            <a:pPr algn="ctr"/>
+            <a:r>
+              <a:rPr lang="en-US" sz="1200">
+                <a:solidFill>
+                  <a:schemeClr val="tx1"/>
+                </a:solidFill>
+              </a:rPr>
+              <a:t>ProjectController</a:t>
+            </a:r>
+          </a:p>
+        </p:txBody>
+      </p:sp>
+      <p:sp>
+        <p:nvSpPr>
+          <p:cNvPr id="5" name="Rectangle 4">
+            <a:extLst>
+              <a:ext uri="{FF2B5EF4-FFF2-40B4-BE49-F238E27FC236}">
+                <a16:creationId xmlns:a16="http://schemas.microsoft.com/office/drawing/2014/main" id="{7BC51680-E948-C36F-C1AA-5D2957FB752D}"/>
+              </a:ext>
+            </a:extLst>
+          </p:cNvPr>
+          <p:cNvSpPr/>
+          <p:nvPr/>
+        </p:nvSpPr>
+        <p:spPr>
+          <a:xfrm>
+            <a:off x="4637313" y="523220"/>
+            <a:ext cx="1325971" cy="494492"/>
+          </a:xfrm>
+          <a:prstGeom prst="rect">
+            <a:avLst/>
+          </a:prstGeom>
+          <a:noFill/>
+          <a:ln w="38100">
+            <a:solidFill>
+              <a:schemeClr val="accent1"/>
+            </a:solidFill>
+          </a:ln>
+        </p:spPr>
+        <p:style>
+          <a:lnRef idx="2">
+            <a:schemeClr val="accent1">
+              <a:shade val="15000"/>
+            </a:schemeClr>
+          </a:lnRef>
+          <a:fillRef idx="1">
+            <a:schemeClr val="accent1"/>
+          </a:fillRef>
+          <a:effectRef idx="0">
+            <a:schemeClr val="accent1"/>
+          </a:effectRef>
+          <a:fontRef idx="minor">
+            <a:schemeClr val="lt1"/>
+          </a:fontRef>
+        </p:style>
+        <p:txBody>
+          <a:bodyPr rtlCol="0" anchor="ctr"/>
+          <a:lstStyle/>
+          <a:p>
+            <a:pPr algn="ctr"/>
+            <a:r>
+              <a:rPr lang="en-US" sz="1200">
+                <a:solidFill>
+                  <a:schemeClr val="tx1"/>
+                </a:solidFill>
+              </a:rPr>
+              <a:t>ProjectView</a:t>
+            </a:r>
+          </a:p>
+        </p:txBody>
+      </p:sp>
+      <p:sp>
+        <p:nvSpPr>
+          <p:cNvPr id="6" name="Rectangle 5">
+            <a:extLst>
+              <a:ext uri="{FF2B5EF4-FFF2-40B4-BE49-F238E27FC236}">
+                <a16:creationId xmlns:a16="http://schemas.microsoft.com/office/drawing/2014/main" id="{BCAB8685-902F-0BFF-F75D-030E2D3A404C}"/>
+              </a:ext>
+            </a:extLst>
+          </p:cNvPr>
+          <p:cNvSpPr/>
+          <p:nvPr/>
+        </p:nvSpPr>
+        <p:spPr>
+          <a:xfrm>
+            <a:off x="6183085" y="523220"/>
+            <a:ext cx="1325971" cy="494492"/>
+          </a:xfrm>
+          <a:prstGeom prst="rect">
+            <a:avLst/>
+          </a:prstGeom>
+          <a:noFill/>
+          <a:ln w="38100">
+            <a:solidFill>
+              <a:schemeClr val="accent1"/>
+            </a:solidFill>
+          </a:ln>
+        </p:spPr>
+        <p:style>
+          <a:lnRef idx="2">
+            <a:schemeClr val="accent1">
+              <a:shade val="15000"/>
+            </a:schemeClr>
+          </a:lnRef>
+          <a:fillRef idx="1">
+            <a:schemeClr val="accent1"/>
+          </a:fillRef>
+          <a:effectRef idx="0">
+            <a:schemeClr val="accent1"/>
+          </a:effectRef>
+          <a:fontRef idx="minor">
+            <a:schemeClr val="lt1"/>
+          </a:fontRef>
+        </p:style>
+        <p:txBody>
+          <a:bodyPr rtlCol="0" anchor="ctr"/>
+          <a:lstStyle/>
+          <a:p>
+            <a:pPr algn="ctr"/>
+            <a:r>
+              <a:rPr lang="en-US" sz="1200">
+                <a:solidFill>
+                  <a:schemeClr val="tx1"/>
+                </a:solidFill>
+              </a:rPr>
+              <a:t>BudgetView</a:t>
+            </a:r>
+          </a:p>
+        </p:txBody>
+      </p:sp>
+      <p:sp>
+        <p:nvSpPr>
+          <p:cNvPr id="7" name="Rectangle 6">
+            <a:extLst>
+              <a:ext uri="{FF2B5EF4-FFF2-40B4-BE49-F238E27FC236}">
+                <a16:creationId xmlns:a16="http://schemas.microsoft.com/office/drawing/2014/main" id="{CD1D4CA1-6BBB-94F9-43ED-D1A98C2DB13C}"/>
+              </a:ext>
+            </a:extLst>
+          </p:cNvPr>
+          <p:cNvSpPr/>
+          <p:nvPr/>
+        </p:nvSpPr>
+        <p:spPr>
+          <a:xfrm>
+            <a:off x="7728857" y="523220"/>
+            <a:ext cx="1325971" cy="494492"/>
+          </a:xfrm>
+          <a:prstGeom prst="rect">
+            <a:avLst/>
+          </a:prstGeom>
+          <a:noFill/>
+          <a:ln w="38100">
+            <a:solidFill>
+              <a:schemeClr val="accent1"/>
+            </a:solidFill>
+          </a:ln>
+        </p:spPr>
+        <p:style>
+          <a:lnRef idx="2">
+            <a:schemeClr val="accent1">
+              <a:shade val="15000"/>
+            </a:schemeClr>
+          </a:lnRef>
+          <a:fillRef idx="1">
+            <a:schemeClr val="accent1"/>
+          </a:fillRef>
+          <a:effectRef idx="0">
+            <a:schemeClr val="accent1"/>
+          </a:effectRef>
+          <a:fontRef idx="minor">
+            <a:schemeClr val="lt1"/>
+          </a:fontRef>
+        </p:style>
+        <p:txBody>
+          <a:bodyPr rtlCol="0" anchor="ctr"/>
+          <a:lstStyle/>
+          <a:p>
+            <a:pPr algn="ctr"/>
+            <a:r>
+              <a:rPr lang="en-US" sz="1200">
+                <a:solidFill>
+                  <a:schemeClr val="tx1"/>
+                </a:solidFill>
+              </a:rPr>
+              <a:t>BudgetController</a:t>
+            </a:r>
+          </a:p>
+        </p:txBody>
+      </p:sp>
+      <p:sp>
+        <p:nvSpPr>
+          <p:cNvPr id="8" name="Rectangle 7">
+            <a:extLst>
+              <a:ext uri="{FF2B5EF4-FFF2-40B4-BE49-F238E27FC236}">
+                <a16:creationId xmlns:a16="http://schemas.microsoft.com/office/drawing/2014/main" id="{B544BF9E-BE1B-965A-FDAF-87252A518D67}"/>
+              </a:ext>
+            </a:extLst>
+          </p:cNvPr>
+          <p:cNvSpPr/>
+          <p:nvPr/>
+        </p:nvSpPr>
+        <p:spPr>
+          <a:xfrm>
+            <a:off x="9301887" y="523220"/>
+            <a:ext cx="1325971" cy="494492"/>
+          </a:xfrm>
+          <a:prstGeom prst="rect">
+            <a:avLst/>
+          </a:prstGeom>
+          <a:noFill/>
+          <a:ln w="38100">
+            <a:solidFill>
+              <a:schemeClr val="accent1"/>
+            </a:solidFill>
+          </a:ln>
+        </p:spPr>
+        <p:style>
+          <a:lnRef idx="2">
+            <a:schemeClr val="accent1">
+              <a:shade val="15000"/>
+            </a:schemeClr>
+          </a:lnRef>
+          <a:fillRef idx="1">
+            <a:schemeClr val="accent1"/>
+          </a:fillRef>
+          <a:effectRef idx="0">
+            <a:schemeClr val="accent1"/>
+          </a:effectRef>
+          <a:fontRef idx="minor">
+            <a:schemeClr val="lt1"/>
+          </a:fontRef>
+        </p:style>
+        <p:txBody>
+          <a:bodyPr rtlCol="0" anchor="ctr"/>
+          <a:lstStyle/>
+          <a:p>
+            <a:pPr algn="ctr"/>
+            <a:r>
+              <a:rPr lang="en-US" sz="1200">
+                <a:solidFill>
+                  <a:schemeClr val="tx1"/>
+                </a:solidFill>
+              </a:rPr>
+              <a:t>Budget</a:t>
+            </a:r>
+          </a:p>
+        </p:txBody>
+      </p:sp>
+      <p:cxnSp>
+        <p:nvCxnSpPr>
+          <p:cNvPr id="10" name="Straight Connector 9">
+            <a:extLst>
+              <a:ext uri="{FF2B5EF4-FFF2-40B4-BE49-F238E27FC236}">
+                <a16:creationId xmlns:a16="http://schemas.microsoft.com/office/drawing/2014/main" id="{9A50B79C-EE4D-1A17-57A0-F0B87B63841F}"/>
+              </a:ext>
+            </a:extLst>
+          </p:cNvPr>
+          <p:cNvCxnSpPr>
+            <a:cxnSpLocks/>
+          </p:cNvCxnSpPr>
+          <p:nvPr/>
+        </p:nvCxnSpPr>
+        <p:spPr>
+          <a:xfrm>
+            <a:off x="662985" y="1367246"/>
+            <a:ext cx="1" cy="5490754"/>
+          </a:xfrm>
+          <a:prstGeom prst="line">
+            <a:avLst/>
+          </a:prstGeom>
+          <a:ln w="38100">
+            <a:prstDash val="dash"/>
+          </a:ln>
+        </p:spPr>
+        <p:style>
+          <a:lnRef idx="1">
+            <a:schemeClr val="accent1"/>
+          </a:lnRef>
+          <a:fillRef idx="0">
+            <a:schemeClr val="accent1"/>
+          </a:fillRef>
+          <a:effectRef idx="0">
+            <a:schemeClr val="accent1"/>
+          </a:effectRef>
+          <a:fontRef idx="minor">
+            <a:schemeClr val="tx1"/>
+          </a:fontRef>
+        </p:style>
+      </p:cxnSp>
+      <p:cxnSp>
+        <p:nvCxnSpPr>
+          <p:cNvPr id="13" name="Straight Connector 12">
+            <a:extLst>
+              <a:ext uri="{FF2B5EF4-FFF2-40B4-BE49-F238E27FC236}">
+                <a16:creationId xmlns:a16="http://schemas.microsoft.com/office/drawing/2014/main" id="{C18658D6-7771-A32A-068F-37D54C16FD8A}"/>
+              </a:ext>
+            </a:extLst>
+          </p:cNvPr>
+          <p:cNvCxnSpPr>
+            <a:cxnSpLocks/>
+          </p:cNvCxnSpPr>
+          <p:nvPr/>
+        </p:nvCxnSpPr>
+        <p:spPr>
+          <a:xfrm>
+            <a:off x="2208757" y="1367246"/>
+            <a:ext cx="1" cy="5490754"/>
+          </a:xfrm>
+          <a:prstGeom prst="line">
+            <a:avLst/>
+          </a:prstGeom>
+          <a:ln w="38100">
+            <a:prstDash val="dash"/>
+          </a:ln>
+        </p:spPr>
+        <p:style>
+          <a:lnRef idx="1">
+            <a:schemeClr val="accent1"/>
+          </a:lnRef>
+          <a:fillRef idx="0">
+            <a:schemeClr val="accent1"/>
+          </a:fillRef>
+          <a:effectRef idx="0">
+            <a:schemeClr val="accent1"/>
+          </a:effectRef>
+          <a:fontRef idx="minor">
+            <a:schemeClr val="tx1"/>
+          </a:fontRef>
+        </p:style>
+      </p:cxnSp>
+      <p:cxnSp>
+        <p:nvCxnSpPr>
+          <p:cNvPr id="14" name="Straight Connector 13">
+            <a:extLst>
+              <a:ext uri="{FF2B5EF4-FFF2-40B4-BE49-F238E27FC236}">
+                <a16:creationId xmlns:a16="http://schemas.microsoft.com/office/drawing/2014/main" id="{9B29D4B6-083E-7436-DFB1-B4BD81C61A86}"/>
+              </a:ext>
+            </a:extLst>
+          </p:cNvPr>
+          <p:cNvCxnSpPr>
+            <a:cxnSpLocks/>
+          </p:cNvCxnSpPr>
+          <p:nvPr/>
+        </p:nvCxnSpPr>
+        <p:spPr>
+          <a:xfrm>
+            <a:off x="5300298" y="1367246"/>
+            <a:ext cx="1" cy="5490754"/>
+          </a:xfrm>
+          <a:prstGeom prst="line">
+            <a:avLst/>
+          </a:prstGeom>
+          <a:ln w="38100">
+            <a:prstDash val="dash"/>
+          </a:ln>
+        </p:spPr>
+        <p:style>
+          <a:lnRef idx="1">
+            <a:schemeClr val="accent1"/>
+          </a:lnRef>
+          <a:fillRef idx="0">
+            <a:schemeClr val="accent1"/>
+          </a:fillRef>
+          <a:effectRef idx="0">
+            <a:schemeClr val="accent1"/>
+          </a:effectRef>
+          <a:fontRef idx="minor">
+            <a:schemeClr val="tx1"/>
+          </a:fontRef>
+        </p:style>
+      </p:cxnSp>
+      <p:cxnSp>
+        <p:nvCxnSpPr>
+          <p:cNvPr id="15" name="Straight Connector 14">
+            <a:extLst>
+              <a:ext uri="{FF2B5EF4-FFF2-40B4-BE49-F238E27FC236}">
+                <a16:creationId xmlns:a16="http://schemas.microsoft.com/office/drawing/2014/main" id="{B28628B0-0C41-AC2E-C548-538C7642A8D7}"/>
+              </a:ext>
+            </a:extLst>
+          </p:cNvPr>
+          <p:cNvCxnSpPr>
+            <a:cxnSpLocks/>
+          </p:cNvCxnSpPr>
+          <p:nvPr/>
+        </p:nvCxnSpPr>
+        <p:spPr>
+          <a:xfrm>
+            <a:off x="6846070" y="1367246"/>
+            <a:ext cx="1" cy="5490754"/>
+          </a:xfrm>
+          <a:prstGeom prst="line">
+            <a:avLst/>
+          </a:prstGeom>
+          <a:ln w="38100">
+            <a:prstDash val="dash"/>
+          </a:ln>
+        </p:spPr>
+        <p:style>
+          <a:lnRef idx="1">
+            <a:schemeClr val="accent1"/>
+          </a:lnRef>
+          <a:fillRef idx="0">
+            <a:schemeClr val="accent1"/>
+          </a:fillRef>
+          <a:effectRef idx="0">
+            <a:schemeClr val="accent1"/>
+          </a:effectRef>
+          <a:fontRef idx="minor">
+            <a:schemeClr val="tx1"/>
+          </a:fontRef>
+        </p:style>
+      </p:cxnSp>
+      <p:cxnSp>
+        <p:nvCxnSpPr>
+          <p:cNvPr id="16" name="Straight Connector 15">
+            <a:extLst>
+              <a:ext uri="{FF2B5EF4-FFF2-40B4-BE49-F238E27FC236}">
+                <a16:creationId xmlns:a16="http://schemas.microsoft.com/office/drawing/2014/main" id="{94152CFA-14F3-BA22-29B6-4920B18E1380}"/>
+              </a:ext>
+            </a:extLst>
+          </p:cNvPr>
+          <p:cNvCxnSpPr>
+            <a:cxnSpLocks/>
+          </p:cNvCxnSpPr>
+          <p:nvPr/>
+        </p:nvCxnSpPr>
+        <p:spPr>
+          <a:xfrm>
+            <a:off x="8391842" y="1367246"/>
+            <a:ext cx="1" cy="5490754"/>
+          </a:xfrm>
+          <a:prstGeom prst="line">
+            <a:avLst/>
+          </a:prstGeom>
+          <a:ln w="38100">
+            <a:prstDash val="dash"/>
+          </a:ln>
+        </p:spPr>
+        <p:style>
+          <a:lnRef idx="1">
+            <a:schemeClr val="accent1"/>
+          </a:lnRef>
+          <a:fillRef idx="0">
+            <a:schemeClr val="accent1"/>
+          </a:fillRef>
+          <a:effectRef idx="0">
+            <a:schemeClr val="accent1"/>
+          </a:effectRef>
+          <a:fontRef idx="minor">
+            <a:schemeClr val="tx1"/>
+          </a:fontRef>
+        </p:style>
+      </p:cxnSp>
+      <p:cxnSp>
+        <p:nvCxnSpPr>
+          <p:cNvPr id="17" name="Straight Connector 16">
+            <a:extLst>
+              <a:ext uri="{FF2B5EF4-FFF2-40B4-BE49-F238E27FC236}">
+                <a16:creationId xmlns:a16="http://schemas.microsoft.com/office/drawing/2014/main" id="{591F444D-AB1F-9B35-3F55-E93EBE8A1018}"/>
+              </a:ext>
+            </a:extLst>
+          </p:cNvPr>
+          <p:cNvCxnSpPr>
+            <a:cxnSpLocks/>
+          </p:cNvCxnSpPr>
+          <p:nvPr/>
+        </p:nvCxnSpPr>
+        <p:spPr>
+          <a:xfrm>
+            <a:off x="9964871" y="1367246"/>
+            <a:ext cx="1" cy="5490754"/>
+          </a:xfrm>
+          <a:prstGeom prst="line">
+            <a:avLst/>
+          </a:prstGeom>
+          <a:ln w="38100">
+            <a:prstDash val="dash"/>
+          </a:ln>
+        </p:spPr>
+        <p:style>
+          <a:lnRef idx="1">
+            <a:schemeClr val="accent1"/>
+          </a:lnRef>
+          <a:fillRef idx="0">
+            <a:schemeClr val="accent1"/>
+          </a:fillRef>
+          <a:effectRef idx="0">
+            <a:schemeClr val="accent1"/>
+          </a:effectRef>
+          <a:fontRef idx="minor">
+            <a:schemeClr val="tx1"/>
+          </a:fontRef>
+        </p:style>
+      </p:cxnSp>
+      <p:sp>
+        <p:nvSpPr>
+          <p:cNvPr id="19" name="Rectangle 18">
+            <a:extLst>
+              <a:ext uri="{FF2B5EF4-FFF2-40B4-BE49-F238E27FC236}">
+                <a16:creationId xmlns:a16="http://schemas.microsoft.com/office/drawing/2014/main" id="{9A4E3029-9733-0F03-3CE8-E9101C934F7C}"/>
+              </a:ext>
+            </a:extLst>
+          </p:cNvPr>
+          <p:cNvSpPr/>
+          <p:nvPr/>
+        </p:nvSpPr>
+        <p:spPr>
+          <a:xfrm>
+            <a:off x="3091543" y="523220"/>
+            <a:ext cx="1325971" cy="494492"/>
+          </a:xfrm>
+          <a:prstGeom prst="rect">
+            <a:avLst/>
+          </a:prstGeom>
+          <a:noFill/>
+          <a:ln w="38100">
+            <a:solidFill>
+              <a:schemeClr val="accent1"/>
+            </a:solidFill>
+          </a:ln>
+        </p:spPr>
+        <p:style>
+          <a:lnRef idx="2">
+            <a:schemeClr val="accent1">
+              <a:shade val="15000"/>
+            </a:schemeClr>
+          </a:lnRef>
+          <a:fillRef idx="1">
+            <a:schemeClr val="accent1"/>
+          </a:fillRef>
+          <a:effectRef idx="0">
+            <a:schemeClr val="accent1"/>
+          </a:effectRef>
+          <a:fontRef idx="minor">
+            <a:schemeClr val="lt1"/>
+          </a:fontRef>
+        </p:style>
+        <p:txBody>
+          <a:bodyPr rtlCol="0" anchor="ctr"/>
+          <a:lstStyle/>
+          <a:p>
+            <a:pPr algn="ctr"/>
+            <a:r>
+              <a:rPr lang="en-US" sz="1200">
+                <a:solidFill>
+                  <a:schemeClr val="tx1"/>
+                </a:solidFill>
+              </a:rPr>
+              <a:t>Project</a:t>
+            </a:r>
+          </a:p>
+          <a:p>
+            <a:pPr algn="ctr"/>
+            <a:r>
+              <a:rPr lang="en-US" sz="1200">
+                <a:solidFill>
+                  <a:schemeClr val="tx1"/>
+                </a:solidFill>
+              </a:rPr>
+              <a:t>(LinkedList Node)</a:t>
+            </a:r>
+          </a:p>
+        </p:txBody>
+      </p:sp>
+      <p:cxnSp>
+        <p:nvCxnSpPr>
+          <p:cNvPr id="20" name="Straight Connector 19">
+            <a:extLst>
+              <a:ext uri="{FF2B5EF4-FFF2-40B4-BE49-F238E27FC236}">
+                <a16:creationId xmlns:a16="http://schemas.microsoft.com/office/drawing/2014/main" id="{31FFCC4A-3D1B-84B5-5C51-D18A3E811358}"/>
+              </a:ext>
+            </a:extLst>
+          </p:cNvPr>
+          <p:cNvCxnSpPr>
+            <a:cxnSpLocks/>
+          </p:cNvCxnSpPr>
+          <p:nvPr/>
+        </p:nvCxnSpPr>
+        <p:spPr>
+          <a:xfrm>
+            <a:off x="3754528" y="1367246"/>
+            <a:ext cx="1" cy="5490754"/>
+          </a:xfrm>
+          <a:prstGeom prst="line">
+            <a:avLst/>
+          </a:prstGeom>
+          <a:ln w="38100">
+            <a:prstDash val="dash"/>
+          </a:ln>
+        </p:spPr>
+        <p:style>
+          <a:lnRef idx="1">
+            <a:schemeClr val="accent1"/>
+          </a:lnRef>
+          <a:fillRef idx="0">
+            <a:schemeClr val="accent1"/>
+          </a:fillRef>
+          <a:effectRef idx="0">
+            <a:schemeClr val="accent1"/>
+          </a:effectRef>
+          <a:fontRef idx="minor">
+            <a:schemeClr val="tx1"/>
+          </a:fontRef>
+        </p:style>
+      </p:cxnSp>
+      <p:cxnSp>
+        <p:nvCxnSpPr>
+          <p:cNvPr id="22" name="Straight Arrow Connector 21">
+            <a:extLst>
+              <a:ext uri="{FF2B5EF4-FFF2-40B4-BE49-F238E27FC236}">
+                <a16:creationId xmlns:a16="http://schemas.microsoft.com/office/drawing/2014/main" id="{9770C1FB-52E8-EC2C-3A0C-7B7CF907C22A}"/>
+              </a:ext>
+            </a:extLst>
+          </p:cNvPr>
+          <p:cNvCxnSpPr/>
+          <p:nvPr/>
+        </p:nvCxnSpPr>
+        <p:spPr>
+          <a:xfrm>
+            <a:off x="662985" y="1872343"/>
+            <a:ext cx="1545772" cy="0"/>
+          </a:xfrm>
+          <a:prstGeom prst="straightConnector1">
+            <a:avLst/>
+          </a:prstGeom>
+          <a:ln w="38100">
+            <a:tailEnd type="triangle"/>
+          </a:ln>
+        </p:spPr>
+        <p:style>
+          <a:lnRef idx="1">
+            <a:schemeClr val="accent1"/>
+          </a:lnRef>
+          <a:fillRef idx="0">
+            <a:schemeClr val="accent1"/>
+          </a:fillRef>
+          <a:effectRef idx="0">
+            <a:schemeClr val="accent1"/>
+          </a:effectRef>
+          <a:fontRef idx="minor">
+            <a:schemeClr val="tx1"/>
+          </a:fontRef>
+        </p:style>
+      </p:cxnSp>
+      <p:sp>
+        <p:nvSpPr>
+          <p:cNvPr id="24" name="TextBox 23">
+            <a:extLst>
+              <a:ext uri="{FF2B5EF4-FFF2-40B4-BE49-F238E27FC236}">
+                <a16:creationId xmlns:a16="http://schemas.microsoft.com/office/drawing/2014/main" id="{323FF782-4104-DD2A-B2AB-FAEC0DAAC6E7}"/>
+              </a:ext>
+            </a:extLst>
+          </p:cNvPr>
+          <p:cNvSpPr txBox="1"/>
+          <p:nvPr/>
+        </p:nvSpPr>
+        <p:spPr>
+          <a:xfrm>
+            <a:off x="690248" y="1595344"/>
+            <a:ext cx="1213217" cy="276999"/>
+          </a:xfrm>
+          <a:prstGeom prst="rect">
+            <a:avLst/>
+          </a:prstGeom>
+          <a:noFill/>
+        </p:spPr>
+        <p:txBody>
+          <a:bodyPr wrap="none" rtlCol="0">
+            <a:spAutoFit/>
+          </a:bodyPr>
+          <a:lstStyle/>
+          <a:p>
+            <a:r>
+              <a:rPr lang="en-US" sz="1200"/>
+              <a:t>displayProjects()</a:t>
+            </a:r>
+          </a:p>
+        </p:txBody>
+      </p:sp>
+      <p:cxnSp>
+        <p:nvCxnSpPr>
+          <p:cNvPr id="25" name="Straight Arrow Connector 24">
+            <a:extLst>
+              <a:ext uri="{FF2B5EF4-FFF2-40B4-BE49-F238E27FC236}">
+                <a16:creationId xmlns:a16="http://schemas.microsoft.com/office/drawing/2014/main" id="{17B903B2-CE59-F5AD-ADE0-EC5BF75D6667}"/>
+              </a:ext>
+            </a:extLst>
+          </p:cNvPr>
+          <p:cNvCxnSpPr/>
+          <p:nvPr/>
+        </p:nvCxnSpPr>
+        <p:spPr>
+          <a:xfrm>
+            <a:off x="2207619" y="2196389"/>
+            <a:ext cx="1545772" cy="0"/>
+          </a:xfrm>
+          <a:prstGeom prst="straightConnector1">
+            <a:avLst/>
+          </a:prstGeom>
+          <a:ln w="38100">
+            <a:tailEnd type="triangle"/>
+          </a:ln>
+        </p:spPr>
+        <p:style>
+          <a:lnRef idx="1">
+            <a:schemeClr val="accent1"/>
+          </a:lnRef>
+          <a:fillRef idx="0">
+            <a:schemeClr val="accent1"/>
+          </a:fillRef>
+          <a:effectRef idx="0">
+            <a:schemeClr val="accent1"/>
+          </a:effectRef>
+          <a:fontRef idx="minor">
+            <a:schemeClr val="tx1"/>
+          </a:fontRef>
+        </p:style>
+      </p:cxnSp>
+      <p:sp>
+        <p:nvSpPr>
+          <p:cNvPr id="26" name="TextBox 25">
+            <a:extLst>
+              <a:ext uri="{FF2B5EF4-FFF2-40B4-BE49-F238E27FC236}">
+                <a16:creationId xmlns:a16="http://schemas.microsoft.com/office/drawing/2014/main" id="{1F9534FE-41C9-7F5E-E9BB-721D6EDDF448}"/>
+              </a:ext>
+            </a:extLst>
+          </p:cNvPr>
+          <p:cNvSpPr txBox="1"/>
+          <p:nvPr/>
+        </p:nvSpPr>
+        <p:spPr>
+          <a:xfrm>
+            <a:off x="2208755" y="1919390"/>
+            <a:ext cx="919034" cy="276999"/>
+          </a:xfrm>
+          <a:prstGeom prst="rect">
+            <a:avLst/>
+          </a:prstGeom>
+          <a:noFill/>
+        </p:spPr>
+        <p:txBody>
+          <a:bodyPr wrap="none" rtlCol="0">
+            <a:spAutoFit/>
+          </a:bodyPr>
+          <a:lstStyle/>
+          <a:p>
+            <a:r>
+              <a:rPr lang="en-US" sz="1200"/>
+              <a:t>getProject()</a:t>
+            </a:r>
+          </a:p>
+        </p:txBody>
+      </p:sp>
+      <p:cxnSp>
+        <p:nvCxnSpPr>
+          <p:cNvPr id="27" name="Straight Arrow Connector 26">
+            <a:extLst>
+              <a:ext uri="{FF2B5EF4-FFF2-40B4-BE49-F238E27FC236}">
+                <a16:creationId xmlns:a16="http://schemas.microsoft.com/office/drawing/2014/main" id="{F11E677F-956F-9DD2-CC4C-3B9DFA9BDFF8}"/>
+              </a:ext>
+            </a:extLst>
+          </p:cNvPr>
+          <p:cNvCxnSpPr/>
+          <p:nvPr/>
+        </p:nvCxnSpPr>
+        <p:spPr>
+          <a:xfrm>
+            <a:off x="2202319" y="2545923"/>
+            <a:ext cx="1545772" cy="0"/>
+          </a:xfrm>
+          <a:prstGeom prst="straightConnector1">
+            <a:avLst/>
+          </a:prstGeom>
+          <a:ln w="38100">
+            <a:prstDash val="dash"/>
+            <a:headEnd type="triangle"/>
+            <a:tailEnd type="none"/>
+          </a:ln>
+        </p:spPr>
+        <p:style>
+          <a:lnRef idx="1">
+            <a:schemeClr val="accent1"/>
+          </a:lnRef>
+          <a:fillRef idx="0">
+            <a:schemeClr val="accent1"/>
+          </a:fillRef>
+          <a:effectRef idx="0">
+            <a:schemeClr val="accent1"/>
+          </a:effectRef>
+          <a:fontRef idx="minor">
+            <a:schemeClr val="tx1"/>
+          </a:fontRef>
+        </p:style>
+      </p:cxnSp>
+      <p:sp>
+        <p:nvSpPr>
+          <p:cNvPr id="28" name="TextBox 27">
+            <a:extLst>
+              <a:ext uri="{FF2B5EF4-FFF2-40B4-BE49-F238E27FC236}">
+                <a16:creationId xmlns:a16="http://schemas.microsoft.com/office/drawing/2014/main" id="{DEB56BA3-74F0-52D4-AC57-804F93439A72}"/>
+              </a:ext>
+            </a:extLst>
+          </p:cNvPr>
+          <p:cNvSpPr txBox="1"/>
+          <p:nvPr/>
+        </p:nvSpPr>
+        <p:spPr>
+          <a:xfrm>
+            <a:off x="2829056" y="2268924"/>
+            <a:ext cx="919034" cy="276999"/>
+          </a:xfrm>
+          <a:prstGeom prst="rect">
+            <a:avLst/>
+          </a:prstGeom>
+          <a:noFill/>
+        </p:spPr>
+        <p:txBody>
+          <a:bodyPr wrap="none" rtlCol="0">
+            <a:spAutoFit/>
+          </a:bodyPr>
+          <a:lstStyle/>
+          <a:p>
+            <a:pPr algn="r"/>
+            <a:r>
+              <a:rPr lang="en-US" sz="1200"/>
+              <a:t>getProject()</a:t>
+            </a:r>
+          </a:p>
+        </p:txBody>
+      </p:sp>
+      <p:cxnSp>
+        <p:nvCxnSpPr>
+          <p:cNvPr id="29" name="Straight Arrow Connector 28">
+            <a:extLst>
+              <a:ext uri="{FF2B5EF4-FFF2-40B4-BE49-F238E27FC236}">
+                <a16:creationId xmlns:a16="http://schemas.microsoft.com/office/drawing/2014/main" id="{FE07BC42-1133-6272-4A86-24AA7A2BE3F0}"/>
+              </a:ext>
+            </a:extLst>
+          </p:cNvPr>
+          <p:cNvCxnSpPr/>
+          <p:nvPr/>
+        </p:nvCxnSpPr>
+        <p:spPr>
+          <a:xfrm>
+            <a:off x="668288" y="2929802"/>
+            <a:ext cx="1545772" cy="0"/>
+          </a:xfrm>
+          <a:prstGeom prst="straightConnector1">
+            <a:avLst/>
+          </a:prstGeom>
+          <a:ln w="38100">
+            <a:tailEnd type="triangle"/>
+          </a:ln>
+        </p:spPr>
+        <p:style>
+          <a:lnRef idx="1">
+            <a:schemeClr val="accent1"/>
+          </a:lnRef>
+          <a:fillRef idx="0">
+            <a:schemeClr val="accent1"/>
+          </a:fillRef>
+          <a:effectRef idx="0">
+            <a:schemeClr val="accent1"/>
+          </a:effectRef>
+          <a:fontRef idx="minor">
+            <a:schemeClr val="tx1"/>
+          </a:fontRef>
+        </p:style>
+      </p:cxnSp>
+      <p:sp>
+        <p:nvSpPr>
+          <p:cNvPr id="30" name="TextBox 29">
+            <a:extLst>
+              <a:ext uri="{FF2B5EF4-FFF2-40B4-BE49-F238E27FC236}">
+                <a16:creationId xmlns:a16="http://schemas.microsoft.com/office/drawing/2014/main" id="{3FE2AE8F-8237-0622-0F64-07DC40B5CA2D}"/>
+              </a:ext>
+            </a:extLst>
+          </p:cNvPr>
+          <p:cNvSpPr txBox="1"/>
+          <p:nvPr/>
+        </p:nvSpPr>
+        <p:spPr>
+          <a:xfrm>
+            <a:off x="690248" y="2652803"/>
+            <a:ext cx="1087862" cy="276999"/>
+          </a:xfrm>
+          <a:prstGeom prst="rect">
+            <a:avLst/>
+          </a:prstGeom>
+          <a:noFill/>
+        </p:spPr>
+        <p:txBody>
+          <a:bodyPr wrap="none" rtlCol="0">
+            <a:spAutoFit/>
+          </a:bodyPr>
+          <a:lstStyle/>
+          <a:p>
+            <a:r>
+              <a:rPr lang="en-US" sz="1200"/>
+              <a:t>selectProject()</a:t>
+            </a:r>
+          </a:p>
+        </p:txBody>
+      </p:sp>
+      <p:cxnSp>
+        <p:nvCxnSpPr>
+          <p:cNvPr id="31" name="Straight Arrow Connector 30">
+            <a:extLst>
+              <a:ext uri="{FF2B5EF4-FFF2-40B4-BE49-F238E27FC236}">
+                <a16:creationId xmlns:a16="http://schemas.microsoft.com/office/drawing/2014/main" id="{6FCA5939-4CE9-F54A-DEE1-4D5CDC37F998}"/>
+              </a:ext>
+            </a:extLst>
+          </p:cNvPr>
+          <p:cNvCxnSpPr>
+            <a:cxnSpLocks/>
+          </p:cNvCxnSpPr>
+          <p:nvPr/>
+        </p:nvCxnSpPr>
+        <p:spPr>
+          <a:xfrm>
+            <a:off x="669426" y="3350337"/>
+            <a:ext cx="1539329" cy="0"/>
+          </a:xfrm>
+          <a:prstGeom prst="straightConnector1">
+            <a:avLst/>
+          </a:prstGeom>
+          <a:ln w="38100">
+            <a:tailEnd type="triangle"/>
+          </a:ln>
+        </p:spPr>
+        <p:style>
+          <a:lnRef idx="1">
+            <a:schemeClr val="accent1"/>
+          </a:lnRef>
+          <a:fillRef idx="0">
+            <a:schemeClr val="accent1"/>
+          </a:fillRef>
+          <a:effectRef idx="0">
+            <a:schemeClr val="accent1"/>
+          </a:effectRef>
+          <a:fontRef idx="minor">
+            <a:schemeClr val="tx1"/>
+          </a:fontRef>
+        </p:style>
+      </p:cxnSp>
+      <p:sp>
+        <p:nvSpPr>
+          <p:cNvPr id="32" name="TextBox 31">
+            <a:extLst>
+              <a:ext uri="{FF2B5EF4-FFF2-40B4-BE49-F238E27FC236}">
+                <a16:creationId xmlns:a16="http://schemas.microsoft.com/office/drawing/2014/main" id="{474E4AC8-20E6-4300-FC2D-7CCA734085A8}"/>
+              </a:ext>
+            </a:extLst>
+          </p:cNvPr>
+          <p:cNvSpPr txBox="1"/>
+          <p:nvPr/>
+        </p:nvSpPr>
+        <p:spPr>
+          <a:xfrm>
+            <a:off x="691386" y="3073338"/>
+            <a:ext cx="1460913" cy="276999"/>
+          </a:xfrm>
+          <a:prstGeom prst="rect">
+            <a:avLst/>
+          </a:prstGeom>
+          <a:noFill/>
+        </p:spPr>
+        <p:txBody>
+          <a:bodyPr wrap="none" rtlCol="0">
+            <a:spAutoFit/>
+          </a:bodyPr>
+          <a:lstStyle/>
+          <a:p>
+            <a:r>
+              <a:rPr lang="en-US" sz="1200"/>
+              <a:t>displayProjectView()</a:t>
+            </a:r>
+          </a:p>
+        </p:txBody>
+      </p:sp>
+      <p:cxnSp>
+        <p:nvCxnSpPr>
+          <p:cNvPr id="37" name="Straight Arrow Connector 36">
+            <a:extLst>
+              <a:ext uri="{FF2B5EF4-FFF2-40B4-BE49-F238E27FC236}">
+                <a16:creationId xmlns:a16="http://schemas.microsoft.com/office/drawing/2014/main" id="{5CEE47E0-4F02-9D5F-3F4C-69474ECB9725}"/>
+              </a:ext>
+            </a:extLst>
+          </p:cNvPr>
+          <p:cNvCxnSpPr>
+            <a:cxnSpLocks/>
+          </p:cNvCxnSpPr>
+          <p:nvPr/>
+        </p:nvCxnSpPr>
+        <p:spPr>
+          <a:xfrm>
+            <a:off x="2208755" y="3350337"/>
+            <a:ext cx="3086242" cy="0"/>
+          </a:xfrm>
+          <a:prstGeom prst="straightConnector1">
+            <a:avLst/>
+          </a:prstGeom>
+          <a:ln w="38100">
+            <a:tailEnd type="triangle"/>
+          </a:ln>
+        </p:spPr>
+        <p:style>
+          <a:lnRef idx="1">
+            <a:schemeClr val="accent1"/>
+          </a:lnRef>
+          <a:fillRef idx="0">
+            <a:schemeClr val="accent1"/>
+          </a:fillRef>
+          <a:effectRef idx="0">
+            <a:schemeClr val="accent1"/>
+          </a:effectRef>
+          <a:fontRef idx="minor">
+            <a:schemeClr val="tx1"/>
+          </a:fontRef>
+        </p:style>
+      </p:cxnSp>
+      <p:sp>
+        <p:nvSpPr>
+          <p:cNvPr id="38" name="TextBox 37">
+            <a:extLst>
+              <a:ext uri="{FF2B5EF4-FFF2-40B4-BE49-F238E27FC236}">
+                <a16:creationId xmlns:a16="http://schemas.microsoft.com/office/drawing/2014/main" id="{38C2E777-F88E-CB5D-B3F5-A6E074C30C93}"/>
+              </a:ext>
+            </a:extLst>
+          </p:cNvPr>
+          <p:cNvSpPr txBox="1"/>
+          <p:nvPr/>
+        </p:nvSpPr>
+        <p:spPr>
+          <a:xfrm>
+            <a:off x="2253446" y="3073338"/>
+            <a:ext cx="1460907" cy="276999"/>
+          </a:xfrm>
+          <a:prstGeom prst="rect">
+            <a:avLst/>
+          </a:prstGeom>
+          <a:noFill/>
+        </p:spPr>
+        <p:txBody>
+          <a:bodyPr wrap="square" rtlCol="0">
+            <a:spAutoFit/>
+          </a:bodyPr>
+          <a:lstStyle/>
+          <a:p>
+            <a:r>
+              <a:rPr lang="en-US" sz="1200"/>
+              <a:t>displayProjectView()</a:t>
+            </a:r>
+          </a:p>
+        </p:txBody>
+      </p:sp>
+      <p:cxnSp>
+        <p:nvCxnSpPr>
+          <p:cNvPr id="40" name="Straight Arrow Connector 39">
+            <a:extLst>
+              <a:ext uri="{FF2B5EF4-FFF2-40B4-BE49-F238E27FC236}">
+                <a16:creationId xmlns:a16="http://schemas.microsoft.com/office/drawing/2014/main" id="{DFFB0CEE-9BA7-14B2-CA02-1F3C070B9249}"/>
+              </a:ext>
+            </a:extLst>
+          </p:cNvPr>
+          <p:cNvCxnSpPr>
+            <a:cxnSpLocks/>
+          </p:cNvCxnSpPr>
+          <p:nvPr/>
+        </p:nvCxnSpPr>
+        <p:spPr>
+          <a:xfrm>
+            <a:off x="5305597" y="3705999"/>
+            <a:ext cx="1539329" cy="0"/>
+          </a:xfrm>
+          <a:prstGeom prst="straightConnector1">
+            <a:avLst/>
+          </a:prstGeom>
+          <a:ln w="38100">
+            <a:tailEnd type="triangle"/>
+          </a:ln>
+        </p:spPr>
+        <p:style>
+          <a:lnRef idx="1">
+            <a:schemeClr val="accent1"/>
+          </a:lnRef>
+          <a:fillRef idx="0">
+            <a:schemeClr val="accent1"/>
+          </a:fillRef>
+          <a:effectRef idx="0">
+            <a:schemeClr val="accent1"/>
+          </a:effectRef>
+          <a:fontRef idx="minor">
+            <a:schemeClr val="tx1"/>
+          </a:fontRef>
+        </p:style>
+      </p:cxnSp>
+      <p:sp>
+        <p:nvSpPr>
+          <p:cNvPr id="41" name="TextBox 40">
+            <a:extLst>
+              <a:ext uri="{FF2B5EF4-FFF2-40B4-BE49-F238E27FC236}">
+                <a16:creationId xmlns:a16="http://schemas.microsoft.com/office/drawing/2014/main" id="{B76C3523-7AB2-EF97-FEF8-904DF6E55872}"/>
+              </a:ext>
+            </a:extLst>
+          </p:cNvPr>
+          <p:cNvSpPr txBox="1"/>
+          <p:nvPr/>
+        </p:nvSpPr>
+        <p:spPr>
+          <a:xfrm>
+            <a:off x="5327558" y="3464281"/>
+            <a:ext cx="1491256" cy="230832"/>
+          </a:xfrm>
+          <a:prstGeom prst="rect">
+            <a:avLst/>
+          </a:prstGeom>
+          <a:noFill/>
+        </p:spPr>
+        <p:txBody>
+          <a:bodyPr wrap="square" rtlCol="0">
+            <a:spAutoFit/>
+          </a:bodyPr>
+          <a:lstStyle/>
+          <a:p>
+            <a:r>
+              <a:rPr lang="en-US" sz="900"/>
+              <a:t>displayBudgetView(Project)</a:t>
+            </a:r>
+          </a:p>
+        </p:txBody>
+      </p:sp>
+      <p:cxnSp>
+        <p:nvCxnSpPr>
+          <p:cNvPr id="45" name="Straight Arrow Connector 44">
+            <a:extLst>
+              <a:ext uri="{FF2B5EF4-FFF2-40B4-BE49-F238E27FC236}">
+                <a16:creationId xmlns:a16="http://schemas.microsoft.com/office/drawing/2014/main" id="{2FF5D4A1-6396-506A-A8EE-BBC0E58BD81F}"/>
+              </a:ext>
+            </a:extLst>
+          </p:cNvPr>
+          <p:cNvCxnSpPr>
+            <a:cxnSpLocks/>
+          </p:cNvCxnSpPr>
+          <p:nvPr/>
+        </p:nvCxnSpPr>
+        <p:spPr>
+          <a:xfrm>
+            <a:off x="6842623" y="5075390"/>
+            <a:ext cx="1539329" cy="0"/>
+          </a:xfrm>
+          <a:prstGeom prst="straightConnector1">
+            <a:avLst/>
+          </a:prstGeom>
+          <a:ln w="38100">
+            <a:tailEnd type="triangle"/>
+          </a:ln>
+        </p:spPr>
+        <p:style>
+          <a:lnRef idx="1">
+            <a:schemeClr val="accent1"/>
+          </a:lnRef>
+          <a:fillRef idx="0">
+            <a:schemeClr val="accent1"/>
+          </a:fillRef>
+          <a:effectRef idx="0">
+            <a:schemeClr val="accent1"/>
+          </a:effectRef>
+          <a:fontRef idx="minor">
+            <a:schemeClr val="tx1"/>
+          </a:fontRef>
+        </p:style>
+      </p:cxnSp>
+      <p:sp>
+        <p:nvSpPr>
+          <p:cNvPr id="46" name="TextBox 45">
+            <a:extLst>
+              <a:ext uri="{FF2B5EF4-FFF2-40B4-BE49-F238E27FC236}">
+                <a16:creationId xmlns:a16="http://schemas.microsoft.com/office/drawing/2014/main" id="{5C5C9326-1477-B5D7-499B-3EBCE5557DCD}"/>
+              </a:ext>
+            </a:extLst>
+          </p:cNvPr>
+          <p:cNvSpPr txBox="1"/>
+          <p:nvPr/>
+        </p:nvSpPr>
+        <p:spPr>
+          <a:xfrm>
+            <a:off x="6864583" y="4798391"/>
+            <a:ext cx="1508746" cy="246221"/>
+          </a:xfrm>
+          <a:prstGeom prst="rect">
+            <a:avLst/>
+          </a:prstGeom>
+          <a:noFill/>
+        </p:spPr>
+        <p:txBody>
+          <a:bodyPr wrap="none" rtlCol="0">
+            <a:spAutoFit/>
+          </a:bodyPr>
+          <a:lstStyle/>
+          <a:p>
+            <a:r>
+              <a:rPr lang="en-US" sz="1000"/>
+              <a:t>addNewItem(cost, name)</a:t>
+            </a:r>
+          </a:p>
+        </p:txBody>
+      </p:sp>
+      <p:cxnSp>
+        <p:nvCxnSpPr>
+          <p:cNvPr id="49" name="Straight Arrow Connector 48">
+            <a:extLst>
+              <a:ext uri="{FF2B5EF4-FFF2-40B4-BE49-F238E27FC236}">
+                <a16:creationId xmlns:a16="http://schemas.microsoft.com/office/drawing/2014/main" id="{6176B197-71FF-8048-8B44-9821B5FB178A}"/>
+              </a:ext>
+            </a:extLst>
+          </p:cNvPr>
+          <p:cNvCxnSpPr/>
+          <p:nvPr/>
+        </p:nvCxnSpPr>
+        <p:spPr>
+          <a:xfrm>
+            <a:off x="6836181" y="5736205"/>
+            <a:ext cx="1545772" cy="0"/>
+          </a:xfrm>
+          <a:prstGeom prst="straightConnector1">
+            <a:avLst/>
+          </a:prstGeom>
+          <a:ln w="38100">
+            <a:prstDash val="dash"/>
+            <a:headEnd type="triangle"/>
+            <a:tailEnd type="none"/>
+          </a:ln>
+        </p:spPr>
+        <p:style>
+          <a:lnRef idx="1">
+            <a:schemeClr val="accent1"/>
+          </a:lnRef>
+          <a:fillRef idx="0">
+            <a:schemeClr val="accent1"/>
+          </a:fillRef>
+          <a:effectRef idx="0">
+            <a:schemeClr val="accent1"/>
+          </a:effectRef>
+          <a:fontRef idx="minor">
+            <a:schemeClr val="tx1"/>
+          </a:fontRef>
+        </p:style>
+      </p:cxnSp>
+      <p:sp>
+        <p:nvSpPr>
+          <p:cNvPr id="50" name="TextBox 49">
+            <a:extLst>
+              <a:ext uri="{FF2B5EF4-FFF2-40B4-BE49-F238E27FC236}">
+                <a16:creationId xmlns:a16="http://schemas.microsoft.com/office/drawing/2014/main" id="{FFCAFF18-628F-89BA-D60F-C094D3564D42}"/>
+              </a:ext>
+            </a:extLst>
+          </p:cNvPr>
+          <p:cNvSpPr txBox="1"/>
+          <p:nvPr/>
+        </p:nvSpPr>
+        <p:spPr>
+          <a:xfrm>
+            <a:off x="6882350" y="5459206"/>
+            <a:ext cx="1467518" cy="276999"/>
+          </a:xfrm>
+          <a:prstGeom prst="rect">
+            <a:avLst/>
+          </a:prstGeom>
+          <a:noFill/>
+        </p:spPr>
+        <p:txBody>
+          <a:bodyPr wrap="none" rtlCol="0">
+            <a:spAutoFit/>
+          </a:bodyPr>
+          <a:lstStyle/>
+          <a:p>
+            <a:pPr algn="r"/>
+            <a:r>
+              <a:rPr lang="en-US" sz="1200"/>
+              <a:t>updateBudgetView()</a:t>
+            </a:r>
+          </a:p>
+        </p:txBody>
+      </p:sp>
+      <p:sp>
+        <p:nvSpPr>
+          <p:cNvPr id="51" name="Rectangle 50">
+            <a:extLst>
+              <a:ext uri="{FF2B5EF4-FFF2-40B4-BE49-F238E27FC236}">
+                <a16:creationId xmlns:a16="http://schemas.microsoft.com/office/drawing/2014/main" id="{4EB267CD-7D05-A05D-3907-5A5E0F65BEDB}"/>
+              </a:ext>
+            </a:extLst>
+          </p:cNvPr>
+          <p:cNvSpPr/>
+          <p:nvPr/>
+        </p:nvSpPr>
+        <p:spPr>
+          <a:xfrm>
+            <a:off x="10874917" y="523220"/>
+            <a:ext cx="1325971" cy="494492"/>
+          </a:xfrm>
+          <a:prstGeom prst="rect">
+            <a:avLst/>
+          </a:prstGeom>
+          <a:noFill/>
+          <a:ln w="38100">
+            <a:solidFill>
+              <a:schemeClr val="accent1"/>
+            </a:solidFill>
+          </a:ln>
+        </p:spPr>
+        <p:style>
+          <a:lnRef idx="2">
+            <a:schemeClr val="accent1">
+              <a:shade val="15000"/>
+            </a:schemeClr>
+          </a:lnRef>
+          <a:fillRef idx="1">
+            <a:schemeClr val="accent1"/>
+          </a:fillRef>
+          <a:effectRef idx="0">
+            <a:schemeClr val="accent1"/>
+          </a:effectRef>
+          <a:fontRef idx="minor">
+            <a:schemeClr val="lt1"/>
+          </a:fontRef>
+        </p:style>
+        <p:txBody>
+          <a:bodyPr rtlCol="0" anchor="ctr"/>
+          <a:lstStyle/>
+          <a:p>
+            <a:pPr algn="ctr"/>
+            <a:r>
+              <a:rPr lang="en-US" sz="1200">
+                <a:solidFill>
+                  <a:schemeClr val="tx1"/>
+                </a:solidFill>
+              </a:rPr>
+              <a:t>Item</a:t>
+            </a:r>
+          </a:p>
+          <a:p>
+            <a:pPr algn="ctr"/>
+            <a:r>
+              <a:rPr lang="en-US" sz="1200">
+                <a:solidFill>
+                  <a:schemeClr val="tx1"/>
+                </a:solidFill>
+              </a:rPr>
+              <a:t>(LinkedList Node)</a:t>
+            </a:r>
+          </a:p>
+        </p:txBody>
+      </p:sp>
+      <p:cxnSp>
+        <p:nvCxnSpPr>
+          <p:cNvPr id="52" name="Straight Connector 51">
+            <a:extLst>
+              <a:ext uri="{FF2B5EF4-FFF2-40B4-BE49-F238E27FC236}">
+                <a16:creationId xmlns:a16="http://schemas.microsoft.com/office/drawing/2014/main" id="{D7EB0975-C728-CBDC-0095-10CA4237FD23}"/>
+              </a:ext>
+            </a:extLst>
+          </p:cNvPr>
+          <p:cNvCxnSpPr>
+            <a:cxnSpLocks/>
+          </p:cNvCxnSpPr>
+          <p:nvPr/>
+        </p:nvCxnSpPr>
+        <p:spPr>
+          <a:xfrm>
+            <a:off x="11537901" y="1367246"/>
+            <a:ext cx="1" cy="5490754"/>
+          </a:xfrm>
+          <a:prstGeom prst="line">
+            <a:avLst/>
+          </a:prstGeom>
+          <a:ln w="38100">
+            <a:prstDash val="dash"/>
+          </a:ln>
+        </p:spPr>
+        <p:style>
+          <a:lnRef idx="1">
+            <a:schemeClr val="accent1"/>
+          </a:lnRef>
+          <a:fillRef idx="0">
+            <a:schemeClr val="accent1"/>
+          </a:fillRef>
+          <a:effectRef idx="0">
+            <a:schemeClr val="accent1"/>
+          </a:effectRef>
+          <a:fontRef idx="minor">
+            <a:schemeClr val="tx1"/>
+          </a:fontRef>
+        </p:style>
+      </p:cxnSp>
+      <p:cxnSp>
+        <p:nvCxnSpPr>
+          <p:cNvPr id="53" name="Straight Arrow Connector 52">
+            <a:extLst>
+              <a:ext uri="{FF2B5EF4-FFF2-40B4-BE49-F238E27FC236}">
+                <a16:creationId xmlns:a16="http://schemas.microsoft.com/office/drawing/2014/main" id="{29AE5B82-535F-2774-66CD-8A90705C8F30}"/>
+              </a:ext>
+            </a:extLst>
+          </p:cNvPr>
+          <p:cNvCxnSpPr/>
+          <p:nvPr/>
+        </p:nvCxnSpPr>
+        <p:spPr>
+          <a:xfrm>
+            <a:off x="6853155" y="4043135"/>
+            <a:ext cx="1545772" cy="0"/>
+          </a:xfrm>
+          <a:prstGeom prst="straightConnector1">
+            <a:avLst/>
+          </a:prstGeom>
+          <a:ln w="38100">
+            <a:tailEnd type="triangle"/>
+          </a:ln>
+        </p:spPr>
+        <p:style>
+          <a:lnRef idx="1">
+            <a:schemeClr val="accent1"/>
+          </a:lnRef>
+          <a:fillRef idx="0">
+            <a:schemeClr val="accent1"/>
+          </a:fillRef>
+          <a:effectRef idx="0">
+            <a:schemeClr val="accent1"/>
+          </a:effectRef>
+          <a:fontRef idx="minor">
+            <a:schemeClr val="tx1"/>
+          </a:fontRef>
+        </p:style>
+      </p:cxnSp>
+      <p:sp>
+        <p:nvSpPr>
+          <p:cNvPr id="54" name="TextBox 53">
+            <a:extLst>
+              <a:ext uri="{FF2B5EF4-FFF2-40B4-BE49-F238E27FC236}">
+                <a16:creationId xmlns:a16="http://schemas.microsoft.com/office/drawing/2014/main" id="{6C2E117C-AC19-E42A-C4BC-904655AD618C}"/>
+              </a:ext>
+            </a:extLst>
+          </p:cNvPr>
+          <p:cNvSpPr txBox="1"/>
+          <p:nvPr/>
+        </p:nvSpPr>
+        <p:spPr>
+          <a:xfrm>
+            <a:off x="6880418" y="3766136"/>
+            <a:ext cx="1058560" cy="276999"/>
+          </a:xfrm>
+          <a:prstGeom prst="rect">
+            <a:avLst/>
+          </a:prstGeom>
+          <a:noFill/>
+        </p:spPr>
+        <p:txBody>
+          <a:bodyPr wrap="none" rtlCol="0">
+            <a:spAutoFit/>
+          </a:bodyPr>
+          <a:lstStyle/>
+          <a:p>
+            <a:r>
+              <a:rPr lang="en-US" sz="1200"/>
+              <a:t>displayItems()</a:t>
+            </a:r>
+          </a:p>
+        </p:txBody>
+      </p:sp>
+      <p:cxnSp>
+        <p:nvCxnSpPr>
+          <p:cNvPr id="55" name="Straight Arrow Connector 54">
+            <a:extLst>
+              <a:ext uri="{FF2B5EF4-FFF2-40B4-BE49-F238E27FC236}">
+                <a16:creationId xmlns:a16="http://schemas.microsoft.com/office/drawing/2014/main" id="{2C94AC4B-70D0-D8AD-B553-67A9FEAC8869}"/>
+              </a:ext>
+            </a:extLst>
+          </p:cNvPr>
+          <p:cNvCxnSpPr>
+            <a:cxnSpLocks/>
+          </p:cNvCxnSpPr>
+          <p:nvPr/>
+        </p:nvCxnSpPr>
+        <p:spPr>
+          <a:xfrm>
+            <a:off x="8405485" y="4370094"/>
+            <a:ext cx="3132416" cy="0"/>
+          </a:xfrm>
+          <a:prstGeom prst="straightConnector1">
+            <a:avLst/>
+          </a:prstGeom>
+          <a:ln w="38100">
+            <a:tailEnd type="triangle"/>
+          </a:ln>
+        </p:spPr>
+        <p:style>
+          <a:lnRef idx="1">
+            <a:schemeClr val="accent1"/>
+          </a:lnRef>
+          <a:fillRef idx="0">
+            <a:schemeClr val="accent1"/>
+          </a:fillRef>
+          <a:effectRef idx="0">
+            <a:schemeClr val="accent1"/>
+          </a:effectRef>
+          <a:fontRef idx="minor">
+            <a:schemeClr val="tx1"/>
+          </a:fontRef>
+        </p:style>
+      </p:cxnSp>
+      <p:sp>
+        <p:nvSpPr>
+          <p:cNvPr id="56" name="TextBox 55">
+            <a:extLst>
+              <a:ext uri="{FF2B5EF4-FFF2-40B4-BE49-F238E27FC236}">
+                <a16:creationId xmlns:a16="http://schemas.microsoft.com/office/drawing/2014/main" id="{216642CF-3106-9EB3-D9AE-BEAF33B7CD63}"/>
+              </a:ext>
+            </a:extLst>
+          </p:cNvPr>
+          <p:cNvSpPr txBox="1"/>
+          <p:nvPr/>
+        </p:nvSpPr>
+        <p:spPr>
+          <a:xfrm>
+            <a:off x="8406621" y="4093095"/>
+            <a:ext cx="764376" cy="276999"/>
+          </a:xfrm>
+          <a:prstGeom prst="rect">
+            <a:avLst/>
+          </a:prstGeom>
+          <a:noFill/>
+        </p:spPr>
+        <p:txBody>
+          <a:bodyPr wrap="none" rtlCol="0">
+            <a:spAutoFit/>
+          </a:bodyPr>
+          <a:lstStyle/>
+          <a:p>
+            <a:r>
+              <a:rPr lang="en-US" sz="1200"/>
+              <a:t>getItem()</a:t>
+            </a:r>
+          </a:p>
+        </p:txBody>
+      </p:sp>
+      <p:cxnSp>
+        <p:nvCxnSpPr>
+          <p:cNvPr id="57" name="Straight Arrow Connector 56">
+            <a:extLst>
+              <a:ext uri="{FF2B5EF4-FFF2-40B4-BE49-F238E27FC236}">
+                <a16:creationId xmlns:a16="http://schemas.microsoft.com/office/drawing/2014/main" id="{27BEC834-4F6A-E213-CF7D-CEA190B4B7F0}"/>
+              </a:ext>
+            </a:extLst>
+          </p:cNvPr>
+          <p:cNvCxnSpPr>
+            <a:cxnSpLocks/>
+          </p:cNvCxnSpPr>
+          <p:nvPr/>
+        </p:nvCxnSpPr>
+        <p:spPr>
+          <a:xfrm>
+            <a:off x="8400185" y="4719628"/>
+            <a:ext cx="3137716" cy="0"/>
+          </a:xfrm>
+          <a:prstGeom prst="straightConnector1">
+            <a:avLst/>
+          </a:prstGeom>
+          <a:ln w="38100">
+            <a:prstDash val="dash"/>
+            <a:headEnd type="triangle"/>
+            <a:tailEnd type="none"/>
+          </a:ln>
+        </p:spPr>
+        <p:style>
+          <a:lnRef idx="1">
+            <a:schemeClr val="accent1"/>
+          </a:lnRef>
+          <a:fillRef idx="0">
+            <a:schemeClr val="accent1"/>
+          </a:fillRef>
+          <a:effectRef idx="0">
+            <a:schemeClr val="accent1"/>
+          </a:effectRef>
+          <a:fontRef idx="minor">
+            <a:schemeClr val="tx1"/>
+          </a:fontRef>
+        </p:style>
+      </p:cxnSp>
+      <p:sp>
+        <p:nvSpPr>
+          <p:cNvPr id="58" name="TextBox 57">
+            <a:extLst>
+              <a:ext uri="{FF2B5EF4-FFF2-40B4-BE49-F238E27FC236}">
+                <a16:creationId xmlns:a16="http://schemas.microsoft.com/office/drawing/2014/main" id="{9312BC5D-5778-29D7-B102-E4E4CE5D3656}"/>
+              </a:ext>
+            </a:extLst>
+          </p:cNvPr>
+          <p:cNvSpPr txBox="1"/>
+          <p:nvPr/>
+        </p:nvSpPr>
+        <p:spPr>
+          <a:xfrm>
+            <a:off x="9181580" y="4442629"/>
+            <a:ext cx="764376" cy="276999"/>
+          </a:xfrm>
+          <a:prstGeom prst="rect">
+            <a:avLst/>
+          </a:prstGeom>
+          <a:noFill/>
+        </p:spPr>
+        <p:txBody>
+          <a:bodyPr wrap="none" rtlCol="0">
+            <a:spAutoFit/>
+          </a:bodyPr>
+          <a:lstStyle/>
+          <a:p>
+            <a:pPr algn="r"/>
+            <a:r>
+              <a:rPr lang="en-US" sz="1200"/>
+              <a:t>getItem()</a:t>
+            </a:r>
+          </a:p>
+        </p:txBody>
+      </p:sp>
+      <p:cxnSp>
+        <p:nvCxnSpPr>
+          <p:cNvPr id="62" name="Straight Arrow Connector 61">
+            <a:extLst>
+              <a:ext uri="{FF2B5EF4-FFF2-40B4-BE49-F238E27FC236}">
+                <a16:creationId xmlns:a16="http://schemas.microsoft.com/office/drawing/2014/main" id="{5E33FD81-44DF-8049-5A24-C9ED1A009E69}"/>
+              </a:ext>
+            </a:extLst>
+          </p:cNvPr>
+          <p:cNvCxnSpPr>
+            <a:cxnSpLocks/>
+          </p:cNvCxnSpPr>
+          <p:nvPr/>
+        </p:nvCxnSpPr>
+        <p:spPr>
+          <a:xfrm flipV="1">
+            <a:off x="8398927" y="5351796"/>
+            <a:ext cx="3138974" cy="30778"/>
+          </a:xfrm>
+          <a:prstGeom prst="straightConnector1">
+            <a:avLst/>
+          </a:prstGeom>
+          <a:ln w="38100">
+            <a:tailEnd type="triangle"/>
+          </a:ln>
+        </p:spPr>
+        <p:style>
+          <a:lnRef idx="1">
+            <a:schemeClr val="accent1"/>
+          </a:lnRef>
+          <a:fillRef idx="0">
+            <a:schemeClr val="accent1"/>
+          </a:fillRef>
+          <a:effectRef idx="0">
+            <a:schemeClr val="accent1"/>
+          </a:effectRef>
+          <a:fontRef idx="minor">
+            <a:schemeClr val="tx1"/>
+          </a:fontRef>
+        </p:style>
+      </p:cxnSp>
+      <p:sp>
+        <p:nvSpPr>
+          <p:cNvPr id="63" name="TextBox 62">
+            <a:extLst>
+              <a:ext uri="{FF2B5EF4-FFF2-40B4-BE49-F238E27FC236}">
+                <a16:creationId xmlns:a16="http://schemas.microsoft.com/office/drawing/2014/main" id="{87F38596-2E32-166C-8542-726D59761B33}"/>
+              </a:ext>
+            </a:extLst>
+          </p:cNvPr>
+          <p:cNvSpPr txBox="1"/>
+          <p:nvPr/>
+        </p:nvSpPr>
+        <p:spPr>
+          <a:xfrm>
+            <a:off x="8420887" y="5105575"/>
+            <a:ext cx="1508746" cy="246221"/>
+          </a:xfrm>
+          <a:prstGeom prst="rect">
+            <a:avLst/>
+          </a:prstGeom>
+          <a:noFill/>
+        </p:spPr>
+        <p:txBody>
+          <a:bodyPr wrap="none" rtlCol="0">
+            <a:spAutoFit/>
+          </a:bodyPr>
+          <a:lstStyle/>
+          <a:p>
+            <a:r>
+              <a:rPr lang="en-US" sz="1000"/>
+              <a:t>addNewItem(cost, name)</a:t>
+            </a:r>
+          </a:p>
+        </p:txBody>
+      </p:sp>
+    </p:spTree>
+    <p:extLst>
+      <p:ext uri="{BB962C8B-B14F-4D97-AF65-F5344CB8AC3E}">
+        <p14:creationId xmlns:p14="http://schemas.microsoft.com/office/powerpoint/2010/main" val="3992693509"/>
       </p:ext>
     </p:extLst>
   </p:cSld>
@@ -4462,4 +6769,299 @@
     </a:ext>
   </a:extLst>
 </a:theme>
+</file>
+
+<file path=ppt/theme/theme2.xml><?xml version="1.0" encoding="utf-8"?>
+<a:theme xmlns:a="http://schemas.openxmlformats.org/drawingml/2006/main" name="Office Theme">
+  <a:themeElements>
+    <a:clrScheme name="Office">
+      <a:dk1>
+        <a:sysClr val="windowText" lastClr="000000"/>
+      </a:dk1>
+      <a:lt1>
+        <a:sysClr val="window" lastClr="FFFFFF"/>
+      </a:lt1>
+      <a:dk2>
+        <a:srgbClr val="44546A"/>
+      </a:dk2>
+      <a:lt2>
+        <a:srgbClr val="E7E6E6"/>
+      </a:lt2>
+      <a:accent1>
+        <a:srgbClr val="4472C4"/>
+      </a:accent1>
+      <a:accent2>
+        <a:srgbClr val="ED7D31"/>
+      </a:accent2>
+      <a:accent3>
+        <a:srgbClr val="A5A5A5"/>
+      </a:accent3>
+      <a:accent4>
+        <a:srgbClr val="FFC000"/>
+      </a:accent4>
+      <a:accent5>
+        <a:srgbClr val="5B9BD5"/>
+      </a:accent5>
+      <a:accent6>
+        <a:srgbClr val="70AD47"/>
+      </a:accent6>
+      <a:hlink>
+        <a:srgbClr val="0563C1"/>
+      </a:hlink>
+      <a:folHlink>
+        <a:srgbClr val="954F72"/>
+      </a:folHlink>
+    </a:clrScheme>
+    <a:fontScheme name="Office">
+      <a:majorFont>
+        <a:latin typeface="Calibri Light" panose="020F0302020204030204"/>
+        <a:ea typeface=""/>
+        <a:cs typeface=""/>
+        <a:font script="Jpan" typeface="游ゴシック Light"/>
+        <a:font script="Hang" typeface="맑은 고딕"/>
+        <a:font script="Hans" typeface="等线 Light"/>
+        <a:font script="Hant" typeface="新細明體"/>
+        <a:font script="Arab" typeface="Times New Roman"/>
+        <a:font script="Hebr" typeface="Times New Roman"/>
+        <a:font script="Thai" typeface="Angsana New"/>
+        <a:font script="Ethi" typeface="Nyala"/>
+        <a:font script="Beng" typeface="Vrinda"/>
+        <a:font script="Gujr" typeface="Shruti"/>
+        <a:font script="Khmr" typeface="MoolBoran"/>
+        <a:font script="Knda" typeface="Tunga"/>
+        <a:font script="Guru" typeface="Raavi"/>
+        <a:font script="Cans" typeface="Euphemia"/>
+        <a:font script="Cher" typeface="Plantagenet Cherokee"/>
+        <a:font script="Yiii" typeface="Microsoft Yi Baiti"/>
+        <a:font script="Tibt" typeface="Microsoft Himalaya"/>
+        <a:font script="Thaa" typeface="MV Boli"/>
+        <a:font script="Deva" typeface="Mangal"/>
+        <a:font script="Telu" typeface="Gautami"/>
+        <a:font script="Taml" typeface="Latha"/>
+        <a:font script="Syrc" typeface="Estrangelo Edessa"/>
+        <a:font script="Orya" typeface="Kalinga"/>
+        <a:font script="Mlym" typeface="Kartika"/>
+        <a:font script="Laoo" typeface="DokChampa"/>
+        <a:font script="Sinh" typeface="Iskoola Pota"/>
+        <a:font script="Mong" typeface="Mongolian Baiti"/>
+        <a:font script="Viet" typeface="Times New Roman"/>
+        <a:font script="Uigh" typeface="Microsoft Uighur"/>
+        <a:font script="Geor" typeface="Sylfaen"/>
+        <a:font script="Armn" typeface="Arial"/>
+        <a:font script="Bugi" typeface="Leelawadee UI"/>
+        <a:font script="Bopo" typeface="Microsoft JhengHei"/>
+        <a:font script="Java" typeface="Javanese Text"/>
+        <a:font script="Lisu" typeface="Segoe UI"/>
+        <a:font script="Mymr" typeface="Myanmar Text"/>
+        <a:font script="Nkoo" typeface="Ebrima"/>
+        <a:font script="Olck" typeface="Nirmala UI"/>
+        <a:font script="Osma" typeface="Ebrima"/>
+        <a:font script="Phag" typeface="Phagspa"/>
+        <a:font script="Syrn" typeface="Estrangelo Edessa"/>
+        <a:font script="Syrj" typeface="Estrangelo Edessa"/>
+        <a:font script="Syre" typeface="Estrangelo Edessa"/>
+        <a:font script="Sora" typeface="Nirmala UI"/>
+        <a:font script="Tale" typeface="Microsoft Tai Le"/>
+        <a:font script="Talu" typeface="Microsoft New Tai Lue"/>
+        <a:font script="Tfng" typeface="Ebrima"/>
+      </a:majorFont>
+      <a:minorFont>
+        <a:latin typeface="Calibri" panose="020F0502020204030204"/>
+        <a:ea typeface=""/>
+        <a:cs typeface=""/>
+        <a:font script="Jpan" typeface="游ゴシック"/>
+        <a:font script="Hang" typeface="맑은 고딕"/>
+        <a:font script="Hans" typeface="等线"/>
+        <a:font script="Hant" typeface="新細明體"/>
+        <a:font script="Arab" typeface="Arial"/>
+        <a:font script="Hebr" typeface="Arial"/>
+        <a:font script="Thai" typeface="Cordia New"/>
+        <a:font script="Ethi" typeface="Nyala"/>
+        <a:font script="Beng" typeface="Vrinda"/>
+        <a:font script="Gujr" typeface="Shruti"/>
+        <a:font script="Khmr" typeface="DaunPenh"/>
+        <a:font script="Knda" typeface="Tunga"/>
+        <a:font script="Guru" typeface="Raavi"/>
+        <a:font script="Cans" typeface="Euphemia"/>
+        <a:font script="Cher" typeface="Plantagenet Cherokee"/>
+        <a:font script="Yiii" typeface="Microsoft Yi Baiti"/>
+        <a:font script="Tibt" typeface="Microsoft Himalaya"/>
+        <a:font script="Thaa" typeface="MV Boli"/>
+        <a:font script="Deva" typeface="Mangal"/>
+        <a:font script="Telu" typeface="Gautami"/>
+        <a:font script="Taml" typeface="Latha"/>
+        <a:font script="Syrc" typeface="Estrangelo Edessa"/>
+        <a:font script="Orya" typeface="Kalinga"/>
+        <a:font script="Mlym" typeface="Kartika"/>
+        <a:font script="Laoo" typeface="DokChampa"/>
+        <a:font script="Sinh" typeface="Iskoola Pota"/>
+        <a:font script="Mong" typeface="Mongolian Baiti"/>
+        <a:font script="Viet" typeface="Arial"/>
+        <a:font script="Uigh" typeface="Microsoft Uighur"/>
+        <a:font script="Geor" typeface="Sylfaen"/>
+        <a:font script="Armn" typeface="Arial"/>
+        <a:font script="Bugi" typeface="Leelawadee UI"/>
+        <a:font script="Bopo" typeface="Microsoft JhengHei"/>
+        <a:font script="Java" typeface="Javanese Text"/>
+        <a:font script="Lisu" typeface="Segoe UI"/>
+        <a:font script="Mymr" typeface="Myanmar Text"/>
+        <a:font script="Nkoo" typeface="Ebrima"/>
+        <a:font script="Olck" typeface="Nirmala UI"/>
+        <a:font script="Osma" typeface="Ebrima"/>
+        <a:font script="Phag" typeface="Phagspa"/>
+        <a:font script="Syrn" typeface="Estrangelo Edessa"/>
+        <a:font script="Syrj" typeface="Estrangelo Edessa"/>
+        <a:font script="Syre" typeface="Estrangelo Edessa"/>
+        <a:font script="Sora" typeface="Nirmala UI"/>
+        <a:font script="Tale" typeface="Microsoft Tai Le"/>
+        <a:font script="Talu" typeface="Microsoft New Tai Lue"/>
+        <a:font script="Tfng" typeface="Ebrima"/>
+      </a:minorFont>
+    </a:fontScheme>
+    <a:fmtScheme name="Office">
+      <a:fillStyleLst>
+        <a:solidFill>
+          <a:schemeClr val="phClr"/>
+        </a:solidFill>
+        <a:gradFill rotWithShape="1">
+          <a:gsLst>
+            <a:gs pos="0">
+              <a:schemeClr val="phClr">
+                <a:lumMod val="110000"/>
+                <a:satMod val="105000"/>
+                <a:tint val="67000"/>
+              </a:schemeClr>
+            </a:gs>
+            <a:gs pos="50000">
+              <a:schemeClr val="phClr">
+                <a:lumMod val="105000"/>
+                <a:satMod val="103000"/>
+                <a:tint val="73000"/>
+              </a:schemeClr>
+            </a:gs>
+            <a:gs pos="100000">
+              <a:schemeClr val="phClr">
+                <a:lumMod val="105000"/>
+                <a:satMod val="109000"/>
+                <a:tint val="81000"/>
+              </a:schemeClr>
+            </a:gs>
+          </a:gsLst>
+          <a:lin ang="5400000" scaled="0"/>
+        </a:gradFill>
+        <a:gradFill rotWithShape="1">
+          <a:gsLst>
+            <a:gs pos="0">
+              <a:schemeClr val="phClr">
+                <a:satMod val="103000"/>
+                <a:lumMod val="102000"/>
+                <a:tint val="94000"/>
+              </a:schemeClr>
+            </a:gs>
+            <a:gs pos="50000">
+              <a:schemeClr val="phClr">
+                <a:satMod val="110000"/>
+                <a:lumMod val="100000"/>
+                <a:shade val="100000"/>
+              </a:schemeClr>
+            </a:gs>
+            <a:gs pos="100000">
+              <a:schemeClr val="phClr">
+                <a:lumMod val="99000"/>
+                <a:satMod val="120000"/>
+                <a:shade val="78000"/>
+              </a:schemeClr>
+            </a:gs>
+          </a:gsLst>
+          <a:lin ang="5400000" scaled="0"/>
+        </a:gradFill>
+      </a:fillStyleLst>
+      <a:lnStyleLst>
+        <a:ln w="6350" cap="flat" cmpd="sng" algn="ctr">
+          <a:solidFill>
+            <a:schemeClr val="phClr"/>
+          </a:solidFill>
+          <a:prstDash val="solid"/>
+          <a:miter lim="800000"/>
+        </a:ln>
+        <a:ln w="12700" cap="flat" cmpd="sng" algn="ctr">
+          <a:solidFill>
+            <a:schemeClr val="phClr"/>
+          </a:solidFill>
+          <a:prstDash val="solid"/>
+          <a:miter lim="800000"/>
+        </a:ln>
+        <a:ln w="19050" cap="flat" cmpd="sng" algn="ctr">
+          <a:solidFill>
+            <a:schemeClr val="phClr"/>
+          </a:solidFill>
+          <a:prstDash val="solid"/>
+          <a:miter lim="800000"/>
+        </a:ln>
+      </a:lnStyleLst>
+      <a:effectStyleLst>
+        <a:effectStyle>
+          <a:effectLst/>
+        </a:effectStyle>
+        <a:effectStyle>
+          <a:effectLst/>
+        </a:effectStyle>
+        <a:effectStyle>
+          <a:effectLst>
+            <a:outerShdw blurRad="57150" dist="19050" dir="5400000" algn="ctr" rotWithShape="0">
+              <a:srgbClr val="000000">
+                <a:alpha val="63000"/>
+              </a:srgbClr>
+            </a:outerShdw>
+          </a:effectLst>
+        </a:effectStyle>
+      </a:effectStyleLst>
+      <a:bgFillStyleLst>
+        <a:solidFill>
+          <a:schemeClr val="phClr"/>
+        </a:solidFill>
+        <a:solidFill>
+          <a:schemeClr val="phClr">
+            <a:tint val="95000"/>
+            <a:satMod val="170000"/>
+          </a:schemeClr>
+        </a:solidFill>
+        <a:gradFill rotWithShape="1">
+          <a:gsLst>
+            <a:gs pos="0">
+              <a:schemeClr val="phClr">
+                <a:tint val="93000"/>
+                <a:satMod val="150000"/>
+                <a:shade val="98000"/>
+                <a:lumMod val="102000"/>
+              </a:schemeClr>
+            </a:gs>
+            <a:gs pos="50000">
+              <a:schemeClr val="phClr">
+                <a:tint val="98000"/>
+                <a:satMod val="130000"/>
+                <a:shade val="90000"/>
+                <a:lumMod val="103000"/>
+              </a:schemeClr>
+            </a:gs>
+            <a:gs pos="100000">
+              <a:schemeClr val="phClr">
+                <a:shade val="63000"/>
+                <a:satMod val="120000"/>
+              </a:schemeClr>
+            </a:gs>
+          </a:gsLst>
+          <a:lin ang="5400000" scaled="0"/>
+        </a:gradFill>
+      </a:bgFillStyleLst>
+    </a:fmtScheme>
+  </a:themeElements>
+  <a:objectDefaults/>
+  <a:extraClrSchemeLst/>
+  <a:extLst>
+    <a:ext uri="{05A4C25C-085E-4340-85A3-A5531E510DB2}">
+      <thm15:themeFamily xmlns:thm15="http://schemas.microsoft.com/office/thememl/2012/main" name="Office Theme" id="{62F939B6-93AF-4DB8-9C6B-D6C7DFDC589F}" vid="{4A3C46E8-61CC-4603-A589-7422A47A8E4A}"/>
+    </a:ext>
+  </a:extLst>
+</a:theme>
 </file>
</xml_diff>

<commit_message>
+ User interaction diagram for adding item to project budget (#30)
* displayText <-> displayProfile

* Display team names

* Format layouts

* Fix layout, display Version and Profile

* formatting

* test commit

* test commit

* Fix return for get AboutController.getVersion

* Reset java.awt import

* Remove old test.java

* typos

* Add .idea to .gitignore

* Add team member names

* spacing

* User interaction diagram for adding item to project budget
</commit_message>
<xml_diff>
--- a/documentation/AppDesign.pptx
+++ b/documentation/AppDesign.pptx
@@ -4,8 +4,12 @@
   <p:sldMasterIdLst>
     <p:sldMasterId id="2147483648" r:id="rId1"/>
   </p:sldMasterIdLst>
+  <p:notesMasterIdLst>
+    <p:notesMasterId r:id="rId4"/>
+  </p:notesMasterIdLst>
   <p:sldIdLst>
     <p:sldId id="256" r:id="rId2"/>
+    <p:sldId id="257" r:id="rId3"/>
   </p:sldIdLst>
   <p:sldSz cx="12192000" cy="6858000"/>
   <p:notesSz cx="6858000" cy="9144000"/>
@@ -220,6 +224,436 @@
 </inkml:ink>
 </file>
 
+<file path=ppt/notesMasters/notesMaster1.xml><?xml version="1.0" encoding="utf-8"?>
+<p:notesMaster xmlns:a="http://schemas.openxmlformats.org/drawingml/2006/main" xmlns:r="http://schemas.openxmlformats.org/officeDocument/2006/relationships" xmlns:p="http://schemas.openxmlformats.org/presentationml/2006/main">
+  <p:cSld>
+    <p:bg>
+      <p:bgRef idx="1001">
+        <a:schemeClr val="bg1"/>
+      </p:bgRef>
+    </p:bg>
+    <p:spTree>
+      <p:nvGrpSpPr>
+        <p:cNvPr id="1" name=""/>
+        <p:cNvGrpSpPr/>
+        <p:nvPr/>
+      </p:nvGrpSpPr>
+      <p:grpSpPr>
+        <a:xfrm>
+          <a:off x="0" y="0"/>
+          <a:ext cx="0" cy="0"/>
+          <a:chOff x="0" y="0"/>
+          <a:chExt cx="0" cy="0"/>
+        </a:xfrm>
+      </p:grpSpPr>
+      <p:sp>
+        <p:nvSpPr>
+          <p:cNvPr id="2" name="Header Placeholder 1"/>
+          <p:cNvSpPr>
+            <a:spLocks noGrp="1"/>
+          </p:cNvSpPr>
+          <p:nvPr>
+            <p:ph type="hdr" sz="quarter"/>
+          </p:nvPr>
+        </p:nvSpPr>
+        <p:spPr>
+          <a:xfrm>
+            <a:off x="0" y="0"/>
+            <a:ext cx="2971800" cy="458788"/>
+          </a:xfrm>
+          <a:prstGeom prst="rect">
+            <a:avLst/>
+          </a:prstGeom>
+        </p:spPr>
+        <p:txBody>
+          <a:bodyPr vert="horz" lIns="91440" tIns="45720" rIns="91440" bIns="45720" rtlCol="0"/>
+          <a:lstStyle>
+            <a:lvl1pPr algn="l">
+              <a:defRPr sz="1200"/>
+            </a:lvl1pPr>
+          </a:lstStyle>
+          <a:p>
+            <a:endParaRPr lang="en-US"/>
+          </a:p>
+        </p:txBody>
+      </p:sp>
+      <p:sp>
+        <p:nvSpPr>
+          <p:cNvPr id="3" name="Date Placeholder 2"/>
+          <p:cNvSpPr>
+            <a:spLocks noGrp="1"/>
+          </p:cNvSpPr>
+          <p:nvPr>
+            <p:ph type="dt" idx="1"/>
+          </p:nvPr>
+        </p:nvSpPr>
+        <p:spPr>
+          <a:xfrm>
+            <a:off x="3884613" y="0"/>
+            <a:ext cx="2971800" cy="458788"/>
+          </a:xfrm>
+          <a:prstGeom prst="rect">
+            <a:avLst/>
+          </a:prstGeom>
+        </p:spPr>
+        <p:txBody>
+          <a:bodyPr vert="horz" lIns="91440" tIns="45720" rIns="91440" bIns="45720" rtlCol="0"/>
+          <a:lstStyle>
+            <a:lvl1pPr algn="r">
+              <a:defRPr sz="1200"/>
+            </a:lvl1pPr>
+          </a:lstStyle>
+          <a:p>
+            <a:fld id="{7258A54E-126E-9F44-BB91-7E6D295A013E}" type="datetimeFigureOut">
+              <a:t>11/9/23</a:t>
+            </a:fld>
+            <a:endParaRPr lang="en-US"/>
+          </a:p>
+        </p:txBody>
+      </p:sp>
+      <p:sp>
+        <p:nvSpPr>
+          <p:cNvPr id="4" name="Slide Image Placeholder 3"/>
+          <p:cNvSpPr>
+            <a:spLocks noGrp="1" noRot="1" noChangeAspect="1"/>
+          </p:cNvSpPr>
+          <p:nvPr>
+            <p:ph type="sldImg" idx="2"/>
+          </p:nvPr>
+        </p:nvSpPr>
+        <p:spPr>
+          <a:xfrm>
+            <a:off x="685800" y="1143000"/>
+            <a:ext cx="5486400" cy="3086100"/>
+          </a:xfrm>
+          <a:prstGeom prst="rect">
+            <a:avLst/>
+          </a:prstGeom>
+          <a:noFill/>
+          <a:ln w="12700">
+            <a:solidFill>
+              <a:prstClr val="black"/>
+            </a:solidFill>
+          </a:ln>
+        </p:spPr>
+        <p:txBody>
+          <a:bodyPr vert="horz" lIns="91440" tIns="45720" rIns="91440" bIns="45720" rtlCol="0" anchor="ctr"/>
+          <a:lstStyle/>
+          <a:p>
+            <a:endParaRPr lang="en-US"/>
+          </a:p>
+        </p:txBody>
+      </p:sp>
+      <p:sp>
+        <p:nvSpPr>
+          <p:cNvPr id="5" name="Notes Placeholder 4"/>
+          <p:cNvSpPr>
+            <a:spLocks noGrp="1"/>
+          </p:cNvSpPr>
+          <p:nvPr>
+            <p:ph type="body" sz="quarter" idx="3"/>
+          </p:nvPr>
+        </p:nvSpPr>
+        <p:spPr>
+          <a:xfrm>
+            <a:off x="685800" y="4400550"/>
+            <a:ext cx="5486400" cy="3600450"/>
+          </a:xfrm>
+          <a:prstGeom prst="rect">
+            <a:avLst/>
+          </a:prstGeom>
+        </p:spPr>
+        <p:txBody>
+          <a:bodyPr vert="horz" lIns="91440" tIns="45720" rIns="91440" bIns="45720" rtlCol="0"/>
+          <a:lstStyle/>
+          <a:p>
+            <a:pPr lvl="0"/>
+            <a:r>
+              <a:rPr lang="en-US"/>
+              <a:t>Click to edit Master text styles</a:t>
+            </a:r>
+          </a:p>
+          <a:p>
+            <a:pPr lvl="1"/>
+            <a:r>
+              <a:rPr lang="en-US"/>
+              <a:t>Second level</a:t>
+            </a:r>
+          </a:p>
+          <a:p>
+            <a:pPr lvl="2"/>
+            <a:r>
+              <a:rPr lang="en-US"/>
+              <a:t>Third level</a:t>
+            </a:r>
+          </a:p>
+          <a:p>
+            <a:pPr lvl="3"/>
+            <a:r>
+              <a:rPr lang="en-US"/>
+              <a:t>Fourth level</a:t>
+            </a:r>
+          </a:p>
+          <a:p>
+            <a:pPr lvl="4"/>
+            <a:r>
+              <a:rPr lang="en-US"/>
+              <a:t>Fifth level</a:t>
+            </a:r>
+          </a:p>
+        </p:txBody>
+      </p:sp>
+      <p:sp>
+        <p:nvSpPr>
+          <p:cNvPr id="6" name="Footer Placeholder 5"/>
+          <p:cNvSpPr>
+            <a:spLocks noGrp="1"/>
+          </p:cNvSpPr>
+          <p:nvPr>
+            <p:ph type="ftr" sz="quarter" idx="4"/>
+          </p:nvPr>
+        </p:nvSpPr>
+        <p:spPr>
+          <a:xfrm>
+            <a:off x="0" y="8685213"/>
+            <a:ext cx="2971800" cy="458787"/>
+          </a:xfrm>
+          <a:prstGeom prst="rect">
+            <a:avLst/>
+          </a:prstGeom>
+        </p:spPr>
+        <p:txBody>
+          <a:bodyPr vert="horz" lIns="91440" tIns="45720" rIns="91440" bIns="45720" rtlCol="0" anchor="b"/>
+          <a:lstStyle>
+            <a:lvl1pPr algn="l">
+              <a:defRPr sz="1200"/>
+            </a:lvl1pPr>
+          </a:lstStyle>
+          <a:p>
+            <a:endParaRPr lang="en-US"/>
+          </a:p>
+        </p:txBody>
+      </p:sp>
+      <p:sp>
+        <p:nvSpPr>
+          <p:cNvPr id="7" name="Slide Number Placeholder 6"/>
+          <p:cNvSpPr>
+            <a:spLocks noGrp="1"/>
+          </p:cNvSpPr>
+          <p:nvPr>
+            <p:ph type="sldNum" sz="quarter" idx="5"/>
+          </p:nvPr>
+        </p:nvSpPr>
+        <p:spPr>
+          <a:xfrm>
+            <a:off x="3884613" y="8685213"/>
+            <a:ext cx="2971800" cy="458787"/>
+          </a:xfrm>
+          <a:prstGeom prst="rect">
+            <a:avLst/>
+          </a:prstGeom>
+        </p:spPr>
+        <p:txBody>
+          <a:bodyPr vert="horz" lIns="91440" tIns="45720" rIns="91440" bIns="45720" rtlCol="0" anchor="b"/>
+          <a:lstStyle>
+            <a:lvl1pPr algn="r">
+              <a:defRPr sz="1200"/>
+            </a:lvl1pPr>
+          </a:lstStyle>
+          <a:p>
+            <a:fld id="{01B7AB9F-F68F-EB40-AB1E-7E27BB726B65}" type="slidenum">
+              <a:t>‹#›</a:t>
+            </a:fld>
+            <a:endParaRPr lang="en-US"/>
+          </a:p>
+        </p:txBody>
+      </p:sp>
+    </p:spTree>
+    <p:extLst>
+      <p:ext uri="{BB962C8B-B14F-4D97-AF65-F5344CB8AC3E}">
+        <p14:creationId xmlns:p14="http://schemas.microsoft.com/office/powerpoint/2010/main" val="2031649062"/>
+      </p:ext>
+    </p:extLst>
+  </p:cSld>
+  <p:clrMap bg1="lt1" tx1="dk1" bg2="lt2" tx2="dk2" accent1="accent1" accent2="accent2" accent3="accent3" accent4="accent4" accent5="accent5" accent6="accent6" hlink="hlink" folHlink="folHlink"/>
+  <p:notesStyle>
+    <a:lvl1pPr marL="0" algn="l" defTabSz="914400" rtl="0" eaLnBrk="1" latinLnBrk="0" hangingPunct="1">
+      <a:defRPr sz="1200" kern="1200">
+        <a:solidFill>
+          <a:schemeClr val="tx1"/>
+        </a:solidFill>
+        <a:latin typeface="+mn-lt"/>
+        <a:ea typeface="+mn-ea"/>
+        <a:cs typeface="+mn-cs"/>
+      </a:defRPr>
+    </a:lvl1pPr>
+    <a:lvl2pPr marL="457200" algn="l" defTabSz="914400" rtl="0" eaLnBrk="1" latinLnBrk="0" hangingPunct="1">
+      <a:defRPr sz="1200" kern="1200">
+        <a:solidFill>
+          <a:schemeClr val="tx1"/>
+        </a:solidFill>
+        <a:latin typeface="+mn-lt"/>
+        <a:ea typeface="+mn-ea"/>
+        <a:cs typeface="+mn-cs"/>
+      </a:defRPr>
+    </a:lvl2pPr>
+    <a:lvl3pPr marL="914400" algn="l" defTabSz="914400" rtl="0" eaLnBrk="1" latinLnBrk="0" hangingPunct="1">
+      <a:defRPr sz="1200" kern="1200">
+        <a:solidFill>
+          <a:schemeClr val="tx1"/>
+        </a:solidFill>
+        <a:latin typeface="+mn-lt"/>
+        <a:ea typeface="+mn-ea"/>
+        <a:cs typeface="+mn-cs"/>
+      </a:defRPr>
+    </a:lvl3pPr>
+    <a:lvl4pPr marL="1371600" algn="l" defTabSz="914400" rtl="0" eaLnBrk="1" latinLnBrk="0" hangingPunct="1">
+      <a:defRPr sz="1200" kern="1200">
+        <a:solidFill>
+          <a:schemeClr val="tx1"/>
+        </a:solidFill>
+        <a:latin typeface="+mn-lt"/>
+        <a:ea typeface="+mn-ea"/>
+        <a:cs typeface="+mn-cs"/>
+      </a:defRPr>
+    </a:lvl4pPr>
+    <a:lvl5pPr marL="1828800" algn="l" defTabSz="914400" rtl="0" eaLnBrk="1" latinLnBrk="0" hangingPunct="1">
+      <a:defRPr sz="1200" kern="1200">
+        <a:solidFill>
+          <a:schemeClr val="tx1"/>
+        </a:solidFill>
+        <a:latin typeface="+mn-lt"/>
+        <a:ea typeface="+mn-ea"/>
+        <a:cs typeface="+mn-cs"/>
+      </a:defRPr>
+    </a:lvl5pPr>
+    <a:lvl6pPr marL="2286000" algn="l" defTabSz="914400" rtl="0" eaLnBrk="1" latinLnBrk="0" hangingPunct="1">
+      <a:defRPr sz="1200" kern="1200">
+        <a:solidFill>
+          <a:schemeClr val="tx1"/>
+        </a:solidFill>
+        <a:latin typeface="+mn-lt"/>
+        <a:ea typeface="+mn-ea"/>
+        <a:cs typeface="+mn-cs"/>
+      </a:defRPr>
+    </a:lvl6pPr>
+    <a:lvl7pPr marL="2743200" algn="l" defTabSz="914400" rtl="0" eaLnBrk="1" latinLnBrk="0" hangingPunct="1">
+      <a:defRPr sz="1200" kern="1200">
+        <a:solidFill>
+          <a:schemeClr val="tx1"/>
+        </a:solidFill>
+        <a:latin typeface="+mn-lt"/>
+        <a:ea typeface="+mn-ea"/>
+        <a:cs typeface="+mn-cs"/>
+      </a:defRPr>
+    </a:lvl7pPr>
+    <a:lvl8pPr marL="3200400" algn="l" defTabSz="914400" rtl="0" eaLnBrk="1" latinLnBrk="0" hangingPunct="1">
+      <a:defRPr sz="1200" kern="1200">
+        <a:solidFill>
+          <a:schemeClr val="tx1"/>
+        </a:solidFill>
+        <a:latin typeface="+mn-lt"/>
+        <a:ea typeface="+mn-ea"/>
+        <a:cs typeface="+mn-cs"/>
+      </a:defRPr>
+    </a:lvl8pPr>
+    <a:lvl9pPr marL="3657600" algn="l" defTabSz="914400" rtl="0" eaLnBrk="1" latinLnBrk="0" hangingPunct="1">
+      <a:defRPr sz="1200" kern="1200">
+        <a:solidFill>
+          <a:schemeClr val="tx1"/>
+        </a:solidFill>
+        <a:latin typeface="+mn-lt"/>
+        <a:ea typeface="+mn-ea"/>
+        <a:cs typeface="+mn-cs"/>
+      </a:defRPr>
+    </a:lvl9pPr>
+  </p:notesStyle>
+</p:notesMaster>
+</file>
+
+<file path=ppt/notesSlides/notesSlide1.xml><?xml version="1.0" encoding="utf-8"?>
+<p:notes xmlns:a="http://schemas.openxmlformats.org/drawingml/2006/main" xmlns:r="http://schemas.openxmlformats.org/officeDocument/2006/relationships" xmlns:p="http://schemas.openxmlformats.org/presentationml/2006/main">
+  <p:cSld>
+    <p:spTree>
+      <p:nvGrpSpPr>
+        <p:cNvPr id="1" name=""/>
+        <p:cNvGrpSpPr/>
+        <p:nvPr/>
+      </p:nvGrpSpPr>
+      <p:grpSpPr>
+        <a:xfrm>
+          <a:off x="0" y="0"/>
+          <a:ext cx="0" cy="0"/>
+          <a:chOff x="0" y="0"/>
+          <a:chExt cx="0" cy="0"/>
+        </a:xfrm>
+      </p:grpSpPr>
+      <p:sp>
+        <p:nvSpPr>
+          <p:cNvPr id="2" name="Slide Image Placeholder 1"/>
+          <p:cNvSpPr>
+            <a:spLocks noGrp="1" noRot="1" noChangeAspect="1"/>
+          </p:cNvSpPr>
+          <p:nvPr>
+            <p:ph type="sldImg"/>
+          </p:nvPr>
+        </p:nvSpPr>
+        <p:spPr/>
+      </p:sp>
+      <p:sp>
+        <p:nvSpPr>
+          <p:cNvPr id="3" name="Notes Placeholder 2"/>
+          <p:cNvSpPr>
+            <a:spLocks noGrp="1"/>
+          </p:cNvSpPr>
+          <p:nvPr>
+            <p:ph type="body" idx="1"/>
+          </p:nvPr>
+        </p:nvSpPr>
+        <p:spPr/>
+        <p:txBody>
+          <a:bodyPr/>
+          <a:lstStyle/>
+          <a:p>
+            <a:endParaRPr lang="en-US"/>
+          </a:p>
+        </p:txBody>
+      </p:sp>
+      <p:sp>
+        <p:nvSpPr>
+          <p:cNvPr id="4" name="Slide Number Placeholder 3"/>
+          <p:cNvSpPr>
+            <a:spLocks noGrp="1"/>
+          </p:cNvSpPr>
+          <p:nvPr>
+            <p:ph type="sldNum" sz="quarter" idx="5"/>
+          </p:nvPr>
+        </p:nvSpPr>
+        <p:spPr/>
+        <p:txBody>
+          <a:bodyPr/>
+          <a:lstStyle/>
+          <a:p>
+            <a:fld id="{01B7AB9F-F68F-EB40-AB1E-7E27BB726B65}" type="slidenum">
+              <a:t>2</a:t>
+            </a:fld>
+            <a:endParaRPr lang="en-US"/>
+          </a:p>
+        </p:txBody>
+      </p:sp>
+    </p:spTree>
+    <p:extLst>
+      <p:ext uri="{BB962C8B-B14F-4D97-AF65-F5344CB8AC3E}">
+        <p14:creationId xmlns:p14="http://schemas.microsoft.com/office/powerpoint/2010/main" val="2478432978"/>
+      </p:ext>
+    </p:extLst>
+  </p:cSld>
+  <p:clrMapOvr>
+    <a:masterClrMapping/>
+  </p:clrMapOvr>
+</p:notes>
+</file>
+
 <file path=ppt/slideLayouts/slideLayout1.xml><?xml version="1.0" encoding="utf-8"?>
 <p:sldLayout xmlns:a="http://schemas.openxmlformats.org/drawingml/2006/main" xmlns:r="http://schemas.openxmlformats.org/officeDocument/2006/relationships" xmlns:p="http://schemas.openxmlformats.org/presentationml/2006/main" type="title" preserve="1">
   <p:cSld name="Title Slide">
@@ -366,7 +800,7 @@
           <a:lstStyle/>
           <a:p>
             <a:fld id="{814779F6-DF54-A74A-B093-E4E0AB693425}" type="datetimeFigureOut">
-              <a:t>11/6/23</a:t>
+              <a:t>11/9/23</a:t>
             </a:fld>
             <a:endParaRPr lang="en-US"/>
           </a:p>
@@ -562,7 +996,7 @@
           <a:lstStyle/>
           <a:p>
             <a:fld id="{814779F6-DF54-A74A-B093-E4E0AB693425}" type="datetimeFigureOut">
-              <a:t>11/6/23</a:t>
+              <a:t>11/9/23</a:t>
             </a:fld>
             <a:endParaRPr lang="en-US"/>
           </a:p>
@@ -768,7 +1202,7 @@
           <a:lstStyle/>
           <a:p>
             <a:fld id="{814779F6-DF54-A74A-B093-E4E0AB693425}" type="datetimeFigureOut">
-              <a:t>11/6/23</a:t>
+              <a:t>11/9/23</a:t>
             </a:fld>
             <a:endParaRPr lang="en-US"/>
           </a:p>
@@ -964,7 +1398,7 @@
           <a:lstStyle/>
           <a:p>
             <a:fld id="{814779F6-DF54-A74A-B093-E4E0AB693425}" type="datetimeFigureOut">
-              <a:t>11/6/23</a:t>
+              <a:t>11/9/23</a:t>
             </a:fld>
             <a:endParaRPr lang="en-US"/>
           </a:p>
@@ -1237,7 +1671,7 @@
           <a:lstStyle/>
           <a:p>
             <a:fld id="{814779F6-DF54-A74A-B093-E4E0AB693425}" type="datetimeFigureOut">
-              <a:t>11/6/23</a:t>
+              <a:t>11/9/23</a:t>
             </a:fld>
             <a:endParaRPr lang="en-US"/>
           </a:p>
@@ -1500,7 +1934,7 @@
           <a:lstStyle/>
           <a:p>
             <a:fld id="{814779F6-DF54-A74A-B093-E4E0AB693425}" type="datetimeFigureOut">
-              <a:t>11/6/23</a:t>
+              <a:t>11/9/23</a:t>
             </a:fld>
             <a:endParaRPr lang="en-US"/>
           </a:p>
@@ -1910,7 +2344,7 @@
           <a:lstStyle/>
           <a:p>
             <a:fld id="{814779F6-DF54-A74A-B093-E4E0AB693425}" type="datetimeFigureOut">
-              <a:t>11/6/23</a:t>
+              <a:t>11/9/23</a:t>
             </a:fld>
             <a:endParaRPr lang="en-US"/>
           </a:p>
@@ -2049,7 +2483,7 @@
           <a:lstStyle/>
           <a:p>
             <a:fld id="{814779F6-DF54-A74A-B093-E4E0AB693425}" type="datetimeFigureOut">
-              <a:t>11/6/23</a:t>
+              <a:t>11/9/23</a:t>
             </a:fld>
             <a:endParaRPr lang="en-US"/>
           </a:p>
@@ -2160,7 +2594,7 @@
           <a:lstStyle/>
           <a:p>
             <a:fld id="{814779F6-DF54-A74A-B093-E4E0AB693425}" type="datetimeFigureOut">
-              <a:t>11/6/23</a:t>
+              <a:t>11/9/23</a:t>
             </a:fld>
             <a:endParaRPr lang="en-US"/>
           </a:p>
@@ -2469,7 +2903,7 @@
           <a:lstStyle/>
           <a:p>
             <a:fld id="{814779F6-DF54-A74A-B093-E4E0AB693425}" type="datetimeFigureOut">
-              <a:t>11/6/23</a:t>
+              <a:t>11/9/23</a:t>
             </a:fld>
             <a:endParaRPr lang="en-US"/>
           </a:p>
@@ -2755,7 +3189,7 @@
           <a:lstStyle/>
           <a:p>
             <a:fld id="{814779F6-DF54-A74A-B093-E4E0AB693425}" type="datetimeFigureOut">
-              <a:t>11/6/23</a:t>
+              <a:t>11/9/23</a:t>
             </a:fld>
             <a:endParaRPr lang="en-US"/>
           </a:p>
@@ -2994,7 +3428,7 @@
           </a:lstStyle>
           <a:p>
             <a:fld id="{814779F6-DF54-A74A-B093-E4E0AB693425}" type="datetimeFigureOut">
-              <a:t>11/6/23</a:t>
+              <a:t>11/9/23</a:t>
             </a:fld>
             <a:endParaRPr lang="en-US"/>
           </a:p>
@@ -3754,8 +4188,8 @@
           </a:p>
         </p:txBody>
       </p:sp>
-      <mc:AlternateContent xmlns:mc="http://schemas.openxmlformats.org/markup-compatibility/2006">
-        <mc:Choice xmlns:p14="http://schemas.microsoft.com/office/powerpoint/2010/main" Requires="p14">
+      <mc:AlternateContent xmlns:mc="http://schemas.openxmlformats.org/markup-compatibility/2006" xmlns:p14="http://schemas.microsoft.com/office/powerpoint/2010/main">
+        <mc:Choice Requires="p14">
           <p:contentPart p14:bwMode="auto" r:id="rId2">
             <p14:nvContentPartPr>
               <p14:cNvPr id="15" name="Ink 14">
@@ -3774,7 +4208,7 @@
             </p14:xfrm>
           </p:contentPart>
         </mc:Choice>
-        <mc:Fallback>
+        <mc:Fallback xmlns="">
           <p:pic>
             <p:nvPicPr>
               <p:cNvPr id="15" name="Ink 14">
@@ -4002,8 +4436,8 @@
             <a:chExt cx="578520" cy="1850040"/>
           </a:xfrm>
         </p:grpSpPr>
-        <mc:AlternateContent xmlns:mc="http://schemas.openxmlformats.org/markup-compatibility/2006">
-          <mc:Choice xmlns:p14="http://schemas.microsoft.com/office/powerpoint/2010/main" Requires="p14">
+        <mc:AlternateContent xmlns:mc="http://schemas.openxmlformats.org/markup-compatibility/2006" xmlns:p14="http://schemas.microsoft.com/office/powerpoint/2010/main">
+          <mc:Choice Requires="p14">
             <p:contentPart p14:bwMode="auto" r:id="rId4">
               <p14:nvContentPartPr>
                 <p14:cNvPr id="19" name="Ink 18">
@@ -4022,7 +4456,7 @@
               </p14:xfrm>
             </p:contentPart>
           </mc:Choice>
-          <mc:Fallback>
+          <mc:Fallback xmlns="">
             <p:pic>
               <p:nvPicPr>
                 <p:cNvPr id="19" name="Ink 18">
@@ -4053,8 +4487,8 @@
             </p:pic>
           </mc:Fallback>
         </mc:AlternateContent>
-        <mc:AlternateContent xmlns:mc="http://schemas.openxmlformats.org/markup-compatibility/2006">
-          <mc:Choice xmlns:p14="http://schemas.microsoft.com/office/powerpoint/2010/main" Requires="p14">
+        <mc:AlternateContent xmlns:mc="http://schemas.openxmlformats.org/markup-compatibility/2006" xmlns:p14="http://schemas.microsoft.com/office/powerpoint/2010/main">
+          <mc:Choice Requires="p14">
             <p:contentPart p14:bwMode="auto" r:id="rId6">
               <p14:nvContentPartPr>
                 <p14:cNvPr id="20" name="Ink 19">
@@ -4073,7 +4507,7 @@
               </p14:xfrm>
             </p:contentPart>
           </mc:Choice>
-          <mc:Fallback>
+          <mc:Fallback xmlns="">
             <p:pic>
               <p:nvPicPr>
                 <p:cNvPr id="20" name="Ink 19">
@@ -4105,8 +4539,8 @@
           </mc:Fallback>
         </mc:AlternateContent>
       </p:grpSp>
-      <mc:AlternateContent xmlns:mc="http://schemas.openxmlformats.org/markup-compatibility/2006">
-        <mc:Choice xmlns:p14="http://schemas.microsoft.com/office/powerpoint/2010/main" Requires="p14">
+      <mc:AlternateContent xmlns:mc="http://schemas.openxmlformats.org/markup-compatibility/2006" xmlns:p14="http://schemas.microsoft.com/office/powerpoint/2010/main">
+        <mc:Choice Requires="p14">
           <p:contentPart p14:bwMode="auto" r:id="rId8">
             <p14:nvContentPartPr>
               <p14:cNvPr id="22" name="Ink 21">
@@ -4125,7 +4559,7 @@
             </p14:xfrm>
           </p:contentPart>
         </mc:Choice>
-        <mc:Fallback>
+        <mc:Fallback xmlns="">
           <p:pic>
             <p:nvPicPr>
               <p:cNvPr id="22" name="Ink 21">
@@ -4160,6 +4594,1879 @@
     <p:extLst>
       <p:ext uri="{BB962C8B-B14F-4D97-AF65-F5344CB8AC3E}">
         <p14:creationId xmlns:p14="http://schemas.microsoft.com/office/powerpoint/2010/main" val="3561617039"/>
+      </p:ext>
+    </p:extLst>
+  </p:cSld>
+  <p:clrMapOvr>
+    <a:masterClrMapping/>
+  </p:clrMapOvr>
+</p:sld>
+</file>
+
+<file path=ppt/slides/slide2.xml><?xml version="1.0" encoding="utf-8"?>
+<p:sld xmlns:a="http://schemas.openxmlformats.org/drawingml/2006/main" xmlns:r="http://schemas.openxmlformats.org/officeDocument/2006/relationships" xmlns:p="http://schemas.openxmlformats.org/presentationml/2006/main">
+  <p:cSld>
+    <p:spTree>
+      <p:nvGrpSpPr>
+        <p:cNvPr id="1" name=""/>
+        <p:cNvGrpSpPr/>
+        <p:nvPr/>
+      </p:nvGrpSpPr>
+      <p:grpSpPr>
+        <a:xfrm>
+          <a:off x="0" y="0"/>
+          <a:ext cx="0" cy="0"/>
+          <a:chOff x="0" y="0"/>
+          <a:chExt cx="0" cy="0"/>
+        </a:xfrm>
+      </p:grpSpPr>
+      <p:sp>
+        <p:nvSpPr>
+          <p:cNvPr id="2" name="TextBox 1">
+            <a:extLst>
+              <a:ext uri="{FF2B5EF4-FFF2-40B4-BE49-F238E27FC236}">
+                <a16:creationId xmlns:a16="http://schemas.microsoft.com/office/drawing/2014/main" id="{EBEA3E00-2C1E-1FD4-6D92-AF6C1F07D949}"/>
+              </a:ext>
+            </a:extLst>
+          </p:cNvPr>
+          <p:cNvSpPr txBox="1"/>
+          <p:nvPr/>
+        </p:nvSpPr>
+        <p:spPr>
+          <a:xfrm>
+            <a:off x="2094411" y="0"/>
+            <a:ext cx="8003177" cy="523220"/>
+          </a:xfrm>
+          <a:prstGeom prst="rect">
+            <a:avLst/>
+          </a:prstGeom>
+          <a:noFill/>
+        </p:spPr>
+        <p:txBody>
+          <a:bodyPr wrap="square" rtlCol="0">
+            <a:spAutoFit/>
+          </a:bodyPr>
+          <a:lstStyle/>
+          <a:p>
+            <a:pPr algn="ctr"/>
+            <a:r>
+              <a:rPr lang="en-US" sz="1400"/>
+              <a:t>USX01: As someone who loves to do projects myself, I want a way to organize the costs so that I can make a guided decision regarding expenses.</a:t>
+            </a:r>
+          </a:p>
+        </p:txBody>
+      </p:sp>
+      <p:sp>
+        <p:nvSpPr>
+          <p:cNvPr id="3" name="Rectangle 2">
+            <a:extLst>
+              <a:ext uri="{FF2B5EF4-FFF2-40B4-BE49-F238E27FC236}">
+                <a16:creationId xmlns:a16="http://schemas.microsoft.com/office/drawing/2014/main" id="{B2E1DC27-AB21-8B54-E892-1AA96ECFDE35}"/>
+              </a:ext>
+            </a:extLst>
+          </p:cNvPr>
+          <p:cNvSpPr/>
+          <p:nvPr/>
+        </p:nvSpPr>
+        <p:spPr>
+          <a:xfrm>
+            <a:off x="0" y="523220"/>
+            <a:ext cx="1325971" cy="494492"/>
+          </a:xfrm>
+          <a:prstGeom prst="rect">
+            <a:avLst/>
+          </a:prstGeom>
+          <a:noFill/>
+          <a:ln w="38100">
+            <a:solidFill>
+              <a:schemeClr val="accent1"/>
+            </a:solidFill>
+          </a:ln>
+        </p:spPr>
+        <p:style>
+          <a:lnRef idx="2">
+            <a:schemeClr val="accent1">
+              <a:shade val="15000"/>
+            </a:schemeClr>
+          </a:lnRef>
+          <a:fillRef idx="1">
+            <a:schemeClr val="accent1"/>
+          </a:fillRef>
+          <a:effectRef idx="0">
+            <a:schemeClr val="accent1"/>
+          </a:effectRef>
+          <a:fontRef idx="minor">
+            <a:schemeClr val="lt1"/>
+          </a:fontRef>
+        </p:style>
+        <p:txBody>
+          <a:bodyPr rtlCol="0" anchor="ctr"/>
+          <a:lstStyle/>
+          <a:p>
+            <a:pPr algn="ctr"/>
+            <a:r>
+              <a:rPr lang="en-US" sz="1200">
+                <a:solidFill>
+                  <a:schemeClr val="tx1"/>
+                </a:solidFill>
+              </a:rPr>
+              <a:t>ApplicationView</a:t>
+            </a:r>
+          </a:p>
+        </p:txBody>
+      </p:sp>
+      <p:sp>
+        <p:nvSpPr>
+          <p:cNvPr id="4" name="Rectangle 3">
+            <a:extLst>
+              <a:ext uri="{FF2B5EF4-FFF2-40B4-BE49-F238E27FC236}">
+                <a16:creationId xmlns:a16="http://schemas.microsoft.com/office/drawing/2014/main" id="{0816C600-1A57-6126-2494-67817D31F143}"/>
+              </a:ext>
+            </a:extLst>
+          </p:cNvPr>
+          <p:cNvSpPr/>
+          <p:nvPr/>
+        </p:nvSpPr>
+        <p:spPr>
+          <a:xfrm>
+            <a:off x="1545772" y="523220"/>
+            <a:ext cx="1325971" cy="494492"/>
+          </a:xfrm>
+          <a:prstGeom prst="rect">
+            <a:avLst/>
+          </a:prstGeom>
+          <a:noFill/>
+          <a:ln w="38100">
+            <a:solidFill>
+              <a:schemeClr val="accent1"/>
+            </a:solidFill>
+          </a:ln>
+        </p:spPr>
+        <p:style>
+          <a:lnRef idx="2">
+            <a:schemeClr val="accent1">
+              <a:shade val="15000"/>
+            </a:schemeClr>
+          </a:lnRef>
+          <a:fillRef idx="1">
+            <a:schemeClr val="accent1"/>
+          </a:fillRef>
+          <a:effectRef idx="0">
+            <a:schemeClr val="accent1"/>
+          </a:effectRef>
+          <a:fontRef idx="minor">
+            <a:schemeClr val="lt1"/>
+          </a:fontRef>
+        </p:style>
+        <p:txBody>
+          <a:bodyPr rtlCol="0" anchor="ctr"/>
+          <a:lstStyle/>
+          <a:p>
+            <a:pPr algn="ctr"/>
+            <a:r>
+              <a:rPr lang="en-US" sz="1200">
+                <a:solidFill>
+                  <a:schemeClr val="tx1"/>
+                </a:solidFill>
+              </a:rPr>
+              <a:t>ProjectController</a:t>
+            </a:r>
+          </a:p>
+        </p:txBody>
+      </p:sp>
+      <p:sp>
+        <p:nvSpPr>
+          <p:cNvPr id="5" name="Rectangle 4">
+            <a:extLst>
+              <a:ext uri="{FF2B5EF4-FFF2-40B4-BE49-F238E27FC236}">
+                <a16:creationId xmlns:a16="http://schemas.microsoft.com/office/drawing/2014/main" id="{7BC51680-E948-C36F-C1AA-5D2957FB752D}"/>
+              </a:ext>
+            </a:extLst>
+          </p:cNvPr>
+          <p:cNvSpPr/>
+          <p:nvPr/>
+        </p:nvSpPr>
+        <p:spPr>
+          <a:xfrm>
+            <a:off x="4637313" y="523220"/>
+            <a:ext cx="1325971" cy="494492"/>
+          </a:xfrm>
+          <a:prstGeom prst="rect">
+            <a:avLst/>
+          </a:prstGeom>
+          <a:noFill/>
+          <a:ln w="38100">
+            <a:solidFill>
+              <a:schemeClr val="accent1"/>
+            </a:solidFill>
+          </a:ln>
+        </p:spPr>
+        <p:style>
+          <a:lnRef idx="2">
+            <a:schemeClr val="accent1">
+              <a:shade val="15000"/>
+            </a:schemeClr>
+          </a:lnRef>
+          <a:fillRef idx="1">
+            <a:schemeClr val="accent1"/>
+          </a:fillRef>
+          <a:effectRef idx="0">
+            <a:schemeClr val="accent1"/>
+          </a:effectRef>
+          <a:fontRef idx="minor">
+            <a:schemeClr val="lt1"/>
+          </a:fontRef>
+        </p:style>
+        <p:txBody>
+          <a:bodyPr rtlCol="0" anchor="ctr"/>
+          <a:lstStyle/>
+          <a:p>
+            <a:pPr algn="ctr"/>
+            <a:r>
+              <a:rPr lang="en-US" sz="1200">
+                <a:solidFill>
+                  <a:schemeClr val="tx1"/>
+                </a:solidFill>
+              </a:rPr>
+              <a:t>ProjectView</a:t>
+            </a:r>
+          </a:p>
+        </p:txBody>
+      </p:sp>
+      <p:sp>
+        <p:nvSpPr>
+          <p:cNvPr id="6" name="Rectangle 5">
+            <a:extLst>
+              <a:ext uri="{FF2B5EF4-FFF2-40B4-BE49-F238E27FC236}">
+                <a16:creationId xmlns:a16="http://schemas.microsoft.com/office/drawing/2014/main" id="{BCAB8685-902F-0BFF-F75D-030E2D3A404C}"/>
+              </a:ext>
+            </a:extLst>
+          </p:cNvPr>
+          <p:cNvSpPr/>
+          <p:nvPr/>
+        </p:nvSpPr>
+        <p:spPr>
+          <a:xfrm>
+            <a:off x="6183085" y="523220"/>
+            <a:ext cx="1325971" cy="494492"/>
+          </a:xfrm>
+          <a:prstGeom prst="rect">
+            <a:avLst/>
+          </a:prstGeom>
+          <a:noFill/>
+          <a:ln w="38100">
+            <a:solidFill>
+              <a:schemeClr val="accent1"/>
+            </a:solidFill>
+          </a:ln>
+        </p:spPr>
+        <p:style>
+          <a:lnRef idx="2">
+            <a:schemeClr val="accent1">
+              <a:shade val="15000"/>
+            </a:schemeClr>
+          </a:lnRef>
+          <a:fillRef idx="1">
+            <a:schemeClr val="accent1"/>
+          </a:fillRef>
+          <a:effectRef idx="0">
+            <a:schemeClr val="accent1"/>
+          </a:effectRef>
+          <a:fontRef idx="minor">
+            <a:schemeClr val="lt1"/>
+          </a:fontRef>
+        </p:style>
+        <p:txBody>
+          <a:bodyPr rtlCol="0" anchor="ctr"/>
+          <a:lstStyle/>
+          <a:p>
+            <a:pPr algn="ctr"/>
+            <a:r>
+              <a:rPr lang="en-US" sz="1200">
+                <a:solidFill>
+                  <a:schemeClr val="tx1"/>
+                </a:solidFill>
+              </a:rPr>
+              <a:t>BudgetView</a:t>
+            </a:r>
+          </a:p>
+        </p:txBody>
+      </p:sp>
+      <p:sp>
+        <p:nvSpPr>
+          <p:cNvPr id="7" name="Rectangle 6">
+            <a:extLst>
+              <a:ext uri="{FF2B5EF4-FFF2-40B4-BE49-F238E27FC236}">
+                <a16:creationId xmlns:a16="http://schemas.microsoft.com/office/drawing/2014/main" id="{CD1D4CA1-6BBB-94F9-43ED-D1A98C2DB13C}"/>
+              </a:ext>
+            </a:extLst>
+          </p:cNvPr>
+          <p:cNvSpPr/>
+          <p:nvPr/>
+        </p:nvSpPr>
+        <p:spPr>
+          <a:xfrm>
+            <a:off x="7728857" y="523220"/>
+            <a:ext cx="1325971" cy="494492"/>
+          </a:xfrm>
+          <a:prstGeom prst="rect">
+            <a:avLst/>
+          </a:prstGeom>
+          <a:noFill/>
+          <a:ln w="38100">
+            <a:solidFill>
+              <a:schemeClr val="accent1"/>
+            </a:solidFill>
+          </a:ln>
+        </p:spPr>
+        <p:style>
+          <a:lnRef idx="2">
+            <a:schemeClr val="accent1">
+              <a:shade val="15000"/>
+            </a:schemeClr>
+          </a:lnRef>
+          <a:fillRef idx="1">
+            <a:schemeClr val="accent1"/>
+          </a:fillRef>
+          <a:effectRef idx="0">
+            <a:schemeClr val="accent1"/>
+          </a:effectRef>
+          <a:fontRef idx="minor">
+            <a:schemeClr val="lt1"/>
+          </a:fontRef>
+        </p:style>
+        <p:txBody>
+          <a:bodyPr rtlCol="0" anchor="ctr"/>
+          <a:lstStyle/>
+          <a:p>
+            <a:pPr algn="ctr"/>
+            <a:r>
+              <a:rPr lang="en-US" sz="1200">
+                <a:solidFill>
+                  <a:schemeClr val="tx1"/>
+                </a:solidFill>
+              </a:rPr>
+              <a:t>BudgetController</a:t>
+            </a:r>
+          </a:p>
+        </p:txBody>
+      </p:sp>
+      <p:sp>
+        <p:nvSpPr>
+          <p:cNvPr id="8" name="Rectangle 7">
+            <a:extLst>
+              <a:ext uri="{FF2B5EF4-FFF2-40B4-BE49-F238E27FC236}">
+                <a16:creationId xmlns:a16="http://schemas.microsoft.com/office/drawing/2014/main" id="{B544BF9E-BE1B-965A-FDAF-87252A518D67}"/>
+              </a:ext>
+            </a:extLst>
+          </p:cNvPr>
+          <p:cNvSpPr/>
+          <p:nvPr/>
+        </p:nvSpPr>
+        <p:spPr>
+          <a:xfrm>
+            <a:off x="9301887" y="523220"/>
+            <a:ext cx="1325971" cy="494492"/>
+          </a:xfrm>
+          <a:prstGeom prst="rect">
+            <a:avLst/>
+          </a:prstGeom>
+          <a:noFill/>
+          <a:ln w="38100">
+            <a:solidFill>
+              <a:schemeClr val="accent1"/>
+            </a:solidFill>
+          </a:ln>
+        </p:spPr>
+        <p:style>
+          <a:lnRef idx="2">
+            <a:schemeClr val="accent1">
+              <a:shade val="15000"/>
+            </a:schemeClr>
+          </a:lnRef>
+          <a:fillRef idx="1">
+            <a:schemeClr val="accent1"/>
+          </a:fillRef>
+          <a:effectRef idx="0">
+            <a:schemeClr val="accent1"/>
+          </a:effectRef>
+          <a:fontRef idx="minor">
+            <a:schemeClr val="lt1"/>
+          </a:fontRef>
+        </p:style>
+        <p:txBody>
+          <a:bodyPr rtlCol="0" anchor="ctr"/>
+          <a:lstStyle/>
+          <a:p>
+            <a:pPr algn="ctr"/>
+            <a:r>
+              <a:rPr lang="en-US" sz="1200">
+                <a:solidFill>
+                  <a:schemeClr val="tx1"/>
+                </a:solidFill>
+              </a:rPr>
+              <a:t>Budget</a:t>
+            </a:r>
+          </a:p>
+        </p:txBody>
+      </p:sp>
+      <p:cxnSp>
+        <p:nvCxnSpPr>
+          <p:cNvPr id="10" name="Straight Connector 9">
+            <a:extLst>
+              <a:ext uri="{FF2B5EF4-FFF2-40B4-BE49-F238E27FC236}">
+                <a16:creationId xmlns:a16="http://schemas.microsoft.com/office/drawing/2014/main" id="{9A50B79C-EE4D-1A17-57A0-F0B87B63841F}"/>
+              </a:ext>
+            </a:extLst>
+          </p:cNvPr>
+          <p:cNvCxnSpPr>
+            <a:cxnSpLocks/>
+          </p:cNvCxnSpPr>
+          <p:nvPr/>
+        </p:nvCxnSpPr>
+        <p:spPr>
+          <a:xfrm>
+            <a:off x="662985" y="1367246"/>
+            <a:ext cx="1" cy="5490754"/>
+          </a:xfrm>
+          <a:prstGeom prst="line">
+            <a:avLst/>
+          </a:prstGeom>
+          <a:ln w="38100">
+            <a:prstDash val="dash"/>
+          </a:ln>
+        </p:spPr>
+        <p:style>
+          <a:lnRef idx="1">
+            <a:schemeClr val="accent1"/>
+          </a:lnRef>
+          <a:fillRef idx="0">
+            <a:schemeClr val="accent1"/>
+          </a:fillRef>
+          <a:effectRef idx="0">
+            <a:schemeClr val="accent1"/>
+          </a:effectRef>
+          <a:fontRef idx="minor">
+            <a:schemeClr val="tx1"/>
+          </a:fontRef>
+        </p:style>
+      </p:cxnSp>
+      <p:cxnSp>
+        <p:nvCxnSpPr>
+          <p:cNvPr id="13" name="Straight Connector 12">
+            <a:extLst>
+              <a:ext uri="{FF2B5EF4-FFF2-40B4-BE49-F238E27FC236}">
+                <a16:creationId xmlns:a16="http://schemas.microsoft.com/office/drawing/2014/main" id="{C18658D6-7771-A32A-068F-37D54C16FD8A}"/>
+              </a:ext>
+            </a:extLst>
+          </p:cNvPr>
+          <p:cNvCxnSpPr>
+            <a:cxnSpLocks/>
+          </p:cNvCxnSpPr>
+          <p:nvPr/>
+        </p:nvCxnSpPr>
+        <p:spPr>
+          <a:xfrm>
+            <a:off x="2208757" y="1367246"/>
+            <a:ext cx="1" cy="5490754"/>
+          </a:xfrm>
+          <a:prstGeom prst="line">
+            <a:avLst/>
+          </a:prstGeom>
+          <a:ln w="38100">
+            <a:prstDash val="dash"/>
+          </a:ln>
+        </p:spPr>
+        <p:style>
+          <a:lnRef idx="1">
+            <a:schemeClr val="accent1"/>
+          </a:lnRef>
+          <a:fillRef idx="0">
+            <a:schemeClr val="accent1"/>
+          </a:fillRef>
+          <a:effectRef idx="0">
+            <a:schemeClr val="accent1"/>
+          </a:effectRef>
+          <a:fontRef idx="minor">
+            <a:schemeClr val="tx1"/>
+          </a:fontRef>
+        </p:style>
+      </p:cxnSp>
+      <p:cxnSp>
+        <p:nvCxnSpPr>
+          <p:cNvPr id="14" name="Straight Connector 13">
+            <a:extLst>
+              <a:ext uri="{FF2B5EF4-FFF2-40B4-BE49-F238E27FC236}">
+                <a16:creationId xmlns:a16="http://schemas.microsoft.com/office/drawing/2014/main" id="{9B29D4B6-083E-7436-DFB1-B4BD81C61A86}"/>
+              </a:ext>
+            </a:extLst>
+          </p:cNvPr>
+          <p:cNvCxnSpPr>
+            <a:cxnSpLocks/>
+          </p:cNvCxnSpPr>
+          <p:nvPr/>
+        </p:nvCxnSpPr>
+        <p:spPr>
+          <a:xfrm>
+            <a:off x="5300298" y="1367246"/>
+            <a:ext cx="1" cy="5490754"/>
+          </a:xfrm>
+          <a:prstGeom prst="line">
+            <a:avLst/>
+          </a:prstGeom>
+          <a:ln w="38100">
+            <a:prstDash val="dash"/>
+          </a:ln>
+        </p:spPr>
+        <p:style>
+          <a:lnRef idx="1">
+            <a:schemeClr val="accent1"/>
+          </a:lnRef>
+          <a:fillRef idx="0">
+            <a:schemeClr val="accent1"/>
+          </a:fillRef>
+          <a:effectRef idx="0">
+            <a:schemeClr val="accent1"/>
+          </a:effectRef>
+          <a:fontRef idx="minor">
+            <a:schemeClr val="tx1"/>
+          </a:fontRef>
+        </p:style>
+      </p:cxnSp>
+      <p:cxnSp>
+        <p:nvCxnSpPr>
+          <p:cNvPr id="15" name="Straight Connector 14">
+            <a:extLst>
+              <a:ext uri="{FF2B5EF4-FFF2-40B4-BE49-F238E27FC236}">
+                <a16:creationId xmlns:a16="http://schemas.microsoft.com/office/drawing/2014/main" id="{B28628B0-0C41-AC2E-C548-538C7642A8D7}"/>
+              </a:ext>
+            </a:extLst>
+          </p:cNvPr>
+          <p:cNvCxnSpPr>
+            <a:cxnSpLocks/>
+          </p:cNvCxnSpPr>
+          <p:nvPr/>
+        </p:nvCxnSpPr>
+        <p:spPr>
+          <a:xfrm>
+            <a:off x="6846070" y="1367246"/>
+            <a:ext cx="1" cy="5490754"/>
+          </a:xfrm>
+          <a:prstGeom prst="line">
+            <a:avLst/>
+          </a:prstGeom>
+          <a:ln w="38100">
+            <a:prstDash val="dash"/>
+          </a:ln>
+        </p:spPr>
+        <p:style>
+          <a:lnRef idx="1">
+            <a:schemeClr val="accent1"/>
+          </a:lnRef>
+          <a:fillRef idx="0">
+            <a:schemeClr val="accent1"/>
+          </a:fillRef>
+          <a:effectRef idx="0">
+            <a:schemeClr val="accent1"/>
+          </a:effectRef>
+          <a:fontRef idx="minor">
+            <a:schemeClr val="tx1"/>
+          </a:fontRef>
+        </p:style>
+      </p:cxnSp>
+      <p:cxnSp>
+        <p:nvCxnSpPr>
+          <p:cNvPr id="16" name="Straight Connector 15">
+            <a:extLst>
+              <a:ext uri="{FF2B5EF4-FFF2-40B4-BE49-F238E27FC236}">
+                <a16:creationId xmlns:a16="http://schemas.microsoft.com/office/drawing/2014/main" id="{94152CFA-14F3-BA22-29B6-4920B18E1380}"/>
+              </a:ext>
+            </a:extLst>
+          </p:cNvPr>
+          <p:cNvCxnSpPr>
+            <a:cxnSpLocks/>
+          </p:cNvCxnSpPr>
+          <p:nvPr/>
+        </p:nvCxnSpPr>
+        <p:spPr>
+          <a:xfrm>
+            <a:off x="8391842" y="1367246"/>
+            <a:ext cx="1" cy="5490754"/>
+          </a:xfrm>
+          <a:prstGeom prst="line">
+            <a:avLst/>
+          </a:prstGeom>
+          <a:ln w="38100">
+            <a:prstDash val="dash"/>
+          </a:ln>
+        </p:spPr>
+        <p:style>
+          <a:lnRef idx="1">
+            <a:schemeClr val="accent1"/>
+          </a:lnRef>
+          <a:fillRef idx="0">
+            <a:schemeClr val="accent1"/>
+          </a:fillRef>
+          <a:effectRef idx="0">
+            <a:schemeClr val="accent1"/>
+          </a:effectRef>
+          <a:fontRef idx="minor">
+            <a:schemeClr val="tx1"/>
+          </a:fontRef>
+        </p:style>
+      </p:cxnSp>
+      <p:cxnSp>
+        <p:nvCxnSpPr>
+          <p:cNvPr id="17" name="Straight Connector 16">
+            <a:extLst>
+              <a:ext uri="{FF2B5EF4-FFF2-40B4-BE49-F238E27FC236}">
+                <a16:creationId xmlns:a16="http://schemas.microsoft.com/office/drawing/2014/main" id="{591F444D-AB1F-9B35-3F55-E93EBE8A1018}"/>
+              </a:ext>
+            </a:extLst>
+          </p:cNvPr>
+          <p:cNvCxnSpPr>
+            <a:cxnSpLocks/>
+          </p:cNvCxnSpPr>
+          <p:nvPr/>
+        </p:nvCxnSpPr>
+        <p:spPr>
+          <a:xfrm>
+            <a:off x="9964871" y="1367246"/>
+            <a:ext cx="1" cy="5490754"/>
+          </a:xfrm>
+          <a:prstGeom prst="line">
+            <a:avLst/>
+          </a:prstGeom>
+          <a:ln w="38100">
+            <a:prstDash val="dash"/>
+          </a:ln>
+        </p:spPr>
+        <p:style>
+          <a:lnRef idx="1">
+            <a:schemeClr val="accent1"/>
+          </a:lnRef>
+          <a:fillRef idx="0">
+            <a:schemeClr val="accent1"/>
+          </a:fillRef>
+          <a:effectRef idx="0">
+            <a:schemeClr val="accent1"/>
+          </a:effectRef>
+          <a:fontRef idx="minor">
+            <a:schemeClr val="tx1"/>
+          </a:fontRef>
+        </p:style>
+      </p:cxnSp>
+      <p:sp>
+        <p:nvSpPr>
+          <p:cNvPr id="19" name="Rectangle 18">
+            <a:extLst>
+              <a:ext uri="{FF2B5EF4-FFF2-40B4-BE49-F238E27FC236}">
+                <a16:creationId xmlns:a16="http://schemas.microsoft.com/office/drawing/2014/main" id="{9A4E3029-9733-0F03-3CE8-E9101C934F7C}"/>
+              </a:ext>
+            </a:extLst>
+          </p:cNvPr>
+          <p:cNvSpPr/>
+          <p:nvPr/>
+        </p:nvSpPr>
+        <p:spPr>
+          <a:xfrm>
+            <a:off x="3091543" y="523220"/>
+            <a:ext cx="1325971" cy="494492"/>
+          </a:xfrm>
+          <a:prstGeom prst="rect">
+            <a:avLst/>
+          </a:prstGeom>
+          <a:noFill/>
+          <a:ln w="38100">
+            <a:solidFill>
+              <a:schemeClr val="accent1"/>
+            </a:solidFill>
+          </a:ln>
+        </p:spPr>
+        <p:style>
+          <a:lnRef idx="2">
+            <a:schemeClr val="accent1">
+              <a:shade val="15000"/>
+            </a:schemeClr>
+          </a:lnRef>
+          <a:fillRef idx="1">
+            <a:schemeClr val="accent1"/>
+          </a:fillRef>
+          <a:effectRef idx="0">
+            <a:schemeClr val="accent1"/>
+          </a:effectRef>
+          <a:fontRef idx="minor">
+            <a:schemeClr val="lt1"/>
+          </a:fontRef>
+        </p:style>
+        <p:txBody>
+          <a:bodyPr rtlCol="0" anchor="ctr"/>
+          <a:lstStyle/>
+          <a:p>
+            <a:pPr algn="ctr"/>
+            <a:r>
+              <a:rPr lang="en-US" sz="1200">
+                <a:solidFill>
+                  <a:schemeClr val="tx1"/>
+                </a:solidFill>
+              </a:rPr>
+              <a:t>Project</a:t>
+            </a:r>
+          </a:p>
+          <a:p>
+            <a:pPr algn="ctr"/>
+            <a:r>
+              <a:rPr lang="en-US" sz="1200">
+                <a:solidFill>
+                  <a:schemeClr val="tx1"/>
+                </a:solidFill>
+              </a:rPr>
+              <a:t>(LinkedList Node)</a:t>
+            </a:r>
+          </a:p>
+        </p:txBody>
+      </p:sp>
+      <p:cxnSp>
+        <p:nvCxnSpPr>
+          <p:cNvPr id="20" name="Straight Connector 19">
+            <a:extLst>
+              <a:ext uri="{FF2B5EF4-FFF2-40B4-BE49-F238E27FC236}">
+                <a16:creationId xmlns:a16="http://schemas.microsoft.com/office/drawing/2014/main" id="{31FFCC4A-3D1B-84B5-5C51-D18A3E811358}"/>
+              </a:ext>
+            </a:extLst>
+          </p:cNvPr>
+          <p:cNvCxnSpPr>
+            <a:cxnSpLocks/>
+          </p:cNvCxnSpPr>
+          <p:nvPr/>
+        </p:nvCxnSpPr>
+        <p:spPr>
+          <a:xfrm>
+            <a:off x="3754528" y="1367246"/>
+            <a:ext cx="1" cy="5490754"/>
+          </a:xfrm>
+          <a:prstGeom prst="line">
+            <a:avLst/>
+          </a:prstGeom>
+          <a:ln w="38100">
+            <a:prstDash val="dash"/>
+          </a:ln>
+        </p:spPr>
+        <p:style>
+          <a:lnRef idx="1">
+            <a:schemeClr val="accent1"/>
+          </a:lnRef>
+          <a:fillRef idx="0">
+            <a:schemeClr val="accent1"/>
+          </a:fillRef>
+          <a:effectRef idx="0">
+            <a:schemeClr val="accent1"/>
+          </a:effectRef>
+          <a:fontRef idx="minor">
+            <a:schemeClr val="tx1"/>
+          </a:fontRef>
+        </p:style>
+      </p:cxnSp>
+      <p:cxnSp>
+        <p:nvCxnSpPr>
+          <p:cNvPr id="22" name="Straight Arrow Connector 21">
+            <a:extLst>
+              <a:ext uri="{FF2B5EF4-FFF2-40B4-BE49-F238E27FC236}">
+                <a16:creationId xmlns:a16="http://schemas.microsoft.com/office/drawing/2014/main" id="{9770C1FB-52E8-EC2C-3A0C-7B7CF907C22A}"/>
+              </a:ext>
+            </a:extLst>
+          </p:cNvPr>
+          <p:cNvCxnSpPr/>
+          <p:nvPr/>
+        </p:nvCxnSpPr>
+        <p:spPr>
+          <a:xfrm>
+            <a:off x="662985" y="1872343"/>
+            <a:ext cx="1545772" cy="0"/>
+          </a:xfrm>
+          <a:prstGeom prst="straightConnector1">
+            <a:avLst/>
+          </a:prstGeom>
+          <a:ln w="38100">
+            <a:tailEnd type="triangle"/>
+          </a:ln>
+        </p:spPr>
+        <p:style>
+          <a:lnRef idx="1">
+            <a:schemeClr val="accent1"/>
+          </a:lnRef>
+          <a:fillRef idx="0">
+            <a:schemeClr val="accent1"/>
+          </a:fillRef>
+          <a:effectRef idx="0">
+            <a:schemeClr val="accent1"/>
+          </a:effectRef>
+          <a:fontRef idx="minor">
+            <a:schemeClr val="tx1"/>
+          </a:fontRef>
+        </p:style>
+      </p:cxnSp>
+      <p:sp>
+        <p:nvSpPr>
+          <p:cNvPr id="24" name="TextBox 23">
+            <a:extLst>
+              <a:ext uri="{FF2B5EF4-FFF2-40B4-BE49-F238E27FC236}">
+                <a16:creationId xmlns:a16="http://schemas.microsoft.com/office/drawing/2014/main" id="{323FF782-4104-DD2A-B2AB-FAEC0DAAC6E7}"/>
+              </a:ext>
+            </a:extLst>
+          </p:cNvPr>
+          <p:cNvSpPr txBox="1"/>
+          <p:nvPr/>
+        </p:nvSpPr>
+        <p:spPr>
+          <a:xfrm>
+            <a:off x="690248" y="1595344"/>
+            <a:ext cx="1213217" cy="276999"/>
+          </a:xfrm>
+          <a:prstGeom prst="rect">
+            <a:avLst/>
+          </a:prstGeom>
+          <a:noFill/>
+        </p:spPr>
+        <p:txBody>
+          <a:bodyPr wrap="none" rtlCol="0">
+            <a:spAutoFit/>
+          </a:bodyPr>
+          <a:lstStyle/>
+          <a:p>
+            <a:r>
+              <a:rPr lang="en-US" sz="1200"/>
+              <a:t>displayProjects()</a:t>
+            </a:r>
+          </a:p>
+        </p:txBody>
+      </p:sp>
+      <p:cxnSp>
+        <p:nvCxnSpPr>
+          <p:cNvPr id="25" name="Straight Arrow Connector 24">
+            <a:extLst>
+              <a:ext uri="{FF2B5EF4-FFF2-40B4-BE49-F238E27FC236}">
+                <a16:creationId xmlns:a16="http://schemas.microsoft.com/office/drawing/2014/main" id="{17B903B2-CE59-F5AD-ADE0-EC5BF75D6667}"/>
+              </a:ext>
+            </a:extLst>
+          </p:cNvPr>
+          <p:cNvCxnSpPr/>
+          <p:nvPr/>
+        </p:nvCxnSpPr>
+        <p:spPr>
+          <a:xfrm>
+            <a:off x="2207619" y="2196389"/>
+            <a:ext cx="1545772" cy="0"/>
+          </a:xfrm>
+          <a:prstGeom prst="straightConnector1">
+            <a:avLst/>
+          </a:prstGeom>
+          <a:ln w="38100">
+            <a:tailEnd type="triangle"/>
+          </a:ln>
+        </p:spPr>
+        <p:style>
+          <a:lnRef idx="1">
+            <a:schemeClr val="accent1"/>
+          </a:lnRef>
+          <a:fillRef idx="0">
+            <a:schemeClr val="accent1"/>
+          </a:fillRef>
+          <a:effectRef idx="0">
+            <a:schemeClr val="accent1"/>
+          </a:effectRef>
+          <a:fontRef idx="minor">
+            <a:schemeClr val="tx1"/>
+          </a:fontRef>
+        </p:style>
+      </p:cxnSp>
+      <p:sp>
+        <p:nvSpPr>
+          <p:cNvPr id="26" name="TextBox 25">
+            <a:extLst>
+              <a:ext uri="{FF2B5EF4-FFF2-40B4-BE49-F238E27FC236}">
+                <a16:creationId xmlns:a16="http://schemas.microsoft.com/office/drawing/2014/main" id="{1F9534FE-41C9-7F5E-E9BB-721D6EDDF448}"/>
+              </a:ext>
+            </a:extLst>
+          </p:cNvPr>
+          <p:cNvSpPr txBox="1"/>
+          <p:nvPr/>
+        </p:nvSpPr>
+        <p:spPr>
+          <a:xfrm>
+            <a:off x="2208755" y="1919390"/>
+            <a:ext cx="919034" cy="276999"/>
+          </a:xfrm>
+          <a:prstGeom prst="rect">
+            <a:avLst/>
+          </a:prstGeom>
+          <a:noFill/>
+        </p:spPr>
+        <p:txBody>
+          <a:bodyPr wrap="none" rtlCol="0">
+            <a:spAutoFit/>
+          </a:bodyPr>
+          <a:lstStyle/>
+          <a:p>
+            <a:r>
+              <a:rPr lang="en-US" sz="1200"/>
+              <a:t>getProject()</a:t>
+            </a:r>
+          </a:p>
+        </p:txBody>
+      </p:sp>
+      <p:cxnSp>
+        <p:nvCxnSpPr>
+          <p:cNvPr id="27" name="Straight Arrow Connector 26">
+            <a:extLst>
+              <a:ext uri="{FF2B5EF4-FFF2-40B4-BE49-F238E27FC236}">
+                <a16:creationId xmlns:a16="http://schemas.microsoft.com/office/drawing/2014/main" id="{F11E677F-956F-9DD2-CC4C-3B9DFA9BDFF8}"/>
+              </a:ext>
+            </a:extLst>
+          </p:cNvPr>
+          <p:cNvCxnSpPr/>
+          <p:nvPr/>
+        </p:nvCxnSpPr>
+        <p:spPr>
+          <a:xfrm>
+            <a:off x="2202319" y="2545923"/>
+            <a:ext cx="1545772" cy="0"/>
+          </a:xfrm>
+          <a:prstGeom prst="straightConnector1">
+            <a:avLst/>
+          </a:prstGeom>
+          <a:ln w="38100">
+            <a:prstDash val="dash"/>
+            <a:headEnd type="triangle"/>
+            <a:tailEnd type="none"/>
+          </a:ln>
+        </p:spPr>
+        <p:style>
+          <a:lnRef idx="1">
+            <a:schemeClr val="accent1"/>
+          </a:lnRef>
+          <a:fillRef idx="0">
+            <a:schemeClr val="accent1"/>
+          </a:fillRef>
+          <a:effectRef idx="0">
+            <a:schemeClr val="accent1"/>
+          </a:effectRef>
+          <a:fontRef idx="minor">
+            <a:schemeClr val="tx1"/>
+          </a:fontRef>
+        </p:style>
+      </p:cxnSp>
+      <p:sp>
+        <p:nvSpPr>
+          <p:cNvPr id="28" name="TextBox 27">
+            <a:extLst>
+              <a:ext uri="{FF2B5EF4-FFF2-40B4-BE49-F238E27FC236}">
+                <a16:creationId xmlns:a16="http://schemas.microsoft.com/office/drawing/2014/main" id="{DEB56BA3-74F0-52D4-AC57-804F93439A72}"/>
+              </a:ext>
+            </a:extLst>
+          </p:cNvPr>
+          <p:cNvSpPr txBox="1"/>
+          <p:nvPr/>
+        </p:nvSpPr>
+        <p:spPr>
+          <a:xfrm>
+            <a:off x="2829056" y="2268924"/>
+            <a:ext cx="919034" cy="276999"/>
+          </a:xfrm>
+          <a:prstGeom prst="rect">
+            <a:avLst/>
+          </a:prstGeom>
+          <a:noFill/>
+        </p:spPr>
+        <p:txBody>
+          <a:bodyPr wrap="none" rtlCol="0">
+            <a:spAutoFit/>
+          </a:bodyPr>
+          <a:lstStyle/>
+          <a:p>
+            <a:pPr algn="r"/>
+            <a:r>
+              <a:rPr lang="en-US" sz="1200"/>
+              <a:t>getProject()</a:t>
+            </a:r>
+          </a:p>
+        </p:txBody>
+      </p:sp>
+      <p:cxnSp>
+        <p:nvCxnSpPr>
+          <p:cNvPr id="29" name="Straight Arrow Connector 28">
+            <a:extLst>
+              <a:ext uri="{FF2B5EF4-FFF2-40B4-BE49-F238E27FC236}">
+                <a16:creationId xmlns:a16="http://schemas.microsoft.com/office/drawing/2014/main" id="{FE07BC42-1133-6272-4A86-24AA7A2BE3F0}"/>
+              </a:ext>
+            </a:extLst>
+          </p:cNvPr>
+          <p:cNvCxnSpPr/>
+          <p:nvPr/>
+        </p:nvCxnSpPr>
+        <p:spPr>
+          <a:xfrm>
+            <a:off x="668288" y="2929802"/>
+            <a:ext cx="1545772" cy="0"/>
+          </a:xfrm>
+          <a:prstGeom prst="straightConnector1">
+            <a:avLst/>
+          </a:prstGeom>
+          <a:ln w="38100">
+            <a:tailEnd type="triangle"/>
+          </a:ln>
+        </p:spPr>
+        <p:style>
+          <a:lnRef idx="1">
+            <a:schemeClr val="accent1"/>
+          </a:lnRef>
+          <a:fillRef idx="0">
+            <a:schemeClr val="accent1"/>
+          </a:fillRef>
+          <a:effectRef idx="0">
+            <a:schemeClr val="accent1"/>
+          </a:effectRef>
+          <a:fontRef idx="minor">
+            <a:schemeClr val="tx1"/>
+          </a:fontRef>
+        </p:style>
+      </p:cxnSp>
+      <p:sp>
+        <p:nvSpPr>
+          <p:cNvPr id="30" name="TextBox 29">
+            <a:extLst>
+              <a:ext uri="{FF2B5EF4-FFF2-40B4-BE49-F238E27FC236}">
+                <a16:creationId xmlns:a16="http://schemas.microsoft.com/office/drawing/2014/main" id="{3FE2AE8F-8237-0622-0F64-07DC40B5CA2D}"/>
+              </a:ext>
+            </a:extLst>
+          </p:cNvPr>
+          <p:cNvSpPr txBox="1"/>
+          <p:nvPr/>
+        </p:nvSpPr>
+        <p:spPr>
+          <a:xfrm>
+            <a:off x="690248" y="2652803"/>
+            <a:ext cx="1087862" cy="276999"/>
+          </a:xfrm>
+          <a:prstGeom prst="rect">
+            <a:avLst/>
+          </a:prstGeom>
+          <a:noFill/>
+        </p:spPr>
+        <p:txBody>
+          <a:bodyPr wrap="none" rtlCol="0">
+            <a:spAutoFit/>
+          </a:bodyPr>
+          <a:lstStyle/>
+          <a:p>
+            <a:r>
+              <a:rPr lang="en-US" sz="1200"/>
+              <a:t>selectProject()</a:t>
+            </a:r>
+          </a:p>
+        </p:txBody>
+      </p:sp>
+      <p:cxnSp>
+        <p:nvCxnSpPr>
+          <p:cNvPr id="31" name="Straight Arrow Connector 30">
+            <a:extLst>
+              <a:ext uri="{FF2B5EF4-FFF2-40B4-BE49-F238E27FC236}">
+                <a16:creationId xmlns:a16="http://schemas.microsoft.com/office/drawing/2014/main" id="{6FCA5939-4CE9-F54A-DEE1-4D5CDC37F998}"/>
+              </a:ext>
+            </a:extLst>
+          </p:cNvPr>
+          <p:cNvCxnSpPr>
+            <a:cxnSpLocks/>
+          </p:cNvCxnSpPr>
+          <p:nvPr/>
+        </p:nvCxnSpPr>
+        <p:spPr>
+          <a:xfrm>
+            <a:off x="669426" y="3350337"/>
+            <a:ext cx="1539329" cy="0"/>
+          </a:xfrm>
+          <a:prstGeom prst="straightConnector1">
+            <a:avLst/>
+          </a:prstGeom>
+          <a:ln w="38100">
+            <a:tailEnd type="triangle"/>
+          </a:ln>
+        </p:spPr>
+        <p:style>
+          <a:lnRef idx="1">
+            <a:schemeClr val="accent1"/>
+          </a:lnRef>
+          <a:fillRef idx="0">
+            <a:schemeClr val="accent1"/>
+          </a:fillRef>
+          <a:effectRef idx="0">
+            <a:schemeClr val="accent1"/>
+          </a:effectRef>
+          <a:fontRef idx="minor">
+            <a:schemeClr val="tx1"/>
+          </a:fontRef>
+        </p:style>
+      </p:cxnSp>
+      <p:sp>
+        <p:nvSpPr>
+          <p:cNvPr id="32" name="TextBox 31">
+            <a:extLst>
+              <a:ext uri="{FF2B5EF4-FFF2-40B4-BE49-F238E27FC236}">
+                <a16:creationId xmlns:a16="http://schemas.microsoft.com/office/drawing/2014/main" id="{474E4AC8-20E6-4300-FC2D-7CCA734085A8}"/>
+              </a:ext>
+            </a:extLst>
+          </p:cNvPr>
+          <p:cNvSpPr txBox="1"/>
+          <p:nvPr/>
+        </p:nvSpPr>
+        <p:spPr>
+          <a:xfrm>
+            <a:off x="691386" y="3073338"/>
+            <a:ext cx="1460913" cy="276999"/>
+          </a:xfrm>
+          <a:prstGeom prst="rect">
+            <a:avLst/>
+          </a:prstGeom>
+          <a:noFill/>
+        </p:spPr>
+        <p:txBody>
+          <a:bodyPr wrap="none" rtlCol="0">
+            <a:spAutoFit/>
+          </a:bodyPr>
+          <a:lstStyle/>
+          <a:p>
+            <a:r>
+              <a:rPr lang="en-US" sz="1200"/>
+              <a:t>displayProjectView()</a:t>
+            </a:r>
+          </a:p>
+        </p:txBody>
+      </p:sp>
+      <p:cxnSp>
+        <p:nvCxnSpPr>
+          <p:cNvPr id="37" name="Straight Arrow Connector 36">
+            <a:extLst>
+              <a:ext uri="{FF2B5EF4-FFF2-40B4-BE49-F238E27FC236}">
+                <a16:creationId xmlns:a16="http://schemas.microsoft.com/office/drawing/2014/main" id="{5CEE47E0-4F02-9D5F-3F4C-69474ECB9725}"/>
+              </a:ext>
+            </a:extLst>
+          </p:cNvPr>
+          <p:cNvCxnSpPr>
+            <a:cxnSpLocks/>
+          </p:cNvCxnSpPr>
+          <p:nvPr/>
+        </p:nvCxnSpPr>
+        <p:spPr>
+          <a:xfrm>
+            <a:off x="2208755" y="3350337"/>
+            <a:ext cx="3086242" cy="0"/>
+          </a:xfrm>
+          <a:prstGeom prst="straightConnector1">
+            <a:avLst/>
+          </a:prstGeom>
+          <a:ln w="38100">
+            <a:tailEnd type="triangle"/>
+          </a:ln>
+        </p:spPr>
+        <p:style>
+          <a:lnRef idx="1">
+            <a:schemeClr val="accent1"/>
+          </a:lnRef>
+          <a:fillRef idx="0">
+            <a:schemeClr val="accent1"/>
+          </a:fillRef>
+          <a:effectRef idx="0">
+            <a:schemeClr val="accent1"/>
+          </a:effectRef>
+          <a:fontRef idx="minor">
+            <a:schemeClr val="tx1"/>
+          </a:fontRef>
+        </p:style>
+      </p:cxnSp>
+      <p:sp>
+        <p:nvSpPr>
+          <p:cNvPr id="38" name="TextBox 37">
+            <a:extLst>
+              <a:ext uri="{FF2B5EF4-FFF2-40B4-BE49-F238E27FC236}">
+                <a16:creationId xmlns:a16="http://schemas.microsoft.com/office/drawing/2014/main" id="{38C2E777-F88E-CB5D-B3F5-A6E074C30C93}"/>
+              </a:ext>
+            </a:extLst>
+          </p:cNvPr>
+          <p:cNvSpPr txBox="1"/>
+          <p:nvPr/>
+        </p:nvSpPr>
+        <p:spPr>
+          <a:xfrm>
+            <a:off x="2253446" y="3073338"/>
+            <a:ext cx="1460907" cy="276999"/>
+          </a:xfrm>
+          <a:prstGeom prst="rect">
+            <a:avLst/>
+          </a:prstGeom>
+          <a:noFill/>
+        </p:spPr>
+        <p:txBody>
+          <a:bodyPr wrap="square" rtlCol="0">
+            <a:spAutoFit/>
+          </a:bodyPr>
+          <a:lstStyle/>
+          <a:p>
+            <a:r>
+              <a:rPr lang="en-US" sz="1200"/>
+              <a:t>displayProjectView()</a:t>
+            </a:r>
+          </a:p>
+        </p:txBody>
+      </p:sp>
+      <p:cxnSp>
+        <p:nvCxnSpPr>
+          <p:cNvPr id="40" name="Straight Arrow Connector 39">
+            <a:extLst>
+              <a:ext uri="{FF2B5EF4-FFF2-40B4-BE49-F238E27FC236}">
+                <a16:creationId xmlns:a16="http://schemas.microsoft.com/office/drawing/2014/main" id="{DFFB0CEE-9BA7-14B2-CA02-1F3C070B9249}"/>
+              </a:ext>
+            </a:extLst>
+          </p:cNvPr>
+          <p:cNvCxnSpPr>
+            <a:cxnSpLocks/>
+          </p:cNvCxnSpPr>
+          <p:nvPr/>
+        </p:nvCxnSpPr>
+        <p:spPr>
+          <a:xfrm>
+            <a:off x="5305597" y="3705999"/>
+            <a:ext cx="1539329" cy="0"/>
+          </a:xfrm>
+          <a:prstGeom prst="straightConnector1">
+            <a:avLst/>
+          </a:prstGeom>
+          <a:ln w="38100">
+            <a:tailEnd type="triangle"/>
+          </a:ln>
+        </p:spPr>
+        <p:style>
+          <a:lnRef idx="1">
+            <a:schemeClr val="accent1"/>
+          </a:lnRef>
+          <a:fillRef idx="0">
+            <a:schemeClr val="accent1"/>
+          </a:fillRef>
+          <a:effectRef idx="0">
+            <a:schemeClr val="accent1"/>
+          </a:effectRef>
+          <a:fontRef idx="minor">
+            <a:schemeClr val="tx1"/>
+          </a:fontRef>
+        </p:style>
+      </p:cxnSp>
+      <p:sp>
+        <p:nvSpPr>
+          <p:cNvPr id="41" name="TextBox 40">
+            <a:extLst>
+              <a:ext uri="{FF2B5EF4-FFF2-40B4-BE49-F238E27FC236}">
+                <a16:creationId xmlns:a16="http://schemas.microsoft.com/office/drawing/2014/main" id="{B76C3523-7AB2-EF97-FEF8-904DF6E55872}"/>
+              </a:ext>
+            </a:extLst>
+          </p:cNvPr>
+          <p:cNvSpPr txBox="1"/>
+          <p:nvPr/>
+        </p:nvSpPr>
+        <p:spPr>
+          <a:xfrm>
+            <a:off x="5327558" y="3464281"/>
+            <a:ext cx="1491256" cy="230832"/>
+          </a:xfrm>
+          <a:prstGeom prst="rect">
+            <a:avLst/>
+          </a:prstGeom>
+          <a:noFill/>
+        </p:spPr>
+        <p:txBody>
+          <a:bodyPr wrap="square" rtlCol="0">
+            <a:spAutoFit/>
+          </a:bodyPr>
+          <a:lstStyle/>
+          <a:p>
+            <a:r>
+              <a:rPr lang="en-US" sz="900"/>
+              <a:t>displayBudgetView(Project)</a:t>
+            </a:r>
+          </a:p>
+        </p:txBody>
+      </p:sp>
+      <p:cxnSp>
+        <p:nvCxnSpPr>
+          <p:cNvPr id="45" name="Straight Arrow Connector 44">
+            <a:extLst>
+              <a:ext uri="{FF2B5EF4-FFF2-40B4-BE49-F238E27FC236}">
+                <a16:creationId xmlns:a16="http://schemas.microsoft.com/office/drawing/2014/main" id="{2FF5D4A1-6396-506A-A8EE-BBC0E58BD81F}"/>
+              </a:ext>
+            </a:extLst>
+          </p:cNvPr>
+          <p:cNvCxnSpPr>
+            <a:cxnSpLocks/>
+          </p:cNvCxnSpPr>
+          <p:nvPr/>
+        </p:nvCxnSpPr>
+        <p:spPr>
+          <a:xfrm>
+            <a:off x="6842623" y="5075390"/>
+            <a:ext cx="1539329" cy="0"/>
+          </a:xfrm>
+          <a:prstGeom prst="straightConnector1">
+            <a:avLst/>
+          </a:prstGeom>
+          <a:ln w="38100">
+            <a:tailEnd type="triangle"/>
+          </a:ln>
+        </p:spPr>
+        <p:style>
+          <a:lnRef idx="1">
+            <a:schemeClr val="accent1"/>
+          </a:lnRef>
+          <a:fillRef idx="0">
+            <a:schemeClr val="accent1"/>
+          </a:fillRef>
+          <a:effectRef idx="0">
+            <a:schemeClr val="accent1"/>
+          </a:effectRef>
+          <a:fontRef idx="minor">
+            <a:schemeClr val="tx1"/>
+          </a:fontRef>
+        </p:style>
+      </p:cxnSp>
+      <p:sp>
+        <p:nvSpPr>
+          <p:cNvPr id="46" name="TextBox 45">
+            <a:extLst>
+              <a:ext uri="{FF2B5EF4-FFF2-40B4-BE49-F238E27FC236}">
+                <a16:creationId xmlns:a16="http://schemas.microsoft.com/office/drawing/2014/main" id="{5C5C9326-1477-B5D7-499B-3EBCE5557DCD}"/>
+              </a:ext>
+            </a:extLst>
+          </p:cNvPr>
+          <p:cNvSpPr txBox="1"/>
+          <p:nvPr/>
+        </p:nvSpPr>
+        <p:spPr>
+          <a:xfrm>
+            <a:off x="6864583" y="4798391"/>
+            <a:ext cx="1508746" cy="246221"/>
+          </a:xfrm>
+          <a:prstGeom prst="rect">
+            <a:avLst/>
+          </a:prstGeom>
+          <a:noFill/>
+        </p:spPr>
+        <p:txBody>
+          <a:bodyPr wrap="none" rtlCol="0">
+            <a:spAutoFit/>
+          </a:bodyPr>
+          <a:lstStyle/>
+          <a:p>
+            <a:r>
+              <a:rPr lang="en-US" sz="1000"/>
+              <a:t>addNewItem(cost, name)</a:t>
+            </a:r>
+          </a:p>
+        </p:txBody>
+      </p:sp>
+      <p:cxnSp>
+        <p:nvCxnSpPr>
+          <p:cNvPr id="49" name="Straight Arrow Connector 48">
+            <a:extLst>
+              <a:ext uri="{FF2B5EF4-FFF2-40B4-BE49-F238E27FC236}">
+                <a16:creationId xmlns:a16="http://schemas.microsoft.com/office/drawing/2014/main" id="{6176B197-71FF-8048-8B44-9821B5FB178A}"/>
+              </a:ext>
+            </a:extLst>
+          </p:cNvPr>
+          <p:cNvCxnSpPr/>
+          <p:nvPr/>
+        </p:nvCxnSpPr>
+        <p:spPr>
+          <a:xfrm>
+            <a:off x="6836181" y="5736205"/>
+            <a:ext cx="1545772" cy="0"/>
+          </a:xfrm>
+          <a:prstGeom prst="straightConnector1">
+            <a:avLst/>
+          </a:prstGeom>
+          <a:ln w="38100">
+            <a:prstDash val="dash"/>
+            <a:headEnd type="triangle"/>
+            <a:tailEnd type="none"/>
+          </a:ln>
+        </p:spPr>
+        <p:style>
+          <a:lnRef idx="1">
+            <a:schemeClr val="accent1"/>
+          </a:lnRef>
+          <a:fillRef idx="0">
+            <a:schemeClr val="accent1"/>
+          </a:fillRef>
+          <a:effectRef idx="0">
+            <a:schemeClr val="accent1"/>
+          </a:effectRef>
+          <a:fontRef idx="minor">
+            <a:schemeClr val="tx1"/>
+          </a:fontRef>
+        </p:style>
+      </p:cxnSp>
+      <p:sp>
+        <p:nvSpPr>
+          <p:cNvPr id="50" name="TextBox 49">
+            <a:extLst>
+              <a:ext uri="{FF2B5EF4-FFF2-40B4-BE49-F238E27FC236}">
+                <a16:creationId xmlns:a16="http://schemas.microsoft.com/office/drawing/2014/main" id="{FFCAFF18-628F-89BA-D60F-C094D3564D42}"/>
+              </a:ext>
+            </a:extLst>
+          </p:cNvPr>
+          <p:cNvSpPr txBox="1"/>
+          <p:nvPr/>
+        </p:nvSpPr>
+        <p:spPr>
+          <a:xfrm>
+            <a:off x="6882350" y="5459206"/>
+            <a:ext cx="1467518" cy="276999"/>
+          </a:xfrm>
+          <a:prstGeom prst="rect">
+            <a:avLst/>
+          </a:prstGeom>
+          <a:noFill/>
+        </p:spPr>
+        <p:txBody>
+          <a:bodyPr wrap="none" rtlCol="0">
+            <a:spAutoFit/>
+          </a:bodyPr>
+          <a:lstStyle/>
+          <a:p>
+            <a:pPr algn="r"/>
+            <a:r>
+              <a:rPr lang="en-US" sz="1200"/>
+              <a:t>updateBudgetView()</a:t>
+            </a:r>
+          </a:p>
+        </p:txBody>
+      </p:sp>
+      <p:sp>
+        <p:nvSpPr>
+          <p:cNvPr id="51" name="Rectangle 50">
+            <a:extLst>
+              <a:ext uri="{FF2B5EF4-FFF2-40B4-BE49-F238E27FC236}">
+                <a16:creationId xmlns:a16="http://schemas.microsoft.com/office/drawing/2014/main" id="{4EB267CD-7D05-A05D-3907-5A5E0F65BEDB}"/>
+              </a:ext>
+            </a:extLst>
+          </p:cNvPr>
+          <p:cNvSpPr/>
+          <p:nvPr/>
+        </p:nvSpPr>
+        <p:spPr>
+          <a:xfrm>
+            <a:off x="10874917" y="523220"/>
+            <a:ext cx="1325971" cy="494492"/>
+          </a:xfrm>
+          <a:prstGeom prst="rect">
+            <a:avLst/>
+          </a:prstGeom>
+          <a:noFill/>
+          <a:ln w="38100">
+            <a:solidFill>
+              <a:schemeClr val="accent1"/>
+            </a:solidFill>
+          </a:ln>
+        </p:spPr>
+        <p:style>
+          <a:lnRef idx="2">
+            <a:schemeClr val="accent1">
+              <a:shade val="15000"/>
+            </a:schemeClr>
+          </a:lnRef>
+          <a:fillRef idx="1">
+            <a:schemeClr val="accent1"/>
+          </a:fillRef>
+          <a:effectRef idx="0">
+            <a:schemeClr val="accent1"/>
+          </a:effectRef>
+          <a:fontRef idx="minor">
+            <a:schemeClr val="lt1"/>
+          </a:fontRef>
+        </p:style>
+        <p:txBody>
+          <a:bodyPr rtlCol="0" anchor="ctr"/>
+          <a:lstStyle/>
+          <a:p>
+            <a:pPr algn="ctr"/>
+            <a:r>
+              <a:rPr lang="en-US" sz="1200">
+                <a:solidFill>
+                  <a:schemeClr val="tx1"/>
+                </a:solidFill>
+              </a:rPr>
+              <a:t>Item</a:t>
+            </a:r>
+          </a:p>
+          <a:p>
+            <a:pPr algn="ctr"/>
+            <a:r>
+              <a:rPr lang="en-US" sz="1200">
+                <a:solidFill>
+                  <a:schemeClr val="tx1"/>
+                </a:solidFill>
+              </a:rPr>
+              <a:t>(LinkedList Node)</a:t>
+            </a:r>
+          </a:p>
+        </p:txBody>
+      </p:sp>
+      <p:cxnSp>
+        <p:nvCxnSpPr>
+          <p:cNvPr id="52" name="Straight Connector 51">
+            <a:extLst>
+              <a:ext uri="{FF2B5EF4-FFF2-40B4-BE49-F238E27FC236}">
+                <a16:creationId xmlns:a16="http://schemas.microsoft.com/office/drawing/2014/main" id="{D7EB0975-C728-CBDC-0095-10CA4237FD23}"/>
+              </a:ext>
+            </a:extLst>
+          </p:cNvPr>
+          <p:cNvCxnSpPr>
+            <a:cxnSpLocks/>
+          </p:cNvCxnSpPr>
+          <p:nvPr/>
+        </p:nvCxnSpPr>
+        <p:spPr>
+          <a:xfrm>
+            <a:off x="11537901" y="1367246"/>
+            <a:ext cx="1" cy="5490754"/>
+          </a:xfrm>
+          <a:prstGeom prst="line">
+            <a:avLst/>
+          </a:prstGeom>
+          <a:ln w="38100">
+            <a:prstDash val="dash"/>
+          </a:ln>
+        </p:spPr>
+        <p:style>
+          <a:lnRef idx="1">
+            <a:schemeClr val="accent1"/>
+          </a:lnRef>
+          <a:fillRef idx="0">
+            <a:schemeClr val="accent1"/>
+          </a:fillRef>
+          <a:effectRef idx="0">
+            <a:schemeClr val="accent1"/>
+          </a:effectRef>
+          <a:fontRef idx="minor">
+            <a:schemeClr val="tx1"/>
+          </a:fontRef>
+        </p:style>
+      </p:cxnSp>
+      <p:cxnSp>
+        <p:nvCxnSpPr>
+          <p:cNvPr id="53" name="Straight Arrow Connector 52">
+            <a:extLst>
+              <a:ext uri="{FF2B5EF4-FFF2-40B4-BE49-F238E27FC236}">
+                <a16:creationId xmlns:a16="http://schemas.microsoft.com/office/drawing/2014/main" id="{29AE5B82-535F-2774-66CD-8A90705C8F30}"/>
+              </a:ext>
+            </a:extLst>
+          </p:cNvPr>
+          <p:cNvCxnSpPr/>
+          <p:nvPr/>
+        </p:nvCxnSpPr>
+        <p:spPr>
+          <a:xfrm>
+            <a:off x="6853155" y="4043135"/>
+            <a:ext cx="1545772" cy="0"/>
+          </a:xfrm>
+          <a:prstGeom prst="straightConnector1">
+            <a:avLst/>
+          </a:prstGeom>
+          <a:ln w="38100">
+            <a:tailEnd type="triangle"/>
+          </a:ln>
+        </p:spPr>
+        <p:style>
+          <a:lnRef idx="1">
+            <a:schemeClr val="accent1"/>
+          </a:lnRef>
+          <a:fillRef idx="0">
+            <a:schemeClr val="accent1"/>
+          </a:fillRef>
+          <a:effectRef idx="0">
+            <a:schemeClr val="accent1"/>
+          </a:effectRef>
+          <a:fontRef idx="minor">
+            <a:schemeClr val="tx1"/>
+          </a:fontRef>
+        </p:style>
+      </p:cxnSp>
+      <p:sp>
+        <p:nvSpPr>
+          <p:cNvPr id="54" name="TextBox 53">
+            <a:extLst>
+              <a:ext uri="{FF2B5EF4-FFF2-40B4-BE49-F238E27FC236}">
+                <a16:creationId xmlns:a16="http://schemas.microsoft.com/office/drawing/2014/main" id="{6C2E117C-AC19-E42A-C4BC-904655AD618C}"/>
+              </a:ext>
+            </a:extLst>
+          </p:cNvPr>
+          <p:cNvSpPr txBox="1"/>
+          <p:nvPr/>
+        </p:nvSpPr>
+        <p:spPr>
+          <a:xfrm>
+            <a:off x="6880418" y="3766136"/>
+            <a:ext cx="1058560" cy="276999"/>
+          </a:xfrm>
+          <a:prstGeom prst="rect">
+            <a:avLst/>
+          </a:prstGeom>
+          <a:noFill/>
+        </p:spPr>
+        <p:txBody>
+          <a:bodyPr wrap="none" rtlCol="0">
+            <a:spAutoFit/>
+          </a:bodyPr>
+          <a:lstStyle/>
+          <a:p>
+            <a:r>
+              <a:rPr lang="en-US" sz="1200"/>
+              <a:t>displayItems()</a:t>
+            </a:r>
+          </a:p>
+        </p:txBody>
+      </p:sp>
+      <p:cxnSp>
+        <p:nvCxnSpPr>
+          <p:cNvPr id="55" name="Straight Arrow Connector 54">
+            <a:extLst>
+              <a:ext uri="{FF2B5EF4-FFF2-40B4-BE49-F238E27FC236}">
+                <a16:creationId xmlns:a16="http://schemas.microsoft.com/office/drawing/2014/main" id="{2C94AC4B-70D0-D8AD-B553-67A9FEAC8869}"/>
+              </a:ext>
+            </a:extLst>
+          </p:cNvPr>
+          <p:cNvCxnSpPr>
+            <a:cxnSpLocks/>
+          </p:cNvCxnSpPr>
+          <p:nvPr/>
+        </p:nvCxnSpPr>
+        <p:spPr>
+          <a:xfrm>
+            <a:off x="8405485" y="4370094"/>
+            <a:ext cx="3132416" cy="0"/>
+          </a:xfrm>
+          <a:prstGeom prst="straightConnector1">
+            <a:avLst/>
+          </a:prstGeom>
+          <a:ln w="38100">
+            <a:tailEnd type="triangle"/>
+          </a:ln>
+        </p:spPr>
+        <p:style>
+          <a:lnRef idx="1">
+            <a:schemeClr val="accent1"/>
+          </a:lnRef>
+          <a:fillRef idx="0">
+            <a:schemeClr val="accent1"/>
+          </a:fillRef>
+          <a:effectRef idx="0">
+            <a:schemeClr val="accent1"/>
+          </a:effectRef>
+          <a:fontRef idx="minor">
+            <a:schemeClr val="tx1"/>
+          </a:fontRef>
+        </p:style>
+      </p:cxnSp>
+      <p:sp>
+        <p:nvSpPr>
+          <p:cNvPr id="56" name="TextBox 55">
+            <a:extLst>
+              <a:ext uri="{FF2B5EF4-FFF2-40B4-BE49-F238E27FC236}">
+                <a16:creationId xmlns:a16="http://schemas.microsoft.com/office/drawing/2014/main" id="{216642CF-3106-9EB3-D9AE-BEAF33B7CD63}"/>
+              </a:ext>
+            </a:extLst>
+          </p:cNvPr>
+          <p:cNvSpPr txBox="1"/>
+          <p:nvPr/>
+        </p:nvSpPr>
+        <p:spPr>
+          <a:xfrm>
+            <a:off x="8406621" y="4093095"/>
+            <a:ext cx="764376" cy="276999"/>
+          </a:xfrm>
+          <a:prstGeom prst="rect">
+            <a:avLst/>
+          </a:prstGeom>
+          <a:noFill/>
+        </p:spPr>
+        <p:txBody>
+          <a:bodyPr wrap="none" rtlCol="0">
+            <a:spAutoFit/>
+          </a:bodyPr>
+          <a:lstStyle/>
+          <a:p>
+            <a:r>
+              <a:rPr lang="en-US" sz="1200"/>
+              <a:t>getItem()</a:t>
+            </a:r>
+          </a:p>
+        </p:txBody>
+      </p:sp>
+      <p:cxnSp>
+        <p:nvCxnSpPr>
+          <p:cNvPr id="57" name="Straight Arrow Connector 56">
+            <a:extLst>
+              <a:ext uri="{FF2B5EF4-FFF2-40B4-BE49-F238E27FC236}">
+                <a16:creationId xmlns:a16="http://schemas.microsoft.com/office/drawing/2014/main" id="{27BEC834-4F6A-E213-CF7D-CEA190B4B7F0}"/>
+              </a:ext>
+            </a:extLst>
+          </p:cNvPr>
+          <p:cNvCxnSpPr>
+            <a:cxnSpLocks/>
+          </p:cNvCxnSpPr>
+          <p:nvPr/>
+        </p:nvCxnSpPr>
+        <p:spPr>
+          <a:xfrm>
+            <a:off x="8400185" y="4719628"/>
+            <a:ext cx="3137716" cy="0"/>
+          </a:xfrm>
+          <a:prstGeom prst="straightConnector1">
+            <a:avLst/>
+          </a:prstGeom>
+          <a:ln w="38100">
+            <a:prstDash val="dash"/>
+            <a:headEnd type="triangle"/>
+            <a:tailEnd type="none"/>
+          </a:ln>
+        </p:spPr>
+        <p:style>
+          <a:lnRef idx="1">
+            <a:schemeClr val="accent1"/>
+          </a:lnRef>
+          <a:fillRef idx="0">
+            <a:schemeClr val="accent1"/>
+          </a:fillRef>
+          <a:effectRef idx="0">
+            <a:schemeClr val="accent1"/>
+          </a:effectRef>
+          <a:fontRef idx="minor">
+            <a:schemeClr val="tx1"/>
+          </a:fontRef>
+        </p:style>
+      </p:cxnSp>
+      <p:sp>
+        <p:nvSpPr>
+          <p:cNvPr id="58" name="TextBox 57">
+            <a:extLst>
+              <a:ext uri="{FF2B5EF4-FFF2-40B4-BE49-F238E27FC236}">
+                <a16:creationId xmlns:a16="http://schemas.microsoft.com/office/drawing/2014/main" id="{9312BC5D-5778-29D7-B102-E4E4CE5D3656}"/>
+              </a:ext>
+            </a:extLst>
+          </p:cNvPr>
+          <p:cNvSpPr txBox="1"/>
+          <p:nvPr/>
+        </p:nvSpPr>
+        <p:spPr>
+          <a:xfrm>
+            <a:off x="9181580" y="4442629"/>
+            <a:ext cx="764376" cy="276999"/>
+          </a:xfrm>
+          <a:prstGeom prst="rect">
+            <a:avLst/>
+          </a:prstGeom>
+          <a:noFill/>
+        </p:spPr>
+        <p:txBody>
+          <a:bodyPr wrap="none" rtlCol="0">
+            <a:spAutoFit/>
+          </a:bodyPr>
+          <a:lstStyle/>
+          <a:p>
+            <a:pPr algn="r"/>
+            <a:r>
+              <a:rPr lang="en-US" sz="1200"/>
+              <a:t>getItem()</a:t>
+            </a:r>
+          </a:p>
+        </p:txBody>
+      </p:sp>
+      <p:cxnSp>
+        <p:nvCxnSpPr>
+          <p:cNvPr id="62" name="Straight Arrow Connector 61">
+            <a:extLst>
+              <a:ext uri="{FF2B5EF4-FFF2-40B4-BE49-F238E27FC236}">
+                <a16:creationId xmlns:a16="http://schemas.microsoft.com/office/drawing/2014/main" id="{5E33FD81-44DF-8049-5A24-C9ED1A009E69}"/>
+              </a:ext>
+            </a:extLst>
+          </p:cNvPr>
+          <p:cNvCxnSpPr>
+            <a:cxnSpLocks/>
+          </p:cNvCxnSpPr>
+          <p:nvPr/>
+        </p:nvCxnSpPr>
+        <p:spPr>
+          <a:xfrm flipV="1">
+            <a:off x="8398927" y="5351796"/>
+            <a:ext cx="3138974" cy="30778"/>
+          </a:xfrm>
+          <a:prstGeom prst="straightConnector1">
+            <a:avLst/>
+          </a:prstGeom>
+          <a:ln w="38100">
+            <a:tailEnd type="triangle"/>
+          </a:ln>
+        </p:spPr>
+        <p:style>
+          <a:lnRef idx="1">
+            <a:schemeClr val="accent1"/>
+          </a:lnRef>
+          <a:fillRef idx="0">
+            <a:schemeClr val="accent1"/>
+          </a:fillRef>
+          <a:effectRef idx="0">
+            <a:schemeClr val="accent1"/>
+          </a:effectRef>
+          <a:fontRef idx="minor">
+            <a:schemeClr val="tx1"/>
+          </a:fontRef>
+        </p:style>
+      </p:cxnSp>
+      <p:sp>
+        <p:nvSpPr>
+          <p:cNvPr id="63" name="TextBox 62">
+            <a:extLst>
+              <a:ext uri="{FF2B5EF4-FFF2-40B4-BE49-F238E27FC236}">
+                <a16:creationId xmlns:a16="http://schemas.microsoft.com/office/drawing/2014/main" id="{87F38596-2E32-166C-8542-726D59761B33}"/>
+              </a:ext>
+            </a:extLst>
+          </p:cNvPr>
+          <p:cNvSpPr txBox="1"/>
+          <p:nvPr/>
+        </p:nvSpPr>
+        <p:spPr>
+          <a:xfrm>
+            <a:off x="8420887" y="5105575"/>
+            <a:ext cx="1508746" cy="246221"/>
+          </a:xfrm>
+          <a:prstGeom prst="rect">
+            <a:avLst/>
+          </a:prstGeom>
+          <a:noFill/>
+        </p:spPr>
+        <p:txBody>
+          <a:bodyPr wrap="none" rtlCol="0">
+            <a:spAutoFit/>
+          </a:bodyPr>
+          <a:lstStyle/>
+          <a:p>
+            <a:r>
+              <a:rPr lang="en-US" sz="1000"/>
+              <a:t>addNewItem(cost, name)</a:t>
+            </a:r>
+          </a:p>
+        </p:txBody>
+      </p:sp>
+    </p:spTree>
+    <p:extLst>
+      <p:ext uri="{BB962C8B-B14F-4D97-AF65-F5344CB8AC3E}">
+        <p14:creationId xmlns:p14="http://schemas.microsoft.com/office/powerpoint/2010/main" val="3992693509"/>
       </p:ext>
     </p:extLst>
   </p:cSld>
@@ -4462,4 +6769,299 @@
     </a:ext>
   </a:extLst>
 </a:theme>
+</file>
+
+<file path=ppt/theme/theme2.xml><?xml version="1.0" encoding="utf-8"?>
+<a:theme xmlns:a="http://schemas.openxmlformats.org/drawingml/2006/main" name="Office Theme">
+  <a:themeElements>
+    <a:clrScheme name="Office">
+      <a:dk1>
+        <a:sysClr val="windowText" lastClr="000000"/>
+      </a:dk1>
+      <a:lt1>
+        <a:sysClr val="window" lastClr="FFFFFF"/>
+      </a:lt1>
+      <a:dk2>
+        <a:srgbClr val="44546A"/>
+      </a:dk2>
+      <a:lt2>
+        <a:srgbClr val="E7E6E6"/>
+      </a:lt2>
+      <a:accent1>
+        <a:srgbClr val="4472C4"/>
+      </a:accent1>
+      <a:accent2>
+        <a:srgbClr val="ED7D31"/>
+      </a:accent2>
+      <a:accent3>
+        <a:srgbClr val="A5A5A5"/>
+      </a:accent3>
+      <a:accent4>
+        <a:srgbClr val="FFC000"/>
+      </a:accent4>
+      <a:accent5>
+        <a:srgbClr val="5B9BD5"/>
+      </a:accent5>
+      <a:accent6>
+        <a:srgbClr val="70AD47"/>
+      </a:accent6>
+      <a:hlink>
+        <a:srgbClr val="0563C1"/>
+      </a:hlink>
+      <a:folHlink>
+        <a:srgbClr val="954F72"/>
+      </a:folHlink>
+    </a:clrScheme>
+    <a:fontScheme name="Office">
+      <a:majorFont>
+        <a:latin typeface="Calibri Light" panose="020F0302020204030204"/>
+        <a:ea typeface=""/>
+        <a:cs typeface=""/>
+        <a:font script="Jpan" typeface="游ゴシック Light"/>
+        <a:font script="Hang" typeface="맑은 고딕"/>
+        <a:font script="Hans" typeface="等线 Light"/>
+        <a:font script="Hant" typeface="新細明體"/>
+        <a:font script="Arab" typeface="Times New Roman"/>
+        <a:font script="Hebr" typeface="Times New Roman"/>
+        <a:font script="Thai" typeface="Angsana New"/>
+        <a:font script="Ethi" typeface="Nyala"/>
+        <a:font script="Beng" typeface="Vrinda"/>
+        <a:font script="Gujr" typeface="Shruti"/>
+        <a:font script="Khmr" typeface="MoolBoran"/>
+        <a:font script="Knda" typeface="Tunga"/>
+        <a:font script="Guru" typeface="Raavi"/>
+        <a:font script="Cans" typeface="Euphemia"/>
+        <a:font script="Cher" typeface="Plantagenet Cherokee"/>
+        <a:font script="Yiii" typeface="Microsoft Yi Baiti"/>
+        <a:font script="Tibt" typeface="Microsoft Himalaya"/>
+        <a:font script="Thaa" typeface="MV Boli"/>
+        <a:font script="Deva" typeface="Mangal"/>
+        <a:font script="Telu" typeface="Gautami"/>
+        <a:font script="Taml" typeface="Latha"/>
+        <a:font script="Syrc" typeface="Estrangelo Edessa"/>
+        <a:font script="Orya" typeface="Kalinga"/>
+        <a:font script="Mlym" typeface="Kartika"/>
+        <a:font script="Laoo" typeface="DokChampa"/>
+        <a:font script="Sinh" typeface="Iskoola Pota"/>
+        <a:font script="Mong" typeface="Mongolian Baiti"/>
+        <a:font script="Viet" typeface="Times New Roman"/>
+        <a:font script="Uigh" typeface="Microsoft Uighur"/>
+        <a:font script="Geor" typeface="Sylfaen"/>
+        <a:font script="Armn" typeface="Arial"/>
+        <a:font script="Bugi" typeface="Leelawadee UI"/>
+        <a:font script="Bopo" typeface="Microsoft JhengHei"/>
+        <a:font script="Java" typeface="Javanese Text"/>
+        <a:font script="Lisu" typeface="Segoe UI"/>
+        <a:font script="Mymr" typeface="Myanmar Text"/>
+        <a:font script="Nkoo" typeface="Ebrima"/>
+        <a:font script="Olck" typeface="Nirmala UI"/>
+        <a:font script="Osma" typeface="Ebrima"/>
+        <a:font script="Phag" typeface="Phagspa"/>
+        <a:font script="Syrn" typeface="Estrangelo Edessa"/>
+        <a:font script="Syrj" typeface="Estrangelo Edessa"/>
+        <a:font script="Syre" typeface="Estrangelo Edessa"/>
+        <a:font script="Sora" typeface="Nirmala UI"/>
+        <a:font script="Tale" typeface="Microsoft Tai Le"/>
+        <a:font script="Talu" typeface="Microsoft New Tai Lue"/>
+        <a:font script="Tfng" typeface="Ebrima"/>
+      </a:majorFont>
+      <a:minorFont>
+        <a:latin typeface="Calibri" panose="020F0502020204030204"/>
+        <a:ea typeface=""/>
+        <a:cs typeface=""/>
+        <a:font script="Jpan" typeface="游ゴシック"/>
+        <a:font script="Hang" typeface="맑은 고딕"/>
+        <a:font script="Hans" typeface="等线"/>
+        <a:font script="Hant" typeface="新細明體"/>
+        <a:font script="Arab" typeface="Arial"/>
+        <a:font script="Hebr" typeface="Arial"/>
+        <a:font script="Thai" typeface="Cordia New"/>
+        <a:font script="Ethi" typeface="Nyala"/>
+        <a:font script="Beng" typeface="Vrinda"/>
+        <a:font script="Gujr" typeface="Shruti"/>
+        <a:font script="Khmr" typeface="DaunPenh"/>
+        <a:font script="Knda" typeface="Tunga"/>
+        <a:font script="Guru" typeface="Raavi"/>
+        <a:font script="Cans" typeface="Euphemia"/>
+        <a:font script="Cher" typeface="Plantagenet Cherokee"/>
+        <a:font script="Yiii" typeface="Microsoft Yi Baiti"/>
+        <a:font script="Tibt" typeface="Microsoft Himalaya"/>
+        <a:font script="Thaa" typeface="MV Boli"/>
+        <a:font script="Deva" typeface="Mangal"/>
+        <a:font script="Telu" typeface="Gautami"/>
+        <a:font script="Taml" typeface="Latha"/>
+        <a:font script="Syrc" typeface="Estrangelo Edessa"/>
+        <a:font script="Orya" typeface="Kalinga"/>
+        <a:font script="Mlym" typeface="Kartika"/>
+        <a:font script="Laoo" typeface="DokChampa"/>
+        <a:font script="Sinh" typeface="Iskoola Pota"/>
+        <a:font script="Mong" typeface="Mongolian Baiti"/>
+        <a:font script="Viet" typeface="Arial"/>
+        <a:font script="Uigh" typeface="Microsoft Uighur"/>
+        <a:font script="Geor" typeface="Sylfaen"/>
+        <a:font script="Armn" typeface="Arial"/>
+        <a:font script="Bugi" typeface="Leelawadee UI"/>
+        <a:font script="Bopo" typeface="Microsoft JhengHei"/>
+        <a:font script="Java" typeface="Javanese Text"/>
+        <a:font script="Lisu" typeface="Segoe UI"/>
+        <a:font script="Mymr" typeface="Myanmar Text"/>
+        <a:font script="Nkoo" typeface="Ebrima"/>
+        <a:font script="Olck" typeface="Nirmala UI"/>
+        <a:font script="Osma" typeface="Ebrima"/>
+        <a:font script="Phag" typeface="Phagspa"/>
+        <a:font script="Syrn" typeface="Estrangelo Edessa"/>
+        <a:font script="Syrj" typeface="Estrangelo Edessa"/>
+        <a:font script="Syre" typeface="Estrangelo Edessa"/>
+        <a:font script="Sora" typeface="Nirmala UI"/>
+        <a:font script="Tale" typeface="Microsoft Tai Le"/>
+        <a:font script="Talu" typeface="Microsoft New Tai Lue"/>
+        <a:font script="Tfng" typeface="Ebrima"/>
+      </a:minorFont>
+    </a:fontScheme>
+    <a:fmtScheme name="Office">
+      <a:fillStyleLst>
+        <a:solidFill>
+          <a:schemeClr val="phClr"/>
+        </a:solidFill>
+        <a:gradFill rotWithShape="1">
+          <a:gsLst>
+            <a:gs pos="0">
+              <a:schemeClr val="phClr">
+                <a:lumMod val="110000"/>
+                <a:satMod val="105000"/>
+                <a:tint val="67000"/>
+              </a:schemeClr>
+            </a:gs>
+            <a:gs pos="50000">
+              <a:schemeClr val="phClr">
+                <a:lumMod val="105000"/>
+                <a:satMod val="103000"/>
+                <a:tint val="73000"/>
+              </a:schemeClr>
+            </a:gs>
+            <a:gs pos="100000">
+              <a:schemeClr val="phClr">
+                <a:lumMod val="105000"/>
+                <a:satMod val="109000"/>
+                <a:tint val="81000"/>
+              </a:schemeClr>
+            </a:gs>
+          </a:gsLst>
+          <a:lin ang="5400000" scaled="0"/>
+        </a:gradFill>
+        <a:gradFill rotWithShape="1">
+          <a:gsLst>
+            <a:gs pos="0">
+              <a:schemeClr val="phClr">
+                <a:satMod val="103000"/>
+                <a:lumMod val="102000"/>
+                <a:tint val="94000"/>
+              </a:schemeClr>
+            </a:gs>
+            <a:gs pos="50000">
+              <a:schemeClr val="phClr">
+                <a:satMod val="110000"/>
+                <a:lumMod val="100000"/>
+                <a:shade val="100000"/>
+              </a:schemeClr>
+            </a:gs>
+            <a:gs pos="100000">
+              <a:schemeClr val="phClr">
+                <a:lumMod val="99000"/>
+                <a:satMod val="120000"/>
+                <a:shade val="78000"/>
+              </a:schemeClr>
+            </a:gs>
+          </a:gsLst>
+          <a:lin ang="5400000" scaled="0"/>
+        </a:gradFill>
+      </a:fillStyleLst>
+      <a:lnStyleLst>
+        <a:ln w="6350" cap="flat" cmpd="sng" algn="ctr">
+          <a:solidFill>
+            <a:schemeClr val="phClr"/>
+          </a:solidFill>
+          <a:prstDash val="solid"/>
+          <a:miter lim="800000"/>
+        </a:ln>
+        <a:ln w="12700" cap="flat" cmpd="sng" algn="ctr">
+          <a:solidFill>
+            <a:schemeClr val="phClr"/>
+          </a:solidFill>
+          <a:prstDash val="solid"/>
+          <a:miter lim="800000"/>
+        </a:ln>
+        <a:ln w="19050" cap="flat" cmpd="sng" algn="ctr">
+          <a:solidFill>
+            <a:schemeClr val="phClr"/>
+          </a:solidFill>
+          <a:prstDash val="solid"/>
+          <a:miter lim="800000"/>
+        </a:ln>
+      </a:lnStyleLst>
+      <a:effectStyleLst>
+        <a:effectStyle>
+          <a:effectLst/>
+        </a:effectStyle>
+        <a:effectStyle>
+          <a:effectLst/>
+        </a:effectStyle>
+        <a:effectStyle>
+          <a:effectLst>
+            <a:outerShdw blurRad="57150" dist="19050" dir="5400000" algn="ctr" rotWithShape="0">
+              <a:srgbClr val="000000">
+                <a:alpha val="63000"/>
+              </a:srgbClr>
+            </a:outerShdw>
+          </a:effectLst>
+        </a:effectStyle>
+      </a:effectStyleLst>
+      <a:bgFillStyleLst>
+        <a:solidFill>
+          <a:schemeClr val="phClr"/>
+        </a:solidFill>
+        <a:solidFill>
+          <a:schemeClr val="phClr">
+            <a:tint val="95000"/>
+            <a:satMod val="170000"/>
+          </a:schemeClr>
+        </a:solidFill>
+        <a:gradFill rotWithShape="1">
+          <a:gsLst>
+            <a:gs pos="0">
+              <a:schemeClr val="phClr">
+                <a:tint val="93000"/>
+                <a:satMod val="150000"/>
+                <a:shade val="98000"/>
+                <a:lumMod val="102000"/>
+              </a:schemeClr>
+            </a:gs>
+            <a:gs pos="50000">
+              <a:schemeClr val="phClr">
+                <a:tint val="98000"/>
+                <a:satMod val="130000"/>
+                <a:shade val="90000"/>
+                <a:lumMod val="103000"/>
+              </a:schemeClr>
+            </a:gs>
+            <a:gs pos="100000">
+              <a:schemeClr val="phClr">
+                <a:shade val="63000"/>
+                <a:satMod val="120000"/>
+              </a:schemeClr>
+            </a:gs>
+          </a:gsLst>
+          <a:lin ang="5400000" scaled="0"/>
+        </a:gradFill>
+      </a:bgFillStyleLst>
+    </a:fmtScheme>
+  </a:themeElements>
+  <a:objectDefaults/>
+  <a:extraClrSchemeLst/>
+  <a:extLst>
+    <a:ext uri="{05A4C25C-085E-4340-85A3-A5531E510DB2}">
+      <thm15:themeFamily xmlns:thm15="http://schemas.microsoft.com/office/thememl/2012/main" name="Office Theme" id="{62F939B6-93AF-4DB8-9C6B-D6C7DFDC589F}" vid="{4A3C46E8-61CC-4603-A589-7422A47A8E4A}"/>
+    </a:ext>
+  </a:extLst>
+</a:theme>
 </file>
</xml_diff>

<commit_message>
base layout for code deliverable
</commit_message>
<xml_diff>
--- a/documentation/AppDesign.pptx
+++ b/documentation/AppDesign.pptx
@@ -205,7 +205,7 @@
           </a:lstStyle>
           <a:p>
             <a:fld id="{7258A54E-126E-9F44-BB91-7E6D295A013E}" type="datetimeFigureOut">
-              <a:t>11/28/23</a:t>
+              <a:t>12/3/23</a:t>
             </a:fld>
             <a:endParaRPr lang="en-US"/>
           </a:p>
@@ -1281,7 +1281,7 @@
           <a:lstStyle/>
           <a:p>
             <a:fld id="{814779F6-DF54-A74A-B093-E4E0AB693425}" type="datetimeFigureOut">
-              <a:t>11/28/23</a:t>
+              <a:t>12/3/23</a:t>
             </a:fld>
             <a:endParaRPr lang="en-US"/>
           </a:p>
@@ -1477,7 +1477,7 @@
           <a:lstStyle/>
           <a:p>
             <a:fld id="{814779F6-DF54-A74A-B093-E4E0AB693425}" type="datetimeFigureOut">
-              <a:t>11/28/23</a:t>
+              <a:t>12/3/23</a:t>
             </a:fld>
             <a:endParaRPr lang="en-US"/>
           </a:p>
@@ -1683,7 +1683,7 @@
           <a:lstStyle/>
           <a:p>
             <a:fld id="{814779F6-DF54-A74A-B093-E4E0AB693425}" type="datetimeFigureOut">
-              <a:t>11/28/23</a:t>
+              <a:t>12/3/23</a:t>
             </a:fld>
             <a:endParaRPr lang="en-US"/>
           </a:p>
@@ -1879,7 +1879,7 @@
           <a:lstStyle/>
           <a:p>
             <a:fld id="{814779F6-DF54-A74A-B093-E4E0AB693425}" type="datetimeFigureOut">
-              <a:t>11/28/23</a:t>
+              <a:t>12/3/23</a:t>
             </a:fld>
             <a:endParaRPr lang="en-US"/>
           </a:p>
@@ -2152,7 +2152,7 @@
           <a:lstStyle/>
           <a:p>
             <a:fld id="{814779F6-DF54-A74A-B093-E4E0AB693425}" type="datetimeFigureOut">
-              <a:t>11/28/23</a:t>
+              <a:t>12/3/23</a:t>
             </a:fld>
             <a:endParaRPr lang="en-US"/>
           </a:p>
@@ -2415,7 +2415,7 @@
           <a:lstStyle/>
           <a:p>
             <a:fld id="{814779F6-DF54-A74A-B093-E4E0AB693425}" type="datetimeFigureOut">
-              <a:t>11/28/23</a:t>
+              <a:t>12/3/23</a:t>
             </a:fld>
             <a:endParaRPr lang="en-US"/>
           </a:p>
@@ -2825,7 +2825,7 @@
           <a:lstStyle/>
           <a:p>
             <a:fld id="{814779F6-DF54-A74A-B093-E4E0AB693425}" type="datetimeFigureOut">
-              <a:t>11/28/23</a:t>
+              <a:t>12/3/23</a:t>
             </a:fld>
             <a:endParaRPr lang="en-US"/>
           </a:p>
@@ -2964,7 +2964,7 @@
           <a:lstStyle/>
           <a:p>
             <a:fld id="{814779F6-DF54-A74A-B093-E4E0AB693425}" type="datetimeFigureOut">
-              <a:t>11/28/23</a:t>
+              <a:t>12/3/23</a:t>
             </a:fld>
             <a:endParaRPr lang="en-US"/>
           </a:p>
@@ -3075,7 +3075,7 @@
           <a:lstStyle/>
           <a:p>
             <a:fld id="{814779F6-DF54-A74A-B093-E4E0AB693425}" type="datetimeFigureOut">
-              <a:t>11/28/23</a:t>
+              <a:t>12/3/23</a:t>
             </a:fld>
             <a:endParaRPr lang="en-US"/>
           </a:p>
@@ -3384,7 +3384,7 @@
           <a:lstStyle/>
           <a:p>
             <a:fld id="{814779F6-DF54-A74A-B093-E4E0AB693425}" type="datetimeFigureOut">
-              <a:t>11/28/23</a:t>
+              <a:t>12/3/23</a:t>
             </a:fld>
             <a:endParaRPr lang="en-US"/>
           </a:p>
@@ -3670,7 +3670,7 @@
           <a:lstStyle/>
           <a:p>
             <a:fld id="{814779F6-DF54-A74A-B093-E4E0AB693425}" type="datetimeFigureOut">
-              <a:t>11/28/23</a:t>
+              <a:t>12/3/23</a:t>
             </a:fld>
             <a:endParaRPr lang="en-US"/>
           </a:p>
@@ -3909,7 +3909,7 @@
           </a:lstStyle>
           <a:p>
             <a:fld id="{814779F6-DF54-A74A-B093-E4E0AB693425}" type="datetimeFigureOut">
-              <a:t>11/28/23</a:t>
+              <a:t>12/3/23</a:t>
             </a:fld>
             <a:endParaRPr lang="en-US"/>
           </a:p>
@@ -6715,7 +6715,7 @@
                     <a:schemeClr val="tx1"/>
                   </a:solidFill>
                 </a:rPr>
-                <a:t>Item</a:t>
+                <a:t>Entry</a:t>
               </a:r>
             </a:p>
           </p:txBody>

</xml_diff>

<commit_message>
base back-end layout for code deliverable
</commit_message>
<xml_diff>
--- a/documentation/AppDesign.pptx
+++ b/documentation/AppDesign.pptx
@@ -6622,7 +6622,7 @@
                     <a:schemeClr val="tx1"/>
                   </a:solidFill>
                 </a:rPr>
-                <a:t>-items : LinkedList&lt;Item&gt;</a:t>
+                <a:t>-entries : LinkedList&lt;Entry&gt;</a:t>
               </a:r>
             </a:p>
             <a:p>
@@ -6632,7 +6632,7 @@
                     <a:schemeClr val="tx1"/>
                   </a:solidFill>
                 </a:rPr>
-                <a:t>+addItem(cost, name) : Item</a:t>
+                <a:t>+addEntry(cost, name) : Entry</a:t>
               </a:r>
             </a:p>
           </p:txBody>
@@ -8613,7 +8613,8 @@
             <a:solidFill>
               <a:schemeClr val="tx1"/>
             </a:solidFill>
-            <a:tailEnd type="triangle"/>
+            <a:headEnd type="triangle"/>
+            <a:tailEnd type="none"/>
           </a:ln>
         </p:spPr>
         <p:style>

</xml_diff>